<commit_message>
Addressing important comments about adding and removing figures/tables
</commit_message>
<xml_diff>
--- a/alpolyner.pptx
+++ b/alpolyner.pptx
@@ -198,7 +198,7 @@
           <a:p>
             <a:fld id="{2F5CF1B8-E33B-2D4C-AE82-68295A1878F9}" type="datetimeFigureOut">
               <a:rPr lang="en-US" smtClean="0"/>
-              <a:t>3/7/19</a:t>
+              <a:t>3/18/19</a:t>
             </a:fld>
             <a:endParaRPr lang="en-US"/>
           </a:p>
@@ -612,7 +612,7 @@
           <a:p>
             <a:fld id="{368E5452-927C-804A-9893-4B0F8C82BC51}" type="datetimeFigureOut">
               <a:rPr lang="en-US" smtClean="0"/>
-              <a:t>3/7/19</a:t>
+              <a:t>3/18/19</a:t>
             </a:fld>
             <a:endParaRPr lang="en-US"/>
           </a:p>
@@ -810,7 +810,7 @@
           <a:p>
             <a:fld id="{368E5452-927C-804A-9893-4B0F8C82BC51}" type="datetimeFigureOut">
               <a:rPr lang="en-US" smtClean="0"/>
-              <a:t>3/7/19</a:t>
+              <a:t>3/18/19</a:t>
             </a:fld>
             <a:endParaRPr lang="en-US"/>
           </a:p>
@@ -1018,7 +1018,7 @@
           <a:p>
             <a:fld id="{368E5452-927C-804A-9893-4B0F8C82BC51}" type="datetimeFigureOut">
               <a:rPr lang="en-US" smtClean="0"/>
-              <a:t>3/7/19</a:t>
+              <a:t>3/18/19</a:t>
             </a:fld>
             <a:endParaRPr lang="en-US"/>
           </a:p>
@@ -1216,7 +1216,7 @@
           <a:p>
             <a:fld id="{368E5452-927C-804A-9893-4B0F8C82BC51}" type="datetimeFigureOut">
               <a:rPr lang="en-US" smtClean="0"/>
-              <a:t>3/7/19</a:t>
+              <a:t>3/18/19</a:t>
             </a:fld>
             <a:endParaRPr lang="en-US"/>
           </a:p>
@@ -1491,7 +1491,7 @@
           <a:p>
             <a:fld id="{368E5452-927C-804A-9893-4B0F8C82BC51}" type="datetimeFigureOut">
               <a:rPr lang="en-US" smtClean="0"/>
-              <a:t>3/7/19</a:t>
+              <a:t>3/18/19</a:t>
             </a:fld>
             <a:endParaRPr lang="en-US"/>
           </a:p>
@@ -1756,7 +1756,7 @@
           <a:p>
             <a:fld id="{368E5452-927C-804A-9893-4B0F8C82BC51}" type="datetimeFigureOut">
               <a:rPr lang="en-US" smtClean="0"/>
-              <a:t>3/7/19</a:t>
+              <a:t>3/18/19</a:t>
             </a:fld>
             <a:endParaRPr lang="en-US"/>
           </a:p>
@@ -2168,7 +2168,7 @@
           <a:p>
             <a:fld id="{368E5452-927C-804A-9893-4B0F8C82BC51}" type="datetimeFigureOut">
               <a:rPr lang="en-US" smtClean="0"/>
-              <a:t>3/7/19</a:t>
+              <a:t>3/18/19</a:t>
             </a:fld>
             <a:endParaRPr lang="en-US"/>
           </a:p>
@@ -2309,7 +2309,7 @@
           <a:p>
             <a:fld id="{368E5452-927C-804A-9893-4B0F8C82BC51}" type="datetimeFigureOut">
               <a:rPr lang="en-US" smtClean="0"/>
-              <a:t>3/7/19</a:t>
+              <a:t>3/18/19</a:t>
             </a:fld>
             <a:endParaRPr lang="en-US"/>
           </a:p>
@@ -2422,7 +2422,7 @@
           <a:p>
             <a:fld id="{368E5452-927C-804A-9893-4B0F8C82BC51}" type="datetimeFigureOut">
               <a:rPr lang="en-US" smtClean="0"/>
-              <a:t>3/7/19</a:t>
+              <a:t>3/18/19</a:t>
             </a:fld>
             <a:endParaRPr lang="en-US"/>
           </a:p>
@@ -2733,7 +2733,7 @@
           <a:p>
             <a:fld id="{368E5452-927C-804A-9893-4B0F8C82BC51}" type="datetimeFigureOut">
               <a:rPr lang="en-US" smtClean="0"/>
-              <a:t>3/7/19</a:t>
+              <a:t>3/18/19</a:t>
             </a:fld>
             <a:endParaRPr lang="en-US"/>
           </a:p>
@@ -3021,7 +3021,7 @@
           <a:p>
             <a:fld id="{368E5452-927C-804A-9893-4B0F8C82BC51}" type="datetimeFigureOut">
               <a:rPr lang="en-US" smtClean="0"/>
-              <a:t>3/7/19</a:t>
+              <a:t>3/18/19</a:t>
             </a:fld>
             <a:endParaRPr lang="en-US"/>
           </a:p>
@@ -3262,7 +3262,7 @@
           <a:p>
             <a:fld id="{368E5452-927C-804A-9893-4B0F8C82BC51}" type="datetimeFigureOut">
               <a:rPr lang="en-US" smtClean="0"/>
-              <a:t>3/7/19</a:t>
+              <a:t>3/18/19</a:t>
             </a:fld>
             <a:endParaRPr lang="en-US"/>
           </a:p>
@@ -4209,7 +4209,7 @@
           <a:prstGeom prst="straightConnector1">
             <a:avLst/>
           </a:prstGeom>
-          <a:ln w="28575">
+          <a:ln w="38100">
             <a:solidFill>
               <a:schemeClr val="tx1">
                 <a:lumMod val="95000"/>
@@ -4625,7 +4625,7 @@
           <a:prstGeom prst="straightConnector1">
             <a:avLst/>
           </a:prstGeom>
-          <a:ln w="28575">
+          <a:ln w="38100">
             <a:solidFill>
               <a:schemeClr val="tx1">
                 <a:lumMod val="95000"/>
@@ -4836,7 +4836,7 @@
           <a:prstGeom prst="straightConnector1">
             <a:avLst/>
           </a:prstGeom>
-          <a:ln w="28575">
+          <a:ln w="38100">
             <a:solidFill>
               <a:schemeClr val="tx1">
                 <a:lumMod val="95000"/>
@@ -4959,7 +4959,7 @@
           <a:prstGeom prst="bentConnector2">
             <a:avLst/>
           </a:prstGeom>
-          <a:ln w="28575">
+          <a:ln w="38100">
             <a:solidFill>
               <a:schemeClr val="tx1"/>
             </a:solidFill>
@@ -5006,7 +5006,7 @@
               <a:gd name="adj1" fmla="val 24401"/>
             </a:avLst>
           </a:prstGeom>
-          <a:ln w="28575">
+          <a:ln w="38100">
             <a:solidFill>
               <a:schemeClr val="tx1"/>
             </a:solidFill>
@@ -5050,7 +5050,7 @@
           <a:prstGeom prst="straightConnector1">
             <a:avLst/>
           </a:prstGeom>
-          <a:ln w="28575">
+          <a:ln w="38100">
             <a:solidFill>
               <a:schemeClr val="tx1">
                 <a:lumMod val="95000"/>
@@ -5098,7 +5098,7 @@
           <a:prstGeom prst="straightConnector1">
             <a:avLst/>
           </a:prstGeom>
-          <a:ln w="28575">
+          <a:ln w="38100">
             <a:solidFill>
               <a:schemeClr val="tx1">
                 <a:lumMod val="95000"/>
@@ -5344,7 +5344,7 @@
               <a:gd name="adj2" fmla="val 100078"/>
             </a:avLst>
           </a:prstGeom>
-          <a:ln w="28575">
+          <a:ln w="38100">
             <a:solidFill>
               <a:schemeClr val="tx1"/>
             </a:solidFill>
@@ -5388,7 +5388,7 @@
           <a:prstGeom prst="straightConnector1">
             <a:avLst/>
           </a:prstGeom>
-          <a:ln w="28575">
+          <a:ln w="38100">
             <a:solidFill>
               <a:schemeClr val="tx1"/>
             </a:solidFill>
@@ -5960,7 +5960,7 @@
                   <a:srgbClr val="C00000"/>
                 </a:solidFill>
               </a:rPr>
-              <a:t>1</a:t>
+              <a:t>3</a:t>
             </a:r>
           </a:p>
         </p:txBody>
@@ -6021,7 +6021,7 @@
                   <a:srgbClr val="C00000"/>
                 </a:solidFill>
               </a:rPr>
-              <a:t>2</a:t>
+              <a:t>5</a:t>
             </a:r>
           </a:p>
         </p:txBody>
@@ -6082,7 +6082,438 @@
                   <a:srgbClr val="C00000"/>
                 </a:solidFill>
               </a:rPr>
-              <a:t>3</a:t>
+              <a:t>6</a:t>
+            </a:r>
+          </a:p>
+        </p:txBody>
+      </p:sp>
+      <p:grpSp>
+        <p:nvGrpSpPr>
+          <p:cNvPr id="53" name="Group 52">
+            <a:extLst>
+              <a:ext uri="{FF2B5EF4-FFF2-40B4-BE49-F238E27FC236}">
+                <a16:creationId xmlns:a16="http://schemas.microsoft.com/office/drawing/2014/main" id="{6D1E2069-D92F-B24C-8C88-A6DADE187DA5}"/>
+              </a:ext>
+            </a:extLst>
+          </p:cNvPr>
+          <p:cNvGrpSpPr/>
+          <p:nvPr/>
+        </p:nvGrpSpPr>
+        <p:grpSpPr>
+          <a:xfrm>
+            <a:off x="3824428" y="2537645"/>
+            <a:ext cx="973789" cy="1131468"/>
+            <a:chOff x="6153873" y="4315382"/>
+            <a:chExt cx="1314913" cy="1510006"/>
+          </a:xfrm>
+        </p:grpSpPr>
+        <p:pic>
+          <p:nvPicPr>
+            <p:cNvPr id="54" name="Picture 53">
+              <a:extLst>
+                <a:ext uri="{FF2B5EF4-FFF2-40B4-BE49-F238E27FC236}">
+                  <a16:creationId xmlns:a16="http://schemas.microsoft.com/office/drawing/2014/main" id="{1694EDC2-9CBA-C44E-B182-316A2A6EC6FB}"/>
+                </a:ext>
+              </a:extLst>
+            </p:cNvPr>
+            <p:cNvPicPr>
+              <a:picLocks noChangeAspect="1"/>
+            </p:cNvPicPr>
+            <p:nvPr/>
+          </p:nvPicPr>
+          <p:blipFill rotWithShape="1">
+            <a:blip r:embed="rId2">
+              <a:clrChange>
+                <a:clrFrom>
+                  <a:srgbClr val="FFFFFF"/>
+                </a:clrFrom>
+                <a:clrTo>
+                  <a:srgbClr val="FFFFFF">
+                    <a:alpha val="0"/>
+                  </a:srgbClr>
+                </a:clrTo>
+              </a:clrChange>
+              <a:extLst>
+                <a:ext uri="{28A0092B-C50C-407E-A947-70E740481C1C}">
+                  <a14:useLocalDpi xmlns:a14="http://schemas.microsoft.com/office/drawing/2010/main" val="0"/>
+                </a:ext>
+              </a:extLst>
+            </a:blip>
+            <a:srcRect t="39053" r="71840"/>
+            <a:stretch/>
+          </p:blipFill>
+          <p:spPr>
+            <a:xfrm>
+              <a:off x="6483377" y="4315382"/>
+              <a:ext cx="985409" cy="1501385"/>
+            </a:xfrm>
+            <a:prstGeom prst="rect">
+              <a:avLst/>
+            </a:prstGeom>
+          </p:spPr>
+        </p:pic>
+        <p:pic>
+          <p:nvPicPr>
+            <p:cNvPr id="55" name="Picture 54">
+              <a:extLst>
+                <a:ext uri="{FF2B5EF4-FFF2-40B4-BE49-F238E27FC236}">
+                  <a16:creationId xmlns:a16="http://schemas.microsoft.com/office/drawing/2014/main" id="{3AEDFE5C-A84E-5D44-95C0-10BCCA8A0E79}"/>
+                </a:ext>
+              </a:extLst>
+            </p:cNvPr>
+            <p:cNvPicPr>
+              <a:picLocks noChangeAspect="1"/>
+            </p:cNvPicPr>
+            <p:nvPr/>
+          </p:nvPicPr>
+          <p:blipFill rotWithShape="1">
+            <a:blip r:embed="rId2">
+              <a:clrChange>
+                <a:clrFrom>
+                  <a:srgbClr val="FFFFFF"/>
+                </a:clrFrom>
+                <a:clrTo>
+                  <a:srgbClr val="FFFFFF">
+                    <a:alpha val="0"/>
+                  </a:srgbClr>
+                </a:clrTo>
+              </a:clrChange>
+              <a:extLst>
+                <a:ext uri="{28A0092B-C50C-407E-A947-70E740481C1C}">
+                  <a14:useLocalDpi xmlns:a14="http://schemas.microsoft.com/office/drawing/2010/main" val="0"/>
+                </a:ext>
+              </a:extLst>
+            </a:blip>
+            <a:srcRect t="39053" r="71840"/>
+            <a:stretch/>
+          </p:blipFill>
+          <p:spPr>
+            <a:xfrm>
+              <a:off x="6330910" y="4324003"/>
+              <a:ext cx="985410" cy="1501385"/>
+            </a:xfrm>
+            <a:prstGeom prst="rect">
+              <a:avLst/>
+            </a:prstGeom>
+          </p:spPr>
+        </p:pic>
+        <p:pic>
+          <p:nvPicPr>
+            <p:cNvPr id="56" name="Picture 55">
+              <a:extLst>
+                <a:ext uri="{FF2B5EF4-FFF2-40B4-BE49-F238E27FC236}">
+                  <a16:creationId xmlns:a16="http://schemas.microsoft.com/office/drawing/2014/main" id="{5A7D201D-4F85-7F49-B6A2-45313C3CF663}"/>
+                </a:ext>
+              </a:extLst>
+            </p:cNvPr>
+            <p:cNvPicPr>
+              <a:picLocks noChangeAspect="1"/>
+            </p:cNvPicPr>
+            <p:nvPr/>
+          </p:nvPicPr>
+          <p:blipFill rotWithShape="1">
+            <a:blip r:embed="rId2">
+              <a:clrChange>
+                <a:clrFrom>
+                  <a:srgbClr val="FFFFFF"/>
+                </a:clrFrom>
+                <a:clrTo>
+                  <a:srgbClr val="FFFFFF">
+                    <a:alpha val="0"/>
+                  </a:srgbClr>
+                </a:clrTo>
+              </a:clrChange>
+              <a:extLst>
+                <a:ext uri="{28A0092B-C50C-407E-A947-70E740481C1C}">
+                  <a14:useLocalDpi xmlns:a14="http://schemas.microsoft.com/office/drawing/2010/main" val="0"/>
+                </a:ext>
+              </a:extLst>
+            </a:blip>
+            <a:srcRect t="39053" r="71840"/>
+            <a:stretch/>
+          </p:blipFill>
+          <p:spPr>
+            <a:xfrm>
+              <a:off x="6153873" y="4324003"/>
+              <a:ext cx="985409" cy="1501385"/>
+            </a:xfrm>
+            <a:prstGeom prst="rect">
+              <a:avLst/>
+            </a:prstGeom>
+          </p:spPr>
+        </p:pic>
+      </p:grpSp>
+      <p:sp>
+        <p:nvSpPr>
+          <p:cNvPr id="57" name="TextBox 56">
+            <a:extLst>
+              <a:ext uri="{FF2B5EF4-FFF2-40B4-BE49-F238E27FC236}">
+                <a16:creationId xmlns:a16="http://schemas.microsoft.com/office/drawing/2014/main" id="{E6E18E75-833D-B145-868D-EC2C0852186E}"/>
+              </a:ext>
+            </a:extLst>
+          </p:cNvPr>
+          <p:cNvSpPr txBox="1"/>
+          <p:nvPr/>
+        </p:nvSpPr>
+        <p:spPr>
+          <a:xfrm>
+            <a:off x="3579387" y="3685253"/>
+            <a:ext cx="1638847" cy="584775"/>
+          </a:xfrm>
+          <a:prstGeom prst="rect">
+            <a:avLst/>
+          </a:prstGeom>
+          <a:noFill/>
+        </p:spPr>
+        <p:txBody>
+          <a:bodyPr wrap="none" rtlCol="0">
+            <a:spAutoFit/>
+          </a:bodyPr>
+          <a:lstStyle/>
+          <a:p>
+            <a:pPr algn="ctr"/>
+            <a:r>
+              <a:rPr lang="en-US" sz="1600" dirty="0"/>
+              <a:t>Expert/Untrained</a:t>
+            </a:r>
+          </a:p>
+          <a:p>
+            <a:pPr algn="ctr"/>
+            <a:r>
+              <a:rPr lang="en-US" sz="1600" dirty="0"/>
+              <a:t>Labeling</a:t>
+            </a:r>
+          </a:p>
+        </p:txBody>
+      </p:sp>
+      <p:cxnSp>
+        <p:nvCxnSpPr>
+          <p:cNvPr id="63" name="Straight Arrow Connector 62">
+            <a:extLst>
+              <a:ext uri="{FF2B5EF4-FFF2-40B4-BE49-F238E27FC236}">
+                <a16:creationId xmlns:a16="http://schemas.microsoft.com/office/drawing/2014/main" id="{195ACF19-CF4F-8C42-BFF0-5A9F1BC760A3}"/>
+              </a:ext>
+            </a:extLst>
+          </p:cNvPr>
+          <p:cNvCxnSpPr>
+            <a:cxnSpLocks/>
+            <a:stCxn id="56" idx="1"/>
+            <a:endCxn id="27" idx="3"/>
+          </p:cNvCxnSpPr>
+          <p:nvPr/>
+        </p:nvCxnSpPr>
+        <p:spPr>
+          <a:xfrm flipH="1">
+            <a:off x="3189634" y="3106609"/>
+            <a:ext cx="634794" cy="5314"/>
+          </a:xfrm>
+          <a:prstGeom prst="straightConnector1">
+            <a:avLst/>
+          </a:prstGeom>
+          <a:ln w="38100">
+            <a:solidFill>
+              <a:schemeClr val="tx1">
+                <a:lumMod val="95000"/>
+                <a:lumOff val="5000"/>
+              </a:schemeClr>
+            </a:solidFill>
+            <a:tailEnd type="triangle"/>
+          </a:ln>
+        </p:spPr>
+        <p:style>
+          <a:lnRef idx="1">
+            <a:schemeClr val="accent1"/>
+          </a:lnRef>
+          <a:fillRef idx="0">
+            <a:schemeClr val="accent1"/>
+          </a:fillRef>
+          <a:effectRef idx="0">
+            <a:schemeClr val="accent1"/>
+          </a:effectRef>
+          <a:fontRef idx="minor">
+            <a:schemeClr val="tx1"/>
+          </a:fontRef>
+        </p:style>
+      </p:cxnSp>
+      <p:sp>
+        <p:nvSpPr>
+          <p:cNvPr id="65" name="Oval 64">
+            <a:extLst>
+              <a:ext uri="{FF2B5EF4-FFF2-40B4-BE49-F238E27FC236}">
+                <a16:creationId xmlns:a16="http://schemas.microsoft.com/office/drawing/2014/main" id="{44520365-D3DA-4445-931A-8A2DDDAE1F8C}"/>
+              </a:ext>
+            </a:extLst>
+          </p:cNvPr>
+          <p:cNvSpPr/>
+          <p:nvPr/>
+        </p:nvSpPr>
+        <p:spPr>
+          <a:xfrm>
+            <a:off x="1454211" y="1500781"/>
+            <a:ext cx="457200" cy="457200"/>
+          </a:xfrm>
+          <a:prstGeom prst="ellipse">
+            <a:avLst/>
+          </a:prstGeom>
+          <a:solidFill>
+            <a:srgbClr val="FF7E79"/>
+          </a:solidFill>
+          <a:ln>
+            <a:solidFill>
+              <a:srgbClr val="C00000"/>
+            </a:solidFill>
+          </a:ln>
+        </p:spPr>
+        <p:style>
+          <a:lnRef idx="2">
+            <a:schemeClr val="accent1">
+              <a:shade val="50000"/>
+            </a:schemeClr>
+          </a:lnRef>
+          <a:fillRef idx="1">
+            <a:schemeClr val="accent1"/>
+          </a:fillRef>
+          <a:effectRef idx="0">
+            <a:schemeClr val="accent1"/>
+          </a:effectRef>
+          <a:fontRef idx="minor">
+            <a:schemeClr val="lt1"/>
+          </a:fontRef>
+        </p:style>
+        <p:txBody>
+          <a:bodyPr rtlCol="0" anchor="ctr"/>
+          <a:lstStyle/>
+          <a:p>
+            <a:pPr algn="ctr"/>
+            <a:r>
+              <a:rPr lang="en-US" b="1" dirty="0">
+                <a:solidFill>
+                  <a:srgbClr val="C00000"/>
+                </a:solidFill>
+              </a:rPr>
+              <a:t>1</a:t>
+            </a:r>
+          </a:p>
+        </p:txBody>
+      </p:sp>
+      <p:sp>
+        <p:nvSpPr>
+          <p:cNvPr id="66" name="Oval 65">
+            <a:extLst>
+              <a:ext uri="{FF2B5EF4-FFF2-40B4-BE49-F238E27FC236}">
+                <a16:creationId xmlns:a16="http://schemas.microsoft.com/office/drawing/2014/main" id="{D63A70C9-3094-484B-902C-E3135FEEAEB1}"/>
+              </a:ext>
+            </a:extLst>
+          </p:cNvPr>
+          <p:cNvSpPr/>
+          <p:nvPr/>
+        </p:nvSpPr>
+        <p:spPr>
+          <a:xfrm>
+            <a:off x="3326959" y="3179156"/>
+            <a:ext cx="457200" cy="457200"/>
+          </a:xfrm>
+          <a:prstGeom prst="ellipse">
+            <a:avLst/>
+          </a:prstGeom>
+          <a:solidFill>
+            <a:srgbClr val="FF7E79"/>
+          </a:solidFill>
+          <a:ln>
+            <a:solidFill>
+              <a:srgbClr val="C00000"/>
+            </a:solidFill>
+          </a:ln>
+        </p:spPr>
+        <p:style>
+          <a:lnRef idx="2">
+            <a:schemeClr val="accent1">
+              <a:shade val="50000"/>
+            </a:schemeClr>
+          </a:lnRef>
+          <a:fillRef idx="1">
+            <a:schemeClr val="accent1"/>
+          </a:fillRef>
+          <a:effectRef idx="0">
+            <a:schemeClr val="accent1"/>
+          </a:effectRef>
+          <a:fontRef idx="minor">
+            <a:schemeClr val="lt1"/>
+          </a:fontRef>
+        </p:style>
+        <p:txBody>
+          <a:bodyPr rtlCol="0" anchor="ctr"/>
+          <a:lstStyle/>
+          <a:p>
+            <a:pPr algn="ctr"/>
+            <a:r>
+              <a:rPr lang="en-US" b="1" dirty="0">
+                <a:solidFill>
+                  <a:srgbClr val="C00000"/>
+                </a:solidFill>
+              </a:rPr>
+              <a:t>2</a:t>
+            </a:r>
+          </a:p>
+        </p:txBody>
+      </p:sp>
+      <p:sp>
+        <p:nvSpPr>
+          <p:cNvPr id="67" name="Oval 66">
+            <a:extLst>
+              <a:ext uri="{FF2B5EF4-FFF2-40B4-BE49-F238E27FC236}">
+                <a16:creationId xmlns:a16="http://schemas.microsoft.com/office/drawing/2014/main" id="{252800DF-3C0C-A448-8CB5-915178A90DCC}"/>
+              </a:ext>
+            </a:extLst>
+          </p:cNvPr>
+          <p:cNvSpPr/>
+          <p:nvPr/>
+        </p:nvSpPr>
+        <p:spPr>
+          <a:xfrm>
+            <a:off x="5684942" y="4458717"/>
+            <a:ext cx="457200" cy="457200"/>
+          </a:xfrm>
+          <a:prstGeom prst="ellipse">
+            <a:avLst/>
+          </a:prstGeom>
+          <a:solidFill>
+            <a:srgbClr val="FF7E79"/>
+          </a:solidFill>
+          <a:ln>
+            <a:solidFill>
+              <a:srgbClr val="C00000"/>
+            </a:solidFill>
+          </a:ln>
+        </p:spPr>
+        <p:style>
+          <a:lnRef idx="2">
+            <a:schemeClr val="accent1">
+              <a:shade val="50000"/>
+            </a:schemeClr>
+          </a:lnRef>
+          <a:fillRef idx="1">
+            <a:schemeClr val="accent1"/>
+          </a:fillRef>
+          <a:effectRef idx="0">
+            <a:schemeClr val="accent1"/>
+          </a:effectRef>
+          <a:fontRef idx="minor">
+            <a:schemeClr val="lt1"/>
+          </a:fontRef>
+        </p:style>
+        <p:txBody>
+          <a:bodyPr rtlCol="0" anchor="ctr"/>
+          <a:lstStyle/>
+          <a:p>
+            <a:pPr algn="ctr"/>
+            <a:r>
+              <a:rPr lang="en-US" b="1" dirty="0">
+                <a:solidFill>
+                  <a:srgbClr val="C00000"/>
+                </a:solidFill>
+              </a:rPr>
+              <a:t>4</a:t>
             </a:r>
           </a:p>
         </p:txBody>

</xml_diff>

<commit_message>
Not sure what changed in ppt?
</commit_message>
<xml_diff>
--- a/alpolyner.pptx
+++ b/alpolyner.pptx
@@ -4003,7 +4003,7 @@
             <a:avLst/>
           </a:prstGeom>
           <a:noFill/>
-          <a:ln w="28575">
+          <a:ln w="38100">
             <a:solidFill>
               <a:schemeClr val="bg1">
                 <a:lumMod val="50000"/>
@@ -4706,7 +4706,7 @@
             <a:avLst/>
           </a:prstGeom>
           <a:noFill/>
-          <a:ln w="28575">
+          <a:ln w="38100">
             <a:solidFill>
               <a:schemeClr val="bg1">
                 <a:lumMod val="50000"/>

</xml_diff>

<commit_message>
Changes to paper after latest experiments
</commit_message>
<xml_diff>
--- a/alpolyner.pptx
+++ b/alpolyner.pptx
@@ -5,11 +5,12 @@
     <p:sldMasterId id="2147483648" r:id="rId1"/>
   </p:sldMasterIdLst>
   <p:notesMasterIdLst>
-    <p:notesMasterId r:id="rId4"/>
+    <p:notesMasterId r:id="rId5"/>
   </p:notesMasterIdLst>
   <p:sldIdLst>
     <p:sldId id="394" r:id="rId2"/>
-    <p:sldId id="395" r:id="rId3"/>
+    <p:sldId id="396" r:id="rId3"/>
+    <p:sldId id="395" r:id="rId4"/>
   </p:sldIdLst>
   <p:sldSz cx="12192000" cy="6858000"/>
   <p:notesSz cx="6858000" cy="9144000"/>
@@ -198,7 +199,7 @@
           <a:p>
             <a:fld id="{2F5CF1B8-E33B-2D4C-AE82-68295A1878F9}" type="datetimeFigureOut">
               <a:rPr lang="en-US" smtClean="0"/>
-              <a:t>3/18/19</a:t>
+              <a:t>4/5/19</a:t>
             </a:fld>
             <a:endParaRPr lang="en-US"/>
           </a:p>
@@ -612,7 +613,7 @@
           <a:p>
             <a:fld id="{368E5452-927C-804A-9893-4B0F8C82BC51}" type="datetimeFigureOut">
               <a:rPr lang="en-US" smtClean="0"/>
-              <a:t>3/18/19</a:t>
+              <a:t>4/5/19</a:t>
             </a:fld>
             <a:endParaRPr lang="en-US"/>
           </a:p>
@@ -810,7 +811,7 @@
           <a:p>
             <a:fld id="{368E5452-927C-804A-9893-4B0F8C82BC51}" type="datetimeFigureOut">
               <a:rPr lang="en-US" smtClean="0"/>
-              <a:t>3/18/19</a:t>
+              <a:t>4/5/19</a:t>
             </a:fld>
             <a:endParaRPr lang="en-US"/>
           </a:p>
@@ -1018,7 +1019,7 @@
           <a:p>
             <a:fld id="{368E5452-927C-804A-9893-4B0F8C82BC51}" type="datetimeFigureOut">
               <a:rPr lang="en-US" smtClean="0"/>
-              <a:t>3/18/19</a:t>
+              <a:t>4/5/19</a:t>
             </a:fld>
             <a:endParaRPr lang="en-US"/>
           </a:p>
@@ -1216,7 +1217,7 @@
           <a:p>
             <a:fld id="{368E5452-927C-804A-9893-4B0F8C82BC51}" type="datetimeFigureOut">
               <a:rPr lang="en-US" smtClean="0"/>
-              <a:t>3/18/19</a:t>
+              <a:t>4/5/19</a:t>
             </a:fld>
             <a:endParaRPr lang="en-US"/>
           </a:p>
@@ -1491,7 +1492,7 @@
           <a:p>
             <a:fld id="{368E5452-927C-804A-9893-4B0F8C82BC51}" type="datetimeFigureOut">
               <a:rPr lang="en-US" smtClean="0"/>
-              <a:t>3/18/19</a:t>
+              <a:t>4/5/19</a:t>
             </a:fld>
             <a:endParaRPr lang="en-US"/>
           </a:p>
@@ -1756,7 +1757,7 @@
           <a:p>
             <a:fld id="{368E5452-927C-804A-9893-4B0F8C82BC51}" type="datetimeFigureOut">
               <a:rPr lang="en-US" smtClean="0"/>
-              <a:t>3/18/19</a:t>
+              <a:t>4/5/19</a:t>
             </a:fld>
             <a:endParaRPr lang="en-US"/>
           </a:p>
@@ -2168,7 +2169,7 @@
           <a:p>
             <a:fld id="{368E5452-927C-804A-9893-4B0F8C82BC51}" type="datetimeFigureOut">
               <a:rPr lang="en-US" smtClean="0"/>
-              <a:t>3/18/19</a:t>
+              <a:t>4/5/19</a:t>
             </a:fld>
             <a:endParaRPr lang="en-US"/>
           </a:p>
@@ -2309,7 +2310,7 @@
           <a:p>
             <a:fld id="{368E5452-927C-804A-9893-4B0F8C82BC51}" type="datetimeFigureOut">
               <a:rPr lang="en-US" smtClean="0"/>
-              <a:t>3/18/19</a:t>
+              <a:t>4/5/19</a:t>
             </a:fld>
             <a:endParaRPr lang="en-US"/>
           </a:p>
@@ -2422,7 +2423,7 @@
           <a:p>
             <a:fld id="{368E5452-927C-804A-9893-4B0F8C82BC51}" type="datetimeFigureOut">
               <a:rPr lang="en-US" smtClean="0"/>
-              <a:t>3/18/19</a:t>
+              <a:t>4/5/19</a:t>
             </a:fld>
             <a:endParaRPr lang="en-US"/>
           </a:p>
@@ -2733,7 +2734,7 @@
           <a:p>
             <a:fld id="{368E5452-927C-804A-9893-4B0F8C82BC51}" type="datetimeFigureOut">
               <a:rPr lang="en-US" smtClean="0"/>
-              <a:t>3/18/19</a:t>
+              <a:t>4/5/19</a:t>
             </a:fld>
             <a:endParaRPr lang="en-US"/>
           </a:p>
@@ -3021,7 +3022,7 @@
           <a:p>
             <a:fld id="{368E5452-927C-804A-9893-4B0F8C82BC51}" type="datetimeFigureOut">
               <a:rPr lang="en-US" smtClean="0"/>
-              <a:t>3/18/19</a:t>
+              <a:t>4/5/19</a:t>
             </a:fld>
             <a:endParaRPr lang="en-US"/>
           </a:p>
@@ -3262,7 +3263,7 @@
           <a:p>
             <a:fld id="{368E5452-927C-804A-9893-4B0F8C82BC51}" type="datetimeFigureOut">
               <a:rPr lang="en-US" smtClean="0"/>
-              <a:t>3/18/19</a:t>
+              <a:t>4/5/19</a:t>
             </a:fld>
             <a:endParaRPr lang="en-US"/>
           </a:p>
@@ -6548,6 +6549,2213 @@
           <a:chExt cx="0" cy="0"/>
         </a:xfrm>
       </p:grpSpPr>
+      <p:grpSp>
+        <p:nvGrpSpPr>
+          <p:cNvPr id="10" name="Group 9">
+            <a:extLst>
+              <a:ext uri="{FF2B5EF4-FFF2-40B4-BE49-F238E27FC236}">
+                <a16:creationId xmlns:a16="http://schemas.microsoft.com/office/drawing/2014/main" id="{B0B2E614-6473-4F4B-9DBD-09AD693D0F0A}"/>
+              </a:ext>
+            </a:extLst>
+          </p:cNvPr>
+          <p:cNvGrpSpPr/>
+          <p:nvPr/>
+        </p:nvGrpSpPr>
+        <p:grpSpPr>
+          <a:xfrm>
+            <a:off x="2901825" y="250921"/>
+            <a:ext cx="1450848" cy="1138428"/>
+            <a:chOff x="2036064" y="438912"/>
+            <a:chExt cx="1450848" cy="1138428"/>
+          </a:xfrm>
+          <a:solidFill>
+            <a:schemeClr val="accent1">
+              <a:lumMod val="60000"/>
+              <a:lumOff val="40000"/>
+            </a:schemeClr>
+          </a:solidFill>
+        </p:grpSpPr>
+        <p:sp>
+          <p:nvSpPr>
+            <p:cNvPr id="4" name="Multidocument 3">
+              <a:extLst>
+                <a:ext uri="{FF2B5EF4-FFF2-40B4-BE49-F238E27FC236}">
+                  <a16:creationId xmlns:a16="http://schemas.microsoft.com/office/drawing/2014/main" id="{0B1EF7C3-A5D5-5E4C-8A94-6C13D10351C0}"/>
+                </a:ext>
+              </a:extLst>
+            </p:cNvPr>
+            <p:cNvSpPr/>
+            <p:nvPr/>
+          </p:nvSpPr>
+          <p:spPr>
+            <a:xfrm>
+              <a:off x="2426208" y="438912"/>
+              <a:ext cx="1060704" cy="758952"/>
+            </a:xfrm>
+            <a:prstGeom prst="flowChartMultidocument">
+              <a:avLst/>
+            </a:prstGeom>
+            <a:grpFill/>
+            <a:scene3d>
+              <a:camera prst="orthographicFront"/>
+              <a:lightRig rig="threePt" dir="t"/>
+            </a:scene3d>
+            <a:sp3d>
+              <a:bevelB w="152400" h="50800" prst="softRound"/>
+            </a:sp3d>
+          </p:spPr>
+          <p:style>
+            <a:lnRef idx="2">
+              <a:schemeClr val="accent1">
+                <a:shade val="50000"/>
+              </a:schemeClr>
+            </a:lnRef>
+            <a:fillRef idx="1">
+              <a:schemeClr val="accent1"/>
+            </a:fillRef>
+            <a:effectRef idx="0">
+              <a:schemeClr val="accent1"/>
+            </a:effectRef>
+            <a:fontRef idx="minor">
+              <a:schemeClr val="lt1"/>
+            </a:fontRef>
+          </p:style>
+          <p:txBody>
+            <a:bodyPr rtlCol="0" anchor="ctr"/>
+            <a:lstStyle/>
+            <a:p>
+              <a:pPr algn="ctr"/>
+              <a:endParaRPr lang="en-US"/>
+            </a:p>
+          </p:txBody>
+        </p:sp>
+        <p:sp>
+          <p:nvSpPr>
+            <p:cNvPr id="5" name="Multidocument 4">
+              <a:extLst>
+                <a:ext uri="{FF2B5EF4-FFF2-40B4-BE49-F238E27FC236}">
+                  <a16:creationId xmlns:a16="http://schemas.microsoft.com/office/drawing/2014/main" id="{1D23696E-18D7-AF4E-B728-055DC8144082}"/>
+                </a:ext>
+              </a:extLst>
+            </p:cNvPr>
+            <p:cNvSpPr/>
+            <p:nvPr/>
+          </p:nvSpPr>
+          <p:spPr>
+            <a:xfrm>
+              <a:off x="2212848" y="627888"/>
+              <a:ext cx="1060704" cy="758952"/>
+            </a:xfrm>
+            <a:prstGeom prst="flowChartMultidocument">
+              <a:avLst/>
+            </a:prstGeom>
+            <a:grpFill/>
+            <a:scene3d>
+              <a:camera prst="orthographicFront"/>
+              <a:lightRig rig="threePt" dir="t"/>
+            </a:scene3d>
+            <a:sp3d>
+              <a:bevelB w="152400" h="50800" prst="softRound"/>
+            </a:sp3d>
+          </p:spPr>
+          <p:style>
+            <a:lnRef idx="2">
+              <a:schemeClr val="accent1">
+                <a:shade val="50000"/>
+              </a:schemeClr>
+            </a:lnRef>
+            <a:fillRef idx="1">
+              <a:schemeClr val="accent1"/>
+            </a:fillRef>
+            <a:effectRef idx="0">
+              <a:schemeClr val="accent1"/>
+            </a:effectRef>
+            <a:fontRef idx="minor">
+              <a:schemeClr val="lt1"/>
+            </a:fontRef>
+          </p:style>
+          <p:txBody>
+            <a:bodyPr rtlCol="0" anchor="ctr"/>
+            <a:lstStyle/>
+            <a:p>
+              <a:pPr algn="ctr"/>
+              <a:endParaRPr lang="en-US" dirty="0"/>
+            </a:p>
+          </p:txBody>
+        </p:sp>
+        <p:sp>
+          <p:nvSpPr>
+            <p:cNvPr id="6" name="Multidocument 5">
+              <a:extLst>
+                <a:ext uri="{FF2B5EF4-FFF2-40B4-BE49-F238E27FC236}">
+                  <a16:creationId xmlns:a16="http://schemas.microsoft.com/office/drawing/2014/main" id="{E27E8947-FD13-B941-843D-BA456771EE13}"/>
+                </a:ext>
+              </a:extLst>
+            </p:cNvPr>
+            <p:cNvSpPr/>
+            <p:nvPr/>
+          </p:nvSpPr>
+          <p:spPr>
+            <a:xfrm>
+              <a:off x="2036064" y="818388"/>
+              <a:ext cx="1060704" cy="758952"/>
+            </a:xfrm>
+            <a:prstGeom prst="flowChartMultidocument">
+              <a:avLst/>
+            </a:prstGeom>
+            <a:grpFill/>
+            <a:scene3d>
+              <a:camera prst="orthographicFront"/>
+              <a:lightRig rig="threePt" dir="t"/>
+            </a:scene3d>
+            <a:sp3d>
+              <a:bevelB w="152400" h="50800" prst="softRound"/>
+            </a:sp3d>
+          </p:spPr>
+          <p:style>
+            <a:lnRef idx="2">
+              <a:schemeClr val="accent1">
+                <a:shade val="50000"/>
+              </a:schemeClr>
+            </a:lnRef>
+            <a:fillRef idx="1">
+              <a:schemeClr val="accent1"/>
+            </a:fillRef>
+            <a:effectRef idx="0">
+              <a:schemeClr val="accent1"/>
+            </a:effectRef>
+            <a:fontRef idx="minor">
+              <a:schemeClr val="lt1"/>
+            </a:fontRef>
+          </p:style>
+          <p:txBody>
+            <a:bodyPr rtlCol="0" anchor="ctr"/>
+            <a:lstStyle/>
+            <a:p>
+              <a:pPr algn="ctr"/>
+              <a:endParaRPr lang="en-US"/>
+            </a:p>
+          </p:txBody>
+        </p:sp>
+      </p:grpSp>
+      <p:sp>
+        <p:nvSpPr>
+          <p:cNvPr id="8" name="Oval 7">
+            <a:extLst>
+              <a:ext uri="{FF2B5EF4-FFF2-40B4-BE49-F238E27FC236}">
+                <a16:creationId xmlns:a16="http://schemas.microsoft.com/office/drawing/2014/main" id="{790D0A2F-9E5D-DA48-BE52-F190AD14C9B7}"/>
+              </a:ext>
+            </a:extLst>
+          </p:cNvPr>
+          <p:cNvSpPr/>
+          <p:nvPr/>
+        </p:nvSpPr>
+        <p:spPr>
+          <a:xfrm>
+            <a:off x="2459922" y="0"/>
+            <a:ext cx="5619583" cy="1743456"/>
+          </a:xfrm>
+          <a:prstGeom prst="ellipse">
+            <a:avLst/>
+          </a:prstGeom>
+          <a:noFill/>
+          <a:ln w="38100">
+            <a:solidFill>
+              <a:schemeClr val="bg1">
+                <a:lumMod val="50000"/>
+              </a:schemeClr>
+            </a:solidFill>
+            <a:prstDash val="dash"/>
+          </a:ln>
+        </p:spPr>
+        <p:style>
+          <a:lnRef idx="2">
+            <a:schemeClr val="accent1">
+              <a:shade val="50000"/>
+            </a:schemeClr>
+          </a:lnRef>
+          <a:fillRef idx="1">
+            <a:schemeClr val="accent1"/>
+          </a:fillRef>
+          <a:effectRef idx="0">
+            <a:schemeClr val="accent1"/>
+          </a:effectRef>
+          <a:fontRef idx="minor">
+            <a:schemeClr val="lt1"/>
+          </a:fontRef>
+        </p:style>
+        <p:txBody>
+          <a:bodyPr rtlCol="0" anchor="ctr"/>
+          <a:lstStyle/>
+          <a:p>
+            <a:pPr algn="ctr"/>
+            <a:endParaRPr lang="en-US"/>
+          </a:p>
+        </p:txBody>
+      </p:sp>
+      <p:sp>
+        <p:nvSpPr>
+          <p:cNvPr id="9" name="TextBox 8">
+            <a:extLst>
+              <a:ext uri="{FF2B5EF4-FFF2-40B4-BE49-F238E27FC236}">
+                <a16:creationId xmlns:a16="http://schemas.microsoft.com/office/drawing/2014/main" id="{44A9C1C1-281A-FF4D-85C5-C9B3EFA893EB}"/>
+              </a:ext>
+            </a:extLst>
+          </p:cNvPr>
+          <p:cNvSpPr txBox="1"/>
+          <p:nvPr/>
+        </p:nvSpPr>
+        <p:spPr>
+          <a:xfrm>
+            <a:off x="4389404" y="74546"/>
+            <a:ext cx="2280561" cy="369332"/>
+          </a:xfrm>
+          <a:prstGeom prst="rect">
+            <a:avLst/>
+          </a:prstGeom>
+          <a:noFill/>
+        </p:spPr>
+        <p:txBody>
+          <a:bodyPr wrap="none" rtlCol="0">
+            <a:spAutoFit/>
+          </a:bodyPr>
+          <a:lstStyle/>
+          <a:p>
+            <a:r>
+              <a:rPr lang="en-US" dirty="0"/>
+              <a:t>Corpus of publications</a:t>
+            </a:r>
+          </a:p>
+        </p:txBody>
+      </p:sp>
+      <p:sp>
+        <p:nvSpPr>
+          <p:cNvPr id="17" name="Rounded Rectangle 16">
+            <a:extLst>
+              <a:ext uri="{FF2B5EF4-FFF2-40B4-BE49-F238E27FC236}">
+                <a16:creationId xmlns:a16="http://schemas.microsoft.com/office/drawing/2014/main" id="{CB76E0A8-2E44-F04B-B0DC-ACADBE52587C}"/>
+              </a:ext>
+            </a:extLst>
+          </p:cNvPr>
+          <p:cNvSpPr/>
+          <p:nvPr/>
+        </p:nvSpPr>
+        <p:spPr>
+          <a:xfrm>
+            <a:off x="4811467" y="875374"/>
+            <a:ext cx="1438656" cy="819895"/>
+          </a:xfrm>
+          <a:prstGeom prst="roundRect">
+            <a:avLst/>
+          </a:prstGeom>
+          <a:solidFill>
+            <a:schemeClr val="bg1">
+              <a:lumMod val="85000"/>
+            </a:schemeClr>
+          </a:solidFill>
+          <a:ln>
+            <a:solidFill>
+              <a:schemeClr val="tx1">
+                <a:lumMod val="95000"/>
+                <a:lumOff val="5000"/>
+              </a:schemeClr>
+            </a:solidFill>
+          </a:ln>
+          <a:scene3d>
+            <a:camera prst="orthographicFront"/>
+            <a:lightRig rig="threePt" dir="t"/>
+          </a:scene3d>
+          <a:sp3d>
+            <a:bevelT w="165100" prst="coolSlant"/>
+            <a:bevelB/>
+          </a:sp3d>
+        </p:spPr>
+        <p:style>
+          <a:lnRef idx="2">
+            <a:schemeClr val="accent1">
+              <a:shade val="50000"/>
+            </a:schemeClr>
+          </a:lnRef>
+          <a:fillRef idx="1">
+            <a:schemeClr val="accent1"/>
+          </a:fillRef>
+          <a:effectRef idx="0">
+            <a:schemeClr val="accent1"/>
+          </a:effectRef>
+          <a:fontRef idx="minor">
+            <a:schemeClr val="lt1"/>
+          </a:fontRef>
+        </p:style>
+        <p:txBody>
+          <a:bodyPr rtlCol="0" anchor="ctr"/>
+          <a:lstStyle/>
+          <a:p>
+            <a:pPr algn="ctr"/>
+            <a:r>
+              <a:rPr lang="en-US" sz="1600" dirty="0">
+                <a:solidFill>
+                  <a:schemeClr val="tx1"/>
+                </a:solidFill>
+              </a:rPr>
+              <a:t>Word embedding model</a:t>
+            </a:r>
+          </a:p>
+        </p:txBody>
+      </p:sp>
+      <p:cxnSp>
+        <p:nvCxnSpPr>
+          <p:cNvPr id="18" name="Straight Arrow Connector 17">
+            <a:extLst>
+              <a:ext uri="{FF2B5EF4-FFF2-40B4-BE49-F238E27FC236}">
+                <a16:creationId xmlns:a16="http://schemas.microsoft.com/office/drawing/2014/main" id="{0123C889-FEAA-674A-BB34-35BB1B948A44}"/>
+              </a:ext>
+            </a:extLst>
+          </p:cNvPr>
+          <p:cNvCxnSpPr>
+            <a:cxnSpLocks/>
+            <a:stCxn id="17" idx="2"/>
+          </p:cNvCxnSpPr>
+          <p:nvPr/>
+        </p:nvCxnSpPr>
+        <p:spPr>
+          <a:xfrm>
+            <a:off x="5530795" y="1695269"/>
+            <a:ext cx="0" cy="525564"/>
+          </a:xfrm>
+          <a:prstGeom prst="straightConnector1">
+            <a:avLst/>
+          </a:prstGeom>
+          <a:ln w="38100">
+            <a:solidFill>
+              <a:schemeClr val="tx1">
+                <a:lumMod val="95000"/>
+                <a:lumOff val="5000"/>
+              </a:schemeClr>
+            </a:solidFill>
+            <a:tailEnd type="triangle"/>
+          </a:ln>
+        </p:spPr>
+        <p:style>
+          <a:lnRef idx="1">
+            <a:schemeClr val="accent1"/>
+          </a:lnRef>
+          <a:fillRef idx="0">
+            <a:schemeClr val="accent1"/>
+          </a:fillRef>
+          <a:effectRef idx="0">
+            <a:schemeClr val="accent1"/>
+          </a:effectRef>
+          <a:fontRef idx="minor">
+            <a:schemeClr val="tx1"/>
+          </a:fontRef>
+        </p:style>
+      </p:cxnSp>
+      <p:grpSp>
+        <p:nvGrpSpPr>
+          <p:cNvPr id="24" name="Group 23">
+            <a:extLst>
+              <a:ext uri="{FF2B5EF4-FFF2-40B4-BE49-F238E27FC236}">
+                <a16:creationId xmlns:a16="http://schemas.microsoft.com/office/drawing/2014/main" id="{05974B08-B944-D14E-B02D-50D623068DDA}"/>
+              </a:ext>
+            </a:extLst>
+          </p:cNvPr>
+          <p:cNvGrpSpPr/>
+          <p:nvPr/>
+        </p:nvGrpSpPr>
+        <p:grpSpPr>
+          <a:xfrm>
+            <a:off x="4976803" y="3009365"/>
+            <a:ext cx="1036926" cy="583692"/>
+            <a:chOff x="1809906" y="3159252"/>
+            <a:chExt cx="1036926" cy="583692"/>
+          </a:xfrm>
+        </p:grpSpPr>
+        <p:sp>
+          <p:nvSpPr>
+            <p:cNvPr id="20" name="Rectangle 19">
+              <a:extLst>
+                <a:ext uri="{FF2B5EF4-FFF2-40B4-BE49-F238E27FC236}">
+                  <a16:creationId xmlns:a16="http://schemas.microsoft.com/office/drawing/2014/main" id="{FFE8CAED-CEB2-174B-A073-C12F28FB5767}"/>
+                </a:ext>
+              </a:extLst>
+            </p:cNvPr>
+            <p:cNvSpPr/>
+            <p:nvPr/>
+          </p:nvSpPr>
+          <p:spPr>
+            <a:xfrm>
+              <a:off x="1809906" y="3159252"/>
+              <a:ext cx="652878" cy="280416"/>
+            </a:xfrm>
+            <a:prstGeom prst="rect">
+              <a:avLst/>
+            </a:prstGeom>
+            <a:solidFill>
+              <a:schemeClr val="bg1">
+                <a:lumMod val="75000"/>
+              </a:schemeClr>
+            </a:solidFill>
+            <a:ln>
+              <a:solidFill>
+                <a:schemeClr val="bg1">
+                  <a:lumMod val="50000"/>
+                </a:schemeClr>
+              </a:solidFill>
+            </a:ln>
+            <a:scene3d>
+              <a:camera prst="orthographicFront"/>
+              <a:lightRig rig="threePt" dir="t"/>
+            </a:scene3d>
+            <a:sp3d>
+              <a:bevelT/>
+              <a:bevelB/>
+            </a:sp3d>
+          </p:spPr>
+          <p:style>
+            <a:lnRef idx="2">
+              <a:schemeClr val="accent1">
+                <a:shade val="50000"/>
+              </a:schemeClr>
+            </a:lnRef>
+            <a:fillRef idx="1">
+              <a:schemeClr val="accent1"/>
+            </a:fillRef>
+            <a:effectRef idx="0">
+              <a:schemeClr val="accent1"/>
+            </a:effectRef>
+            <a:fontRef idx="minor">
+              <a:schemeClr val="lt1"/>
+            </a:fontRef>
+          </p:style>
+          <p:txBody>
+            <a:bodyPr rtlCol="0" anchor="ctr"/>
+            <a:lstStyle/>
+            <a:p>
+              <a:pPr algn="ctr"/>
+              <a:r>
+                <a:rPr lang="en-US" sz="1200" dirty="0"/>
+                <a:t>poly(x)</a:t>
+              </a:r>
+            </a:p>
+          </p:txBody>
+        </p:sp>
+        <p:sp>
+          <p:nvSpPr>
+            <p:cNvPr id="19" name="Rectangle 18">
+              <a:extLst>
+                <a:ext uri="{FF2B5EF4-FFF2-40B4-BE49-F238E27FC236}">
+                  <a16:creationId xmlns:a16="http://schemas.microsoft.com/office/drawing/2014/main" id="{0C6EC0C4-9C22-1143-8B57-D5863C2A3BF8}"/>
+                </a:ext>
+              </a:extLst>
+            </p:cNvPr>
+            <p:cNvSpPr/>
+            <p:nvPr/>
+          </p:nvSpPr>
+          <p:spPr>
+            <a:xfrm>
+              <a:off x="1901346" y="3228975"/>
+              <a:ext cx="652878" cy="280416"/>
+            </a:xfrm>
+            <a:prstGeom prst="rect">
+              <a:avLst/>
+            </a:prstGeom>
+            <a:solidFill>
+              <a:schemeClr val="accent2">
+                <a:lumMod val="60000"/>
+                <a:lumOff val="40000"/>
+              </a:schemeClr>
+            </a:solidFill>
+            <a:ln>
+              <a:solidFill>
+                <a:schemeClr val="accent2">
+                  <a:lumMod val="50000"/>
+                </a:schemeClr>
+              </a:solidFill>
+            </a:ln>
+            <a:scene3d>
+              <a:camera prst="orthographicFront"/>
+              <a:lightRig rig="threePt" dir="t"/>
+            </a:scene3d>
+            <a:sp3d>
+              <a:bevelT/>
+              <a:bevelB/>
+            </a:sp3d>
+          </p:spPr>
+          <p:style>
+            <a:lnRef idx="2">
+              <a:schemeClr val="accent1">
+                <a:shade val="50000"/>
+              </a:schemeClr>
+            </a:lnRef>
+            <a:fillRef idx="1">
+              <a:schemeClr val="accent1"/>
+            </a:fillRef>
+            <a:effectRef idx="0">
+              <a:schemeClr val="accent1"/>
+            </a:effectRef>
+            <a:fontRef idx="minor">
+              <a:schemeClr val="lt1"/>
+            </a:fontRef>
+          </p:style>
+          <p:txBody>
+            <a:bodyPr rtlCol="0" anchor="ctr"/>
+            <a:lstStyle/>
+            <a:p>
+              <a:pPr algn="ctr"/>
+              <a:r>
+                <a:rPr lang="en-US" sz="1200" dirty="0"/>
+                <a:t>poly(x)</a:t>
+              </a:r>
+            </a:p>
+          </p:txBody>
+        </p:sp>
+        <p:sp>
+          <p:nvSpPr>
+            <p:cNvPr id="21" name="Rectangle 20">
+              <a:extLst>
+                <a:ext uri="{FF2B5EF4-FFF2-40B4-BE49-F238E27FC236}">
+                  <a16:creationId xmlns:a16="http://schemas.microsoft.com/office/drawing/2014/main" id="{0365E68C-9844-B046-8FB0-8B4F80C827DF}"/>
+                </a:ext>
+              </a:extLst>
+            </p:cNvPr>
+            <p:cNvSpPr/>
+            <p:nvPr/>
+          </p:nvSpPr>
+          <p:spPr>
+            <a:xfrm>
+              <a:off x="1989738" y="3298698"/>
+              <a:ext cx="652878" cy="280416"/>
+            </a:xfrm>
+            <a:prstGeom prst="rect">
+              <a:avLst/>
+            </a:prstGeom>
+            <a:solidFill>
+              <a:schemeClr val="bg1">
+                <a:lumMod val="75000"/>
+              </a:schemeClr>
+            </a:solidFill>
+            <a:ln>
+              <a:solidFill>
+                <a:schemeClr val="bg1">
+                  <a:lumMod val="50000"/>
+                </a:schemeClr>
+              </a:solidFill>
+            </a:ln>
+            <a:scene3d>
+              <a:camera prst="orthographicFront"/>
+              <a:lightRig rig="threePt" dir="t"/>
+            </a:scene3d>
+            <a:sp3d>
+              <a:bevelT/>
+              <a:bevelB/>
+            </a:sp3d>
+          </p:spPr>
+          <p:style>
+            <a:lnRef idx="2">
+              <a:schemeClr val="accent1">
+                <a:shade val="50000"/>
+              </a:schemeClr>
+            </a:lnRef>
+            <a:fillRef idx="1">
+              <a:schemeClr val="accent1"/>
+            </a:fillRef>
+            <a:effectRef idx="0">
+              <a:schemeClr val="accent1"/>
+            </a:effectRef>
+            <a:fontRef idx="minor">
+              <a:schemeClr val="lt1"/>
+            </a:fontRef>
+          </p:style>
+          <p:txBody>
+            <a:bodyPr rtlCol="0" anchor="ctr"/>
+            <a:lstStyle/>
+            <a:p>
+              <a:pPr algn="ctr"/>
+              <a:r>
+                <a:rPr lang="en-US" sz="1200" dirty="0"/>
+                <a:t>poly(x)</a:t>
+              </a:r>
+            </a:p>
+          </p:txBody>
+        </p:sp>
+        <p:sp>
+          <p:nvSpPr>
+            <p:cNvPr id="22" name="Rectangle 21">
+              <a:extLst>
+                <a:ext uri="{FF2B5EF4-FFF2-40B4-BE49-F238E27FC236}">
+                  <a16:creationId xmlns:a16="http://schemas.microsoft.com/office/drawing/2014/main" id="{4129E4B7-7F98-D042-9277-A1C78008DB71}"/>
+                </a:ext>
+              </a:extLst>
+            </p:cNvPr>
+            <p:cNvSpPr/>
+            <p:nvPr/>
+          </p:nvSpPr>
+          <p:spPr>
+            <a:xfrm>
+              <a:off x="2081178" y="3380613"/>
+              <a:ext cx="652878" cy="280416"/>
+            </a:xfrm>
+            <a:prstGeom prst="rect">
+              <a:avLst/>
+            </a:prstGeom>
+            <a:solidFill>
+              <a:schemeClr val="accent2">
+                <a:lumMod val="60000"/>
+                <a:lumOff val="40000"/>
+              </a:schemeClr>
+            </a:solidFill>
+            <a:ln>
+              <a:solidFill>
+                <a:schemeClr val="accent2">
+                  <a:lumMod val="50000"/>
+                </a:schemeClr>
+              </a:solidFill>
+            </a:ln>
+            <a:scene3d>
+              <a:camera prst="orthographicFront"/>
+              <a:lightRig rig="threePt" dir="t"/>
+            </a:scene3d>
+            <a:sp3d>
+              <a:bevelT/>
+              <a:bevelB/>
+            </a:sp3d>
+          </p:spPr>
+          <p:style>
+            <a:lnRef idx="2">
+              <a:schemeClr val="accent1">
+                <a:shade val="50000"/>
+              </a:schemeClr>
+            </a:lnRef>
+            <a:fillRef idx="1">
+              <a:schemeClr val="accent1"/>
+            </a:fillRef>
+            <a:effectRef idx="0">
+              <a:schemeClr val="accent1"/>
+            </a:effectRef>
+            <a:fontRef idx="minor">
+              <a:schemeClr val="lt1"/>
+            </a:fontRef>
+          </p:style>
+          <p:txBody>
+            <a:bodyPr rtlCol="0" anchor="ctr"/>
+            <a:lstStyle/>
+            <a:p>
+              <a:pPr algn="ctr"/>
+              <a:r>
+                <a:rPr lang="en-US" sz="1200" dirty="0"/>
+                <a:t>poly(x)</a:t>
+              </a:r>
+            </a:p>
+          </p:txBody>
+        </p:sp>
+        <p:sp>
+          <p:nvSpPr>
+            <p:cNvPr id="23" name="Rectangle 22">
+              <a:extLst>
+                <a:ext uri="{FF2B5EF4-FFF2-40B4-BE49-F238E27FC236}">
+                  <a16:creationId xmlns:a16="http://schemas.microsoft.com/office/drawing/2014/main" id="{58AB85DA-1BD5-C24C-9DE0-CD415E928B55}"/>
+                </a:ext>
+              </a:extLst>
+            </p:cNvPr>
+            <p:cNvSpPr/>
+            <p:nvPr/>
+          </p:nvSpPr>
+          <p:spPr>
+            <a:xfrm>
+              <a:off x="2193954" y="3462528"/>
+              <a:ext cx="652878" cy="280416"/>
+            </a:xfrm>
+            <a:prstGeom prst="rect">
+              <a:avLst/>
+            </a:prstGeom>
+            <a:solidFill>
+              <a:schemeClr val="accent2">
+                <a:lumMod val="60000"/>
+                <a:lumOff val="40000"/>
+              </a:schemeClr>
+            </a:solidFill>
+            <a:ln>
+              <a:solidFill>
+                <a:schemeClr val="accent2">
+                  <a:lumMod val="50000"/>
+                </a:schemeClr>
+              </a:solidFill>
+            </a:ln>
+            <a:scene3d>
+              <a:camera prst="orthographicFront"/>
+              <a:lightRig rig="threePt" dir="t"/>
+            </a:scene3d>
+            <a:sp3d>
+              <a:bevelT/>
+              <a:bevelB/>
+            </a:sp3d>
+          </p:spPr>
+          <p:style>
+            <a:lnRef idx="2">
+              <a:schemeClr val="accent1">
+                <a:shade val="50000"/>
+              </a:schemeClr>
+            </a:lnRef>
+            <a:fillRef idx="1">
+              <a:schemeClr val="accent1"/>
+            </a:fillRef>
+            <a:effectRef idx="0">
+              <a:schemeClr val="accent1"/>
+            </a:effectRef>
+            <a:fontRef idx="minor">
+              <a:schemeClr val="lt1"/>
+            </a:fontRef>
+          </p:style>
+          <p:txBody>
+            <a:bodyPr rtlCol="0" anchor="ctr"/>
+            <a:lstStyle/>
+            <a:p>
+              <a:pPr algn="ctr"/>
+              <a:r>
+                <a:rPr lang="en-US" sz="1400" dirty="0"/>
+                <a:t>target</a:t>
+              </a:r>
+            </a:p>
+          </p:txBody>
+        </p:sp>
+      </p:grpSp>
+      <p:sp>
+        <p:nvSpPr>
+          <p:cNvPr id="27" name="TextBox 26">
+            <a:extLst>
+              <a:ext uri="{FF2B5EF4-FFF2-40B4-BE49-F238E27FC236}">
+                <a16:creationId xmlns:a16="http://schemas.microsoft.com/office/drawing/2014/main" id="{5771DAA2-6A90-D54A-A654-DDCC886E327D}"/>
+              </a:ext>
+            </a:extLst>
+          </p:cNvPr>
+          <p:cNvSpPr txBox="1"/>
+          <p:nvPr/>
+        </p:nvSpPr>
+        <p:spPr>
+          <a:xfrm>
+            <a:off x="4975379" y="2268337"/>
+            <a:ext cx="1168974" cy="584775"/>
+          </a:xfrm>
+          <a:prstGeom prst="rect">
+            <a:avLst/>
+          </a:prstGeom>
+          <a:noFill/>
+        </p:spPr>
+        <p:txBody>
+          <a:bodyPr wrap="none" rtlCol="0">
+            <a:spAutoFit/>
+          </a:bodyPr>
+          <a:lstStyle/>
+          <a:p>
+            <a:r>
+              <a:rPr lang="en-US" sz="1600" dirty="0"/>
+              <a:t>NLP-filtered</a:t>
+            </a:r>
+          </a:p>
+          <a:p>
+            <a:r>
+              <a:rPr lang="en-US" sz="1600" dirty="0"/>
+              <a:t>candidates</a:t>
+            </a:r>
+          </a:p>
+        </p:txBody>
+      </p:sp>
+      <p:sp>
+        <p:nvSpPr>
+          <p:cNvPr id="29" name="Rounded Rectangle 28">
+            <a:extLst>
+              <a:ext uri="{FF2B5EF4-FFF2-40B4-BE49-F238E27FC236}">
+                <a16:creationId xmlns:a16="http://schemas.microsoft.com/office/drawing/2014/main" id="{E2DC92DC-CF26-AB43-8AFD-7E0E729B23D0}"/>
+              </a:ext>
+            </a:extLst>
+          </p:cNvPr>
+          <p:cNvSpPr/>
+          <p:nvPr/>
+        </p:nvSpPr>
+        <p:spPr>
+          <a:xfrm>
+            <a:off x="4649171" y="4246215"/>
+            <a:ext cx="1672037" cy="347472"/>
+          </a:xfrm>
+          <a:prstGeom prst="roundRect">
+            <a:avLst/>
+          </a:prstGeom>
+          <a:solidFill>
+            <a:schemeClr val="bg1">
+              <a:lumMod val="85000"/>
+            </a:schemeClr>
+          </a:solidFill>
+          <a:ln>
+            <a:solidFill>
+              <a:schemeClr val="tx1">
+                <a:lumMod val="95000"/>
+                <a:lumOff val="5000"/>
+              </a:schemeClr>
+            </a:solidFill>
+          </a:ln>
+          <a:scene3d>
+            <a:camera prst="orthographicFront"/>
+            <a:lightRig rig="threePt" dir="t"/>
+          </a:scene3d>
+          <a:sp3d>
+            <a:bevelT w="165100" prst="coolSlant"/>
+            <a:bevelB/>
+          </a:sp3d>
+        </p:spPr>
+        <p:style>
+          <a:lnRef idx="2">
+            <a:schemeClr val="accent1">
+              <a:shade val="50000"/>
+            </a:schemeClr>
+          </a:lnRef>
+          <a:fillRef idx="1">
+            <a:schemeClr val="accent1"/>
+          </a:fillRef>
+          <a:effectRef idx="0">
+            <a:schemeClr val="accent1"/>
+          </a:effectRef>
+          <a:fontRef idx="minor">
+            <a:schemeClr val="lt1"/>
+          </a:fontRef>
+        </p:style>
+        <p:txBody>
+          <a:bodyPr rtlCol="0" anchor="ctr"/>
+          <a:lstStyle/>
+          <a:p>
+            <a:pPr algn="ctr"/>
+            <a:r>
+              <a:rPr lang="en-US" sz="1400" dirty="0">
+                <a:solidFill>
+                  <a:schemeClr val="tx1"/>
+                </a:solidFill>
+              </a:rPr>
+              <a:t>Classifier</a:t>
+            </a:r>
+          </a:p>
+        </p:txBody>
+      </p:sp>
+      <p:sp>
+        <p:nvSpPr>
+          <p:cNvPr id="40" name="TextBox 39">
+            <a:extLst>
+              <a:ext uri="{FF2B5EF4-FFF2-40B4-BE49-F238E27FC236}">
+                <a16:creationId xmlns:a16="http://schemas.microsoft.com/office/drawing/2014/main" id="{6BB7345A-13C0-AD43-B757-3951C5580808}"/>
+              </a:ext>
+            </a:extLst>
+          </p:cNvPr>
+          <p:cNvSpPr txBox="1"/>
+          <p:nvPr/>
+        </p:nvSpPr>
+        <p:spPr>
+          <a:xfrm>
+            <a:off x="2447386" y="4073458"/>
+            <a:ext cx="1578892" cy="830997"/>
+          </a:xfrm>
+          <a:prstGeom prst="rect">
+            <a:avLst/>
+          </a:prstGeom>
+          <a:noFill/>
+        </p:spPr>
+        <p:txBody>
+          <a:bodyPr wrap="square" rtlCol="0">
+            <a:spAutoFit/>
+          </a:bodyPr>
+          <a:lstStyle/>
+          <a:p>
+            <a:r>
+              <a:rPr lang="en-US" sz="1600" dirty="0"/>
+              <a:t>Save classifier </a:t>
+            </a:r>
+          </a:p>
+          <a:p>
+            <a:r>
+              <a:rPr lang="en-US" sz="1600" dirty="0"/>
+              <a:t>for uncertainty sampling</a:t>
+            </a:r>
+          </a:p>
+        </p:txBody>
+      </p:sp>
+      <p:cxnSp>
+        <p:nvCxnSpPr>
+          <p:cNvPr id="49" name="Elbow Connector 48">
+            <a:extLst>
+              <a:ext uri="{FF2B5EF4-FFF2-40B4-BE49-F238E27FC236}">
+                <a16:creationId xmlns:a16="http://schemas.microsoft.com/office/drawing/2014/main" id="{4DDA2FC5-3C85-EC4D-A098-28453E04189B}"/>
+              </a:ext>
+            </a:extLst>
+          </p:cNvPr>
+          <p:cNvCxnSpPr>
+            <a:cxnSpLocks/>
+            <a:stCxn id="29" idx="2"/>
+          </p:cNvCxnSpPr>
+          <p:nvPr/>
+        </p:nvCxnSpPr>
+        <p:spPr>
+          <a:xfrm rot="16200000" flipH="1">
+            <a:off x="6257514" y="3821363"/>
+            <a:ext cx="64012" cy="1608660"/>
+          </a:xfrm>
+          <a:prstGeom prst="bentConnector3">
+            <a:avLst>
+              <a:gd name="adj1" fmla="val 457121"/>
+            </a:avLst>
+          </a:prstGeom>
+          <a:ln w="38100">
+            <a:solidFill>
+              <a:schemeClr val="tx1"/>
+            </a:solidFill>
+            <a:tailEnd type="triangle"/>
+          </a:ln>
+        </p:spPr>
+        <p:style>
+          <a:lnRef idx="1">
+            <a:schemeClr val="accent1"/>
+          </a:lnRef>
+          <a:fillRef idx="0">
+            <a:schemeClr val="accent1"/>
+          </a:fillRef>
+          <a:effectRef idx="0">
+            <a:schemeClr val="accent1"/>
+          </a:effectRef>
+          <a:fontRef idx="minor">
+            <a:schemeClr val="tx1"/>
+          </a:fontRef>
+        </p:style>
+      </p:cxnSp>
+      <p:cxnSp>
+        <p:nvCxnSpPr>
+          <p:cNvPr id="51" name="Straight Arrow Connector 50">
+            <a:extLst>
+              <a:ext uri="{FF2B5EF4-FFF2-40B4-BE49-F238E27FC236}">
+                <a16:creationId xmlns:a16="http://schemas.microsoft.com/office/drawing/2014/main" id="{887BAC2F-F56C-414D-A5DF-15551A0341F4}"/>
+              </a:ext>
+            </a:extLst>
+          </p:cNvPr>
+          <p:cNvCxnSpPr>
+            <a:cxnSpLocks/>
+          </p:cNvCxnSpPr>
+          <p:nvPr/>
+        </p:nvCxnSpPr>
+        <p:spPr>
+          <a:xfrm>
+            <a:off x="7113878" y="1184796"/>
+            <a:ext cx="0" cy="2106330"/>
+          </a:xfrm>
+          <a:prstGeom prst="straightConnector1">
+            <a:avLst/>
+          </a:prstGeom>
+          <a:ln w="38100">
+            <a:solidFill>
+              <a:schemeClr val="tx1"/>
+            </a:solidFill>
+            <a:tailEnd type="triangle"/>
+          </a:ln>
+        </p:spPr>
+        <p:style>
+          <a:lnRef idx="1">
+            <a:schemeClr val="accent1"/>
+          </a:lnRef>
+          <a:fillRef idx="0">
+            <a:schemeClr val="accent1"/>
+          </a:fillRef>
+          <a:effectRef idx="0">
+            <a:schemeClr val="accent1"/>
+          </a:effectRef>
+          <a:fontRef idx="minor">
+            <a:schemeClr val="tx1"/>
+          </a:fontRef>
+        </p:style>
+      </p:cxnSp>
+      <p:sp>
+        <p:nvSpPr>
+          <p:cNvPr id="58" name="TextBox 57">
+            <a:extLst>
+              <a:ext uri="{FF2B5EF4-FFF2-40B4-BE49-F238E27FC236}">
+                <a16:creationId xmlns:a16="http://schemas.microsoft.com/office/drawing/2014/main" id="{DD80A82B-216C-7445-838A-2A7DA03DEA0F}"/>
+              </a:ext>
+            </a:extLst>
+          </p:cNvPr>
+          <p:cNvSpPr txBox="1"/>
+          <p:nvPr/>
+        </p:nvSpPr>
+        <p:spPr>
+          <a:xfrm>
+            <a:off x="6539471" y="3353562"/>
+            <a:ext cx="1168974" cy="584775"/>
+          </a:xfrm>
+          <a:prstGeom prst="rect">
+            <a:avLst/>
+          </a:prstGeom>
+          <a:noFill/>
+        </p:spPr>
+        <p:txBody>
+          <a:bodyPr wrap="none" rtlCol="0">
+            <a:spAutoFit/>
+          </a:bodyPr>
+          <a:lstStyle/>
+          <a:p>
+            <a:r>
+              <a:rPr lang="en-US" sz="1600" dirty="0"/>
+              <a:t>NLP-filtered</a:t>
+            </a:r>
+          </a:p>
+          <a:p>
+            <a:r>
+              <a:rPr lang="en-US" sz="1600" dirty="0"/>
+              <a:t>candidates</a:t>
+            </a:r>
+          </a:p>
+        </p:txBody>
+      </p:sp>
+      <p:grpSp>
+        <p:nvGrpSpPr>
+          <p:cNvPr id="12" name="Group 11">
+            <a:extLst>
+              <a:ext uri="{FF2B5EF4-FFF2-40B4-BE49-F238E27FC236}">
+                <a16:creationId xmlns:a16="http://schemas.microsoft.com/office/drawing/2014/main" id="{90DACDB3-4D11-0549-9432-C6174A587E05}"/>
+              </a:ext>
+            </a:extLst>
+          </p:cNvPr>
+          <p:cNvGrpSpPr/>
+          <p:nvPr/>
+        </p:nvGrpSpPr>
+        <p:grpSpPr>
+          <a:xfrm>
+            <a:off x="6633710" y="466738"/>
+            <a:ext cx="1087366" cy="758952"/>
+            <a:chOff x="7888994" y="627888"/>
+            <a:chExt cx="1087366" cy="758952"/>
+          </a:xfrm>
+        </p:grpSpPr>
+        <p:sp>
+          <p:nvSpPr>
+            <p:cNvPr id="7" name="Multidocument 6">
+              <a:extLst>
+                <a:ext uri="{FF2B5EF4-FFF2-40B4-BE49-F238E27FC236}">
+                  <a16:creationId xmlns:a16="http://schemas.microsoft.com/office/drawing/2014/main" id="{4EE15282-3E1A-924B-A883-6ED9A54C9B52}"/>
+                </a:ext>
+              </a:extLst>
+            </p:cNvPr>
+            <p:cNvSpPr/>
+            <p:nvPr/>
+          </p:nvSpPr>
+          <p:spPr>
+            <a:xfrm>
+              <a:off x="7915656" y="627888"/>
+              <a:ext cx="1060704" cy="758952"/>
+            </a:xfrm>
+            <a:prstGeom prst="flowChartMultidocument">
+              <a:avLst/>
+            </a:prstGeom>
+            <a:solidFill>
+              <a:schemeClr val="accent6">
+                <a:lumMod val="60000"/>
+                <a:lumOff val="40000"/>
+              </a:schemeClr>
+            </a:solidFill>
+            <a:ln>
+              <a:solidFill>
+                <a:schemeClr val="accent6">
+                  <a:lumMod val="50000"/>
+                </a:schemeClr>
+              </a:solidFill>
+            </a:ln>
+            <a:scene3d>
+              <a:camera prst="orthographicFront"/>
+              <a:lightRig rig="threePt" dir="t"/>
+            </a:scene3d>
+            <a:sp3d>
+              <a:bevelB w="152400" h="50800" prst="softRound"/>
+            </a:sp3d>
+          </p:spPr>
+          <p:style>
+            <a:lnRef idx="2">
+              <a:schemeClr val="accent1">
+                <a:shade val="50000"/>
+              </a:schemeClr>
+            </a:lnRef>
+            <a:fillRef idx="1">
+              <a:schemeClr val="accent1"/>
+            </a:fillRef>
+            <a:effectRef idx="0">
+              <a:schemeClr val="accent1"/>
+            </a:effectRef>
+            <a:fontRef idx="minor">
+              <a:schemeClr val="lt1"/>
+            </a:fontRef>
+          </p:style>
+          <p:txBody>
+            <a:bodyPr rtlCol="0" anchor="ctr"/>
+            <a:lstStyle/>
+            <a:p>
+              <a:pPr algn="ctr"/>
+              <a:endParaRPr lang="en-US"/>
+            </a:p>
+          </p:txBody>
+        </p:sp>
+        <p:sp>
+          <p:nvSpPr>
+            <p:cNvPr id="47" name="TextBox 46">
+              <a:extLst>
+                <a:ext uri="{FF2B5EF4-FFF2-40B4-BE49-F238E27FC236}">
+                  <a16:creationId xmlns:a16="http://schemas.microsoft.com/office/drawing/2014/main" id="{492ACD03-1BF7-2A43-9816-4CA6DF4463A1}"/>
+                </a:ext>
+              </a:extLst>
+            </p:cNvPr>
+            <p:cNvSpPr txBox="1"/>
+            <p:nvPr/>
+          </p:nvSpPr>
+          <p:spPr>
+            <a:xfrm>
+              <a:off x="7888994" y="786326"/>
+              <a:ext cx="1013354" cy="523220"/>
+            </a:xfrm>
+            <a:prstGeom prst="rect">
+              <a:avLst/>
+            </a:prstGeom>
+            <a:noFill/>
+          </p:spPr>
+          <p:txBody>
+            <a:bodyPr wrap="none" rtlCol="0">
+              <a:spAutoFit/>
+            </a:bodyPr>
+            <a:lstStyle/>
+            <a:p>
+              <a:pPr algn="ctr"/>
+              <a:r>
+                <a:rPr lang="en-US" sz="1400" b="1" dirty="0"/>
+                <a:t>Test </a:t>
+              </a:r>
+            </a:p>
+            <a:p>
+              <a:r>
+                <a:rPr lang="en-US" sz="1400" b="1" dirty="0"/>
+                <a:t>documents</a:t>
+              </a:r>
+            </a:p>
+          </p:txBody>
+        </p:sp>
+      </p:grpSp>
+      <p:grpSp>
+        <p:nvGrpSpPr>
+          <p:cNvPr id="48" name="Group 47">
+            <a:extLst>
+              <a:ext uri="{FF2B5EF4-FFF2-40B4-BE49-F238E27FC236}">
+                <a16:creationId xmlns:a16="http://schemas.microsoft.com/office/drawing/2014/main" id="{A02D6BA1-C699-1448-9F43-B00B7381A252}"/>
+              </a:ext>
+            </a:extLst>
+          </p:cNvPr>
+          <p:cNvGrpSpPr/>
+          <p:nvPr/>
+        </p:nvGrpSpPr>
+        <p:grpSpPr>
+          <a:xfrm>
+            <a:off x="6744775" y="3994495"/>
+            <a:ext cx="1036926" cy="583692"/>
+            <a:chOff x="1809906" y="3159252"/>
+            <a:chExt cx="1036926" cy="583692"/>
+          </a:xfrm>
+        </p:grpSpPr>
+        <p:sp>
+          <p:nvSpPr>
+            <p:cNvPr id="50" name="Rectangle 49">
+              <a:extLst>
+                <a:ext uri="{FF2B5EF4-FFF2-40B4-BE49-F238E27FC236}">
+                  <a16:creationId xmlns:a16="http://schemas.microsoft.com/office/drawing/2014/main" id="{F8FC6F63-B8EA-494D-AC91-3B7D216758D3}"/>
+                </a:ext>
+              </a:extLst>
+            </p:cNvPr>
+            <p:cNvSpPr/>
+            <p:nvPr/>
+          </p:nvSpPr>
+          <p:spPr>
+            <a:xfrm>
+              <a:off x="1809906" y="3159252"/>
+              <a:ext cx="652878" cy="280416"/>
+            </a:xfrm>
+            <a:prstGeom prst="rect">
+              <a:avLst/>
+            </a:prstGeom>
+            <a:solidFill>
+              <a:schemeClr val="bg1">
+                <a:lumMod val="75000"/>
+              </a:schemeClr>
+            </a:solidFill>
+            <a:ln>
+              <a:solidFill>
+                <a:schemeClr val="bg1">
+                  <a:lumMod val="50000"/>
+                </a:schemeClr>
+              </a:solidFill>
+            </a:ln>
+            <a:scene3d>
+              <a:camera prst="orthographicFront"/>
+              <a:lightRig rig="threePt" dir="t"/>
+            </a:scene3d>
+            <a:sp3d>
+              <a:bevelT/>
+              <a:bevelB/>
+            </a:sp3d>
+          </p:spPr>
+          <p:style>
+            <a:lnRef idx="2">
+              <a:schemeClr val="accent1">
+                <a:shade val="50000"/>
+              </a:schemeClr>
+            </a:lnRef>
+            <a:fillRef idx="1">
+              <a:schemeClr val="accent1"/>
+            </a:fillRef>
+            <a:effectRef idx="0">
+              <a:schemeClr val="accent1"/>
+            </a:effectRef>
+            <a:fontRef idx="minor">
+              <a:schemeClr val="lt1"/>
+            </a:fontRef>
+          </p:style>
+          <p:txBody>
+            <a:bodyPr rtlCol="0" anchor="ctr"/>
+            <a:lstStyle/>
+            <a:p>
+              <a:pPr algn="ctr"/>
+              <a:r>
+                <a:rPr lang="en-US" sz="1200" dirty="0"/>
+                <a:t>poly(x)</a:t>
+              </a:r>
+            </a:p>
+          </p:txBody>
+        </p:sp>
+        <p:sp>
+          <p:nvSpPr>
+            <p:cNvPr id="59" name="Rectangle 58">
+              <a:extLst>
+                <a:ext uri="{FF2B5EF4-FFF2-40B4-BE49-F238E27FC236}">
+                  <a16:creationId xmlns:a16="http://schemas.microsoft.com/office/drawing/2014/main" id="{842DD6EA-0764-1042-A978-222C3236C17F}"/>
+                </a:ext>
+              </a:extLst>
+            </p:cNvPr>
+            <p:cNvSpPr/>
+            <p:nvPr/>
+          </p:nvSpPr>
+          <p:spPr>
+            <a:xfrm>
+              <a:off x="1901346" y="3228975"/>
+              <a:ext cx="652878" cy="280416"/>
+            </a:xfrm>
+            <a:prstGeom prst="rect">
+              <a:avLst/>
+            </a:prstGeom>
+            <a:solidFill>
+              <a:schemeClr val="accent2">
+                <a:lumMod val="60000"/>
+                <a:lumOff val="40000"/>
+              </a:schemeClr>
+            </a:solidFill>
+            <a:ln>
+              <a:solidFill>
+                <a:schemeClr val="accent2">
+                  <a:lumMod val="50000"/>
+                </a:schemeClr>
+              </a:solidFill>
+            </a:ln>
+            <a:scene3d>
+              <a:camera prst="orthographicFront"/>
+              <a:lightRig rig="threePt" dir="t"/>
+            </a:scene3d>
+            <a:sp3d>
+              <a:bevelT/>
+              <a:bevelB/>
+            </a:sp3d>
+          </p:spPr>
+          <p:style>
+            <a:lnRef idx="2">
+              <a:schemeClr val="accent1">
+                <a:shade val="50000"/>
+              </a:schemeClr>
+            </a:lnRef>
+            <a:fillRef idx="1">
+              <a:schemeClr val="accent1"/>
+            </a:fillRef>
+            <a:effectRef idx="0">
+              <a:schemeClr val="accent1"/>
+            </a:effectRef>
+            <a:fontRef idx="minor">
+              <a:schemeClr val="lt1"/>
+            </a:fontRef>
+          </p:style>
+          <p:txBody>
+            <a:bodyPr rtlCol="0" anchor="ctr"/>
+            <a:lstStyle/>
+            <a:p>
+              <a:pPr algn="ctr"/>
+              <a:r>
+                <a:rPr lang="en-US" sz="1200" dirty="0"/>
+                <a:t>poly(x)</a:t>
+              </a:r>
+            </a:p>
+          </p:txBody>
+        </p:sp>
+        <p:sp>
+          <p:nvSpPr>
+            <p:cNvPr id="60" name="Rectangle 59">
+              <a:extLst>
+                <a:ext uri="{FF2B5EF4-FFF2-40B4-BE49-F238E27FC236}">
+                  <a16:creationId xmlns:a16="http://schemas.microsoft.com/office/drawing/2014/main" id="{520F9B0B-DE86-AE44-8F34-246D841635E0}"/>
+                </a:ext>
+              </a:extLst>
+            </p:cNvPr>
+            <p:cNvSpPr/>
+            <p:nvPr/>
+          </p:nvSpPr>
+          <p:spPr>
+            <a:xfrm>
+              <a:off x="1989738" y="3298698"/>
+              <a:ext cx="652878" cy="280416"/>
+            </a:xfrm>
+            <a:prstGeom prst="rect">
+              <a:avLst/>
+            </a:prstGeom>
+            <a:solidFill>
+              <a:schemeClr val="bg1">
+                <a:lumMod val="75000"/>
+              </a:schemeClr>
+            </a:solidFill>
+            <a:ln>
+              <a:solidFill>
+                <a:schemeClr val="bg1">
+                  <a:lumMod val="50000"/>
+                </a:schemeClr>
+              </a:solidFill>
+            </a:ln>
+            <a:scene3d>
+              <a:camera prst="orthographicFront"/>
+              <a:lightRig rig="threePt" dir="t"/>
+            </a:scene3d>
+            <a:sp3d>
+              <a:bevelT/>
+              <a:bevelB/>
+            </a:sp3d>
+          </p:spPr>
+          <p:style>
+            <a:lnRef idx="2">
+              <a:schemeClr val="accent1">
+                <a:shade val="50000"/>
+              </a:schemeClr>
+            </a:lnRef>
+            <a:fillRef idx="1">
+              <a:schemeClr val="accent1"/>
+            </a:fillRef>
+            <a:effectRef idx="0">
+              <a:schemeClr val="accent1"/>
+            </a:effectRef>
+            <a:fontRef idx="minor">
+              <a:schemeClr val="lt1"/>
+            </a:fontRef>
+          </p:style>
+          <p:txBody>
+            <a:bodyPr rtlCol="0" anchor="ctr"/>
+            <a:lstStyle/>
+            <a:p>
+              <a:pPr algn="ctr"/>
+              <a:r>
+                <a:rPr lang="en-US" sz="1200" dirty="0"/>
+                <a:t>poly(x)</a:t>
+              </a:r>
+            </a:p>
+          </p:txBody>
+        </p:sp>
+        <p:sp>
+          <p:nvSpPr>
+            <p:cNvPr id="61" name="Rectangle 60">
+              <a:extLst>
+                <a:ext uri="{FF2B5EF4-FFF2-40B4-BE49-F238E27FC236}">
+                  <a16:creationId xmlns:a16="http://schemas.microsoft.com/office/drawing/2014/main" id="{C2BF473A-F0B9-494D-A629-96128085A550}"/>
+                </a:ext>
+              </a:extLst>
+            </p:cNvPr>
+            <p:cNvSpPr/>
+            <p:nvPr/>
+          </p:nvSpPr>
+          <p:spPr>
+            <a:xfrm>
+              <a:off x="2081178" y="3380613"/>
+              <a:ext cx="652878" cy="280416"/>
+            </a:xfrm>
+            <a:prstGeom prst="rect">
+              <a:avLst/>
+            </a:prstGeom>
+            <a:solidFill>
+              <a:schemeClr val="accent2">
+                <a:lumMod val="60000"/>
+                <a:lumOff val="40000"/>
+              </a:schemeClr>
+            </a:solidFill>
+            <a:ln>
+              <a:solidFill>
+                <a:schemeClr val="accent2">
+                  <a:lumMod val="50000"/>
+                </a:schemeClr>
+              </a:solidFill>
+            </a:ln>
+            <a:scene3d>
+              <a:camera prst="orthographicFront"/>
+              <a:lightRig rig="threePt" dir="t"/>
+            </a:scene3d>
+            <a:sp3d>
+              <a:bevelT/>
+              <a:bevelB/>
+            </a:sp3d>
+          </p:spPr>
+          <p:style>
+            <a:lnRef idx="2">
+              <a:schemeClr val="accent1">
+                <a:shade val="50000"/>
+              </a:schemeClr>
+            </a:lnRef>
+            <a:fillRef idx="1">
+              <a:schemeClr val="accent1"/>
+            </a:fillRef>
+            <a:effectRef idx="0">
+              <a:schemeClr val="accent1"/>
+            </a:effectRef>
+            <a:fontRef idx="minor">
+              <a:schemeClr val="lt1"/>
+            </a:fontRef>
+          </p:style>
+          <p:txBody>
+            <a:bodyPr rtlCol="0" anchor="ctr"/>
+            <a:lstStyle/>
+            <a:p>
+              <a:pPr algn="ctr"/>
+              <a:r>
+                <a:rPr lang="en-US" sz="1200" dirty="0"/>
+                <a:t>poly(x)</a:t>
+              </a:r>
+            </a:p>
+          </p:txBody>
+        </p:sp>
+        <p:sp>
+          <p:nvSpPr>
+            <p:cNvPr id="62" name="Rectangle 61">
+              <a:extLst>
+                <a:ext uri="{FF2B5EF4-FFF2-40B4-BE49-F238E27FC236}">
+                  <a16:creationId xmlns:a16="http://schemas.microsoft.com/office/drawing/2014/main" id="{56425128-49B9-4644-AADE-E0B8CE0BA8F4}"/>
+                </a:ext>
+              </a:extLst>
+            </p:cNvPr>
+            <p:cNvSpPr/>
+            <p:nvPr/>
+          </p:nvSpPr>
+          <p:spPr>
+            <a:xfrm>
+              <a:off x="2193954" y="3462528"/>
+              <a:ext cx="652878" cy="280416"/>
+            </a:xfrm>
+            <a:prstGeom prst="rect">
+              <a:avLst/>
+            </a:prstGeom>
+            <a:solidFill>
+              <a:schemeClr val="accent2">
+                <a:lumMod val="60000"/>
+                <a:lumOff val="40000"/>
+              </a:schemeClr>
+            </a:solidFill>
+            <a:ln>
+              <a:solidFill>
+                <a:schemeClr val="accent2">
+                  <a:lumMod val="50000"/>
+                </a:schemeClr>
+              </a:solidFill>
+            </a:ln>
+            <a:scene3d>
+              <a:camera prst="orthographicFront"/>
+              <a:lightRig rig="threePt" dir="t"/>
+            </a:scene3d>
+            <a:sp3d>
+              <a:bevelT/>
+              <a:bevelB/>
+            </a:sp3d>
+          </p:spPr>
+          <p:style>
+            <a:lnRef idx="2">
+              <a:schemeClr val="accent1">
+                <a:shade val="50000"/>
+              </a:schemeClr>
+            </a:lnRef>
+            <a:fillRef idx="1">
+              <a:schemeClr val="accent1"/>
+            </a:fillRef>
+            <a:effectRef idx="0">
+              <a:schemeClr val="accent1"/>
+            </a:effectRef>
+            <a:fontRef idx="minor">
+              <a:schemeClr val="lt1"/>
+            </a:fontRef>
+          </p:style>
+          <p:txBody>
+            <a:bodyPr rtlCol="0" anchor="ctr"/>
+            <a:lstStyle/>
+            <a:p>
+              <a:pPr algn="ctr"/>
+              <a:r>
+                <a:rPr lang="en-US" sz="1400" dirty="0"/>
+                <a:t>target</a:t>
+              </a:r>
+            </a:p>
+          </p:txBody>
+        </p:sp>
+      </p:grpSp>
+      <p:sp>
+        <p:nvSpPr>
+          <p:cNvPr id="2" name="Oval 1">
+            <a:extLst>
+              <a:ext uri="{FF2B5EF4-FFF2-40B4-BE49-F238E27FC236}">
+                <a16:creationId xmlns:a16="http://schemas.microsoft.com/office/drawing/2014/main" id="{355E5D0B-20AB-CB4D-AE45-A77F4F4024CA}"/>
+              </a:ext>
+            </a:extLst>
+          </p:cNvPr>
+          <p:cNvSpPr/>
+          <p:nvPr/>
+        </p:nvSpPr>
+        <p:spPr>
+          <a:xfrm>
+            <a:off x="3873445" y="3709737"/>
+            <a:ext cx="457200" cy="457200"/>
+          </a:xfrm>
+          <a:prstGeom prst="ellipse">
+            <a:avLst/>
+          </a:prstGeom>
+          <a:solidFill>
+            <a:srgbClr val="FF7E79"/>
+          </a:solidFill>
+          <a:ln>
+            <a:solidFill>
+              <a:srgbClr val="C00000"/>
+            </a:solidFill>
+          </a:ln>
+        </p:spPr>
+        <p:style>
+          <a:lnRef idx="2">
+            <a:schemeClr val="accent1">
+              <a:shade val="50000"/>
+            </a:schemeClr>
+          </a:lnRef>
+          <a:fillRef idx="1">
+            <a:schemeClr val="accent1"/>
+          </a:fillRef>
+          <a:effectRef idx="0">
+            <a:schemeClr val="accent1"/>
+          </a:effectRef>
+          <a:fontRef idx="minor">
+            <a:schemeClr val="lt1"/>
+          </a:fontRef>
+        </p:style>
+        <p:txBody>
+          <a:bodyPr rtlCol="0" anchor="ctr"/>
+          <a:lstStyle/>
+          <a:p>
+            <a:pPr algn="ctr"/>
+            <a:r>
+              <a:rPr lang="en-US" b="1" dirty="0">
+                <a:solidFill>
+                  <a:srgbClr val="C00000"/>
+                </a:solidFill>
+              </a:rPr>
+              <a:t>3</a:t>
+            </a:r>
+          </a:p>
+        </p:txBody>
+      </p:sp>
+      <p:grpSp>
+        <p:nvGrpSpPr>
+          <p:cNvPr id="53" name="Group 52">
+            <a:extLst>
+              <a:ext uri="{FF2B5EF4-FFF2-40B4-BE49-F238E27FC236}">
+                <a16:creationId xmlns:a16="http://schemas.microsoft.com/office/drawing/2014/main" id="{6D1E2069-D92F-B24C-8C88-A6DADE187DA5}"/>
+              </a:ext>
+            </a:extLst>
+          </p:cNvPr>
+          <p:cNvGrpSpPr/>
+          <p:nvPr/>
+        </p:nvGrpSpPr>
+        <p:grpSpPr>
+          <a:xfrm>
+            <a:off x="3675382" y="2004400"/>
+            <a:ext cx="973789" cy="1131468"/>
+            <a:chOff x="6153873" y="4315382"/>
+            <a:chExt cx="1314913" cy="1510006"/>
+          </a:xfrm>
+        </p:grpSpPr>
+        <p:pic>
+          <p:nvPicPr>
+            <p:cNvPr id="54" name="Picture 53">
+              <a:extLst>
+                <a:ext uri="{FF2B5EF4-FFF2-40B4-BE49-F238E27FC236}">
+                  <a16:creationId xmlns:a16="http://schemas.microsoft.com/office/drawing/2014/main" id="{1694EDC2-9CBA-C44E-B182-316A2A6EC6FB}"/>
+                </a:ext>
+              </a:extLst>
+            </p:cNvPr>
+            <p:cNvPicPr>
+              <a:picLocks noChangeAspect="1"/>
+            </p:cNvPicPr>
+            <p:nvPr/>
+          </p:nvPicPr>
+          <p:blipFill rotWithShape="1">
+            <a:blip r:embed="rId2">
+              <a:clrChange>
+                <a:clrFrom>
+                  <a:srgbClr val="FFFFFF"/>
+                </a:clrFrom>
+                <a:clrTo>
+                  <a:srgbClr val="FFFFFF">
+                    <a:alpha val="0"/>
+                  </a:srgbClr>
+                </a:clrTo>
+              </a:clrChange>
+              <a:extLst>
+                <a:ext uri="{28A0092B-C50C-407E-A947-70E740481C1C}">
+                  <a14:useLocalDpi xmlns:a14="http://schemas.microsoft.com/office/drawing/2010/main" val="0"/>
+                </a:ext>
+              </a:extLst>
+            </a:blip>
+            <a:srcRect t="39053" r="71840"/>
+            <a:stretch/>
+          </p:blipFill>
+          <p:spPr>
+            <a:xfrm>
+              <a:off x="6483377" y="4315382"/>
+              <a:ext cx="985409" cy="1501385"/>
+            </a:xfrm>
+            <a:prstGeom prst="rect">
+              <a:avLst/>
+            </a:prstGeom>
+          </p:spPr>
+        </p:pic>
+        <p:pic>
+          <p:nvPicPr>
+            <p:cNvPr id="55" name="Picture 54">
+              <a:extLst>
+                <a:ext uri="{FF2B5EF4-FFF2-40B4-BE49-F238E27FC236}">
+                  <a16:creationId xmlns:a16="http://schemas.microsoft.com/office/drawing/2014/main" id="{3AEDFE5C-A84E-5D44-95C0-10BCCA8A0E79}"/>
+                </a:ext>
+              </a:extLst>
+            </p:cNvPr>
+            <p:cNvPicPr>
+              <a:picLocks noChangeAspect="1"/>
+            </p:cNvPicPr>
+            <p:nvPr/>
+          </p:nvPicPr>
+          <p:blipFill rotWithShape="1">
+            <a:blip r:embed="rId2">
+              <a:clrChange>
+                <a:clrFrom>
+                  <a:srgbClr val="FFFFFF"/>
+                </a:clrFrom>
+                <a:clrTo>
+                  <a:srgbClr val="FFFFFF">
+                    <a:alpha val="0"/>
+                  </a:srgbClr>
+                </a:clrTo>
+              </a:clrChange>
+              <a:extLst>
+                <a:ext uri="{28A0092B-C50C-407E-A947-70E740481C1C}">
+                  <a14:useLocalDpi xmlns:a14="http://schemas.microsoft.com/office/drawing/2010/main" val="0"/>
+                </a:ext>
+              </a:extLst>
+            </a:blip>
+            <a:srcRect t="39053" r="71840"/>
+            <a:stretch/>
+          </p:blipFill>
+          <p:spPr>
+            <a:xfrm>
+              <a:off x="6330910" y="4324003"/>
+              <a:ext cx="985410" cy="1501385"/>
+            </a:xfrm>
+            <a:prstGeom prst="rect">
+              <a:avLst/>
+            </a:prstGeom>
+          </p:spPr>
+        </p:pic>
+        <p:pic>
+          <p:nvPicPr>
+            <p:cNvPr id="56" name="Picture 55">
+              <a:extLst>
+                <a:ext uri="{FF2B5EF4-FFF2-40B4-BE49-F238E27FC236}">
+                  <a16:creationId xmlns:a16="http://schemas.microsoft.com/office/drawing/2014/main" id="{5A7D201D-4F85-7F49-B6A2-45313C3CF663}"/>
+                </a:ext>
+              </a:extLst>
+            </p:cNvPr>
+            <p:cNvPicPr>
+              <a:picLocks noChangeAspect="1"/>
+            </p:cNvPicPr>
+            <p:nvPr/>
+          </p:nvPicPr>
+          <p:blipFill rotWithShape="1">
+            <a:blip r:embed="rId2">
+              <a:clrChange>
+                <a:clrFrom>
+                  <a:srgbClr val="FFFFFF"/>
+                </a:clrFrom>
+                <a:clrTo>
+                  <a:srgbClr val="FFFFFF">
+                    <a:alpha val="0"/>
+                  </a:srgbClr>
+                </a:clrTo>
+              </a:clrChange>
+              <a:extLst>
+                <a:ext uri="{28A0092B-C50C-407E-A947-70E740481C1C}">
+                  <a14:useLocalDpi xmlns:a14="http://schemas.microsoft.com/office/drawing/2010/main" val="0"/>
+                </a:ext>
+              </a:extLst>
+            </a:blip>
+            <a:srcRect t="39053" r="71840"/>
+            <a:stretch/>
+          </p:blipFill>
+          <p:spPr>
+            <a:xfrm>
+              <a:off x="6153873" y="4324003"/>
+              <a:ext cx="985409" cy="1501385"/>
+            </a:xfrm>
+            <a:prstGeom prst="rect">
+              <a:avLst/>
+            </a:prstGeom>
+          </p:spPr>
+        </p:pic>
+      </p:grpSp>
+      <p:sp>
+        <p:nvSpPr>
+          <p:cNvPr id="57" name="TextBox 56">
+            <a:extLst>
+              <a:ext uri="{FF2B5EF4-FFF2-40B4-BE49-F238E27FC236}">
+                <a16:creationId xmlns:a16="http://schemas.microsoft.com/office/drawing/2014/main" id="{E6E18E75-833D-B145-868D-EC2C0852186E}"/>
+              </a:ext>
+            </a:extLst>
+          </p:cNvPr>
+          <p:cNvSpPr txBox="1"/>
+          <p:nvPr/>
+        </p:nvSpPr>
+        <p:spPr>
+          <a:xfrm>
+            <a:off x="2290498" y="2291408"/>
+            <a:ext cx="1638847" cy="584775"/>
+          </a:xfrm>
+          <a:prstGeom prst="rect">
+            <a:avLst/>
+          </a:prstGeom>
+          <a:noFill/>
+        </p:spPr>
+        <p:txBody>
+          <a:bodyPr wrap="none" rtlCol="0">
+            <a:spAutoFit/>
+          </a:bodyPr>
+          <a:lstStyle/>
+          <a:p>
+            <a:pPr algn="ctr"/>
+            <a:r>
+              <a:rPr lang="en-US" sz="1600" dirty="0"/>
+              <a:t>Expert/Untrained</a:t>
+            </a:r>
+          </a:p>
+          <a:p>
+            <a:pPr algn="ctr"/>
+            <a:r>
+              <a:rPr lang="en-US" sz="1600" dirty="0"/>
+              <a:t>Labeling</a:t>
+            </a:r>
+          </a:p>
+        </p:txBody>
+      </p:sp>
+      <p:sp>
+        <p:nvSpPr>
+          <p:cNvPr id="65" name="Oval 64">
+            <a:extLst>
+              <a:ext uri="{FF2B5EF4-FFF2-40B4-BE49-F238E27FC236}">
+                <a16:creationId xmlns:a16="http://schemas.microsoft.com/office/drawing/2014/main" id="{44520365-D3DA-4445-931A-8A2DDDAE1F8C}"/>
+              </a:ext>
+            </a:extLst>
+          </p:cNvPr>
+          <p:cNvSpPr/>
+          <p:nvPr/>
+        </p:nvSpPr>
+        <p:spPr>
+          <a:xfrm>
+            <a:off x="5267664" y="357146"/>
+            <a:ext cx="457200" cy="457200"/>
+          </a:xfrm>
+          <a:prstGeom prst="ellipse">
+            <a:avLst/>
+          </a:prstGeom>
+          <a:solidFill>
+            <a:srgbClr val="FF7E79"/>
+          </a:solidFill>
+          <a:ln>
+            <a:solidFill>
+              <a:srgbClr val="C00000"/>
+            </a:solidFill>
+          </a:ln>
+        </p:spPr>
+        <p:style>
+          <a:lnRef idx="2">
+            <a:schemeClr val="accent1">
+              <a:shade val="50000"/>
+            </a:schemeClr>
+          </a:lnRef>
+          <a:fillRef idx="1">
+            <a:schemeClr val="accent1"/>
+          </a:fillRef>
+          <a:effectRef idx="0">
+            <a:schemeClr val="accent1"/>
+          </a:effectRef>
+          <a:fontRef idx="minor">
+            <a:schemeClr val="lt1"/>
+          </a:fontRef>
+        </p:style>
+        <p:txBody>
+          <a:bodyPr rtlCol="0" anchor="ctr"/>
+          <a:lstStyle/>
+          <a:p>
+            <a:pPr algn="ctr"/>
+            <a:r>
+              <a:rPr lang="en-US" b="1" dirty="0">
+                <a:solidFill>
+                  <a:srgbClr val="C00000"/>
+                </a:solidFill>
+              </a:rPr>
+              <a:t>1</a:t>
+            </a:r>
+          </a:p>
+        </p:txBody>
+      </p:sp>
+      <p:sp>
+        <p:nvSpPr>
+          <p:cNvPr id="66" name="Oval 65">
+            <a:extLst>
+              <a:ext uri="{FF2B5EF4-FFF2-40B4-BE49-F238E27FC236}">
+                <a16:creationId xmlns:a16="http://schemas.microsoft.com/office/drawing/2014/main" id="{D63A70C9-3094-484B-902C-E3135FEEAEB1}"/>
+              </a:ext>
+            </a:extLst>
+          </p:cNvPr>
+          <p:cNvSpPr/>
+          <p:nvPr/>
+        </p:nvSpPr>
+        <p:spPr>
+          <a:xfrm>
+            <a:off x="2990961" y="1763633"/>
+            <a:ext cx="457200" cy="457200"/>
+          </a:xfrm>
+          <a:prstGeom prst="ellipse">
+            <a:avLst/>
+          </a:prstGeom>
+          <a:solidFill>
+            <a:srgbClr val="FF7E79"/>
+          </a:solidFill>
+          <a:ln>
+            <a:solidFill>
+              <a:srgbClr val="C00000"/>
+            </a:solidFill>
+          </a:ln>
+        </p:spPr>
+        <p:style>
+          <a:lnRef idx="2">
+            <a:schemeClr val="accent1">
+              <a:shade val="50000"/>
+            </a:schemeClr>
+          </a:lnRef>
+          <a:fillRef idx="1">
+            <a:schemeClr val="accent1"/>
+          </a:fillRef>
+          <a:effectRef idx="0">
+            <a:schemeClr val="accent1"/>
+          </a:effectRef>
+          <a:fontRef idx="minor">
+            <a:schemeClr val="lt1"/>
+          </a:fontRef>
+        </p:style>
+        <p:txBody>
+          <a:bodyPr rtlCol="0" anchor="ctr"/>
+          <a:lstStyle/>
+          <a:p>
+            <a:pPr algn="ctr"/>
+            <a:r>
+              <a:rPr lang="en-US" b="1" dirty="0">
+                <a:solidFill>
+                  <a:srgbClr val="C00000"/>
+                </a:solidFill>
+              </a:rPr>
+              <a:t>2</a:t>
+            </a:r>
+          </a:p>
+        </p:txBody>
+      </p:sp>
+      <p:sp>
+        <p:nvSpPr>
+          <p:cNvPr id="67" name="Oval 66">
+            <a:extLst>
+              <a:ext uri="{FF2B5EF4-FFF2-40B4-BE49-F238E27FC236}">
+                <a16:creationId xmlns:a16="http://schemas.microsoft.com/office/drawing/2014/main" id="{252800DF-3C0C-A448-8CB5-915178A90DCC}"/>
+              </a:ext>
+            </a:extLst>
+          </p:cNvPr>
+          <p:cNvSpPr/>
+          <p:nvPr/>
+        </p:nvSpPr>
+        <p:spPr>
+          <a:xfrm>
+            <a:off x="7348885" y="2853112"/>
+            <a:ext cx="457200" cy="457200"/>
+          </a:xfrm>
+          <a:prstGeom prst="ellipse">
+            <a:avLst/>
+          </a:prstGeom>
+          <a:solidFill>
+            <a:srgbClr val="FF7E79"/>
+          </a:solidFill>
+          <a:ln>
+            <a:solidFill>
+              <a:srgbClr val="C00000"/>
+            </a:solidFill>
+          </a:ln>
+        </p:spPr>
+        <p:style>
+          <a:lnRef idx="2">
+            <a:schemeClr val="accent1">
+              <a:shade val="50000"/>
+            </a:schemeClr>
+          </a:lnRef>
+          <a:fillRef idx="1">
+            <a:schemeClr val="accent1"/>
+          </a:fillRef>
+          <a:effectRef idx="0">
+            <a:schemeClr val="accent1"/>
+          </a:effectRef>
+          <a:fontRef idx="minor">
+            <a:schemeClr val="lt1"/>
+          </a:fontRef>
+        </p:style>
+        <p:txBody>
+          <a:bodyPr rtlCol="0" anchor="ctr"/>
+          <a:lstStyle/>
+          <a:p>
+            <a:pPr algn="ctr"/>
+            <a:r>
+              <a:rPr lang="en-US" b="1" dirty="0">
+                <a:solidFill>
+                  <a:srgbClr val="C00000"/>
+                </a:solidFill>
+              </a:rPr>
+              <a:t>4</a:t>
+            </a:r>
+          </a:p>
+        </p:txBody>
+      </p:sp>
+      <p:cxnSp>
+        <p:nvCxnSpPr>
+          <p:cNvPr id="68" name="Straight Arrow Connector 67">
+            <a:extLst>
+              <a:ext uri="{FF2B5EF4-FFF2-40B4-BE49-F238E27FC236}">
+                <a16:creationId xmlns:a16="http://schemas.microsoft.com/office/drawing/2014/main" id="{A123DA65-3EA1-C04A-A02D-138937016D38}"/>
+              </a:ext>
+            </a:extLst>
+          </p:cNvPr>
+          <p:cNvCxnSpPr>
+            <a:cxnSpLocks/>
+            <a:stCxn id="55" idx="3"/>
+            <a:endCxn id="27" idx="1"/>
+          </p:cNvCxnSpPr>
+          <p:nvPr/>
+        </p:nvCxnSpPr>
+        <p:spPr>
+          <a:xfrm flipV="1">
+            <a:off x="4536259" y="2560725"/>
+            <a:ext cx="439120" cy="12639"/>
+          </a:xfrm>
+          <a:prstGeom prst="straightConnector1">
+            <a:avLst/>
+          </a:prstGeom>
+          <a:ln w="38100">
+            <a:solidFill>
+              <a:schemeClr val="tx1">
+                <a:lumMod val="95000"/>
+                <a:lumOff val="5000"/>
+              </a:schemeClr>
+            </a:solidFill>
+            <a:tailEnd type="triangle"/>
+          </a:ln>
+        </p:spPr>
+        <p:style>
+          <a:lnRef idx="1">
+            <a:schemeClr val="accent1"/>
+          </a:lnRef>
+          <a:fillRef idx="0">
+            <a:schemeClr val="accent1"/>
+          </a:fillRef>
+          <a:effectRef idx="0">
+            <a:schemeClr val="accent1"/>
+          </a:effectRef>
+          <a:fontRef idx="minor">
+            <a:schemeClr val="tx1"/>
+          </a:fontRef>
+        </p:style>
+      </p:cxnSp>
+      <p:cxnSp>
+        <p:nvCxnSpPr>
+          <p:cNvPr id="69" name="Straight Arrow Connector 68">
+            <a:extLst>
+              <a:ext uri="{FF2B5EF4-FFF2-40B4-BE49-F238E27FC236}">
+                <a16:creationId xmlns:a16="http://schemas.microsoft.com/office/drawing/2014/main" id="{750331CD-1E6C-9747-89CE-D83290F5512F}"/>
+              </a:ext>
+            </a:extLst>
+          </p:cNvPr>
+          <p:cNvCxnSpPr>
+            <a:cxnSpLocks/>
+          </p:cNvCxnSpPr>
+          <p:nvPr/>
+        </p:nvCxnSpPr>
+        <p:spPr>
+          <a:xfrm>
+            <a:off x="5557844" y="3593057"/>
+            <a:ext cx="0" cy="611813"/>
+          </a:xfrm>
+          <a:prstGeom prst="straightConnector1">
+            <a:avLst/>
+          </a:prstGeom>
+          <a:ln w="38100">
+            <a:solidFill>
+              <a:schemeClr val="tx1">
+                <a:lumMod val="95000"/>
+                <a:lumOff val="5000"/>
+              </a:schemeClr>
+            </a:solidFill>
+            <a:tailEnd type="triangle"/>
+          </a:ln>
+        </p:spPr>
+        <p:style>
+          <a:lnRef idx="1">
+            <a:schemeClr val="accent1"/>
+          </a:lnRef>
+          <a:fillRef idx="0">
+            <a:schemeClr val="accent1"/>
+          </a:fillRef>
+          <a:effectRef idx="0">
+            <a:schemeClr val="accent1"/>
+          </a:effectRef>
+          <a:fontRef idx="minor">
+            <a:schemeClr val="tx1"/>
+          </a:fontRef>
+        </p:style>
+      </p:cxnSp>
+      <p:cxnSp>
+        <p:nvCxnSpPr>
+          <p:cNvPr id="74" name="Straight Arrow Connector 73">
+            <a:extLst>
+              <a:ext uri="{FF2B5EF4-FFF2-40B4-BE49-F238E27FC236}">
+                <a16:creationId xmlns:a16="http://schemas.microsoft.com/office/drawing/2014/main" id="{EFD9A797-31BF-9246-A674-6BFB8DF01B62}"/>
+              </a:ext>
+            </a:extLst>
+          </p:cNvPr>
+          <p:cNvCxnSpPr>
+            <a:cxnSpLocks/>
+          </p:cNvCxnSpPr>
+          <p:nvPr/>
+        </p:nvCxnSpPr>
+        <p:spPr>
+          <a:xfrm flipH="1">
+            <a:off x="4063402" y="4419951"/>
+            <a:ext cx="576462" cy="0"/>
+          </a:xfrm>
+          <a:prstGeom prst="straightConnector1">
+            <a:avLst/>
+          </a:prstGeom>
+          <a:ln w="38100">
+            <a:solidFill>
+              <a:schemeClr val="tx1">
+                <a:lumMod val="95000"/>
+                <a:lumOff val="5000"/>
+              </a:schemeClr>
+            </a:solidFill>
+            <a:tailEnd type="triangle"/>
+          </a:ln>
+        </p:spPr>
+        <p:style>
+          <a:lnRef idx="1">
+            <a:schemeClr val="accent1"/>
+          </a:lnRef>
+          <a:fillRef idx="0">
+            <a:schemeClr val="accent1"/>
+          </a:fillRef>
+          <a:effectRef idx="0">
+            <a:schemeClr val="accent1"/>
+          </a:effectRef>
+          <a:fontRef idx="minor">
+            <a:schemeClr val="tx1"/>
+          </a:fontRef>
+        </p:style>
+      </p:cxnSp>
+      <p:sp>
+        <p:nvSpPr>
+          <p:cNvPr id="86" name="TextBox 85">
+            <a:extLst>
+              <a:ext uri="{FF2B5EF4-FFF2-40B4-BE49-F238E27FC236}">
+                <a16:creationId xmlns:a16="http://schemas.microsoft.com/office/drawing/2014/main" id="{D6BA9929-00B8-3C4D-A532-21326DC709F2}"/>
+              </a:ext>
+            </a:extLst>
+          </p:cNvPr>
+          <p:cNvSpPr txBox="1"/>
+          <p:nvPr/>
+        </p:nvSpPr>
+        <p:spPr>
+          <a:xfrm>
+            <a:off x="6063605" y="4915805"/>
+            <a:ext cx="520463" cy="338554"/>
+          </a:xfrm>
+          <a:prstGeom prst="rect">
+            <a:avLst/>
+          </a:prstGeom>
+          <a:noFill/>
+        </p:spPr>
+        <p:txBody>
+          <a:bodyPr wrap="none" rtlCol="0">
+            <a:spAutoFit/>
+          </a:bodyPr>
+          <a:lstStyle/>
+          <a:p>
+            <a:r>
+              <a:rPr lang="en-US" sz="1600" b="1" dirty="0"/>
+              <a:t>Test</a:t>
+            </a:r>
+          </a:p>
+        </p:txBody>
+      </p:sp>
+    </p:spTree>
+    <p:extLst>
+      <p:ext uri="{BB962C8B-B14F-4D97-AF65-F5344CB8AC3E}">
+        <p14:creationId xmlns:p14="http://schemas.microsoft.com/office/powerpoint/2010/main" val="3829485142"/>
+      </p:ext>
+    </p:extLst>
+  </p:cSld>
+  <p:clrMapOvr>
+    <a:masterClrMapping/>
+  </p:clrMapOvr>
+</p:sld>
+</file>
+
+<file path=ppt/slides/slide3.xml><?xml version="1.0" encoding="utf-8"?>
+<p:sld xmlns:a="http://schemas.openxmlformats.org/drawingml/2006/main" xmlns:r="http://schemas.openxmlformats.org/officeDocument/2006/relationships" xmlns:p="http://schemas.openxmlformats.org/presentationml/2006/main">
+  <p:cSld>
+    <p:spTree>
+      <p:nvGrpSpPr>
+        <p:cNvPr id="1" name=""/>
+        <p:cNvGrpSpPr/>
+        <p:nvPr/>
+      </p:nvGrpSpPr>
+      <p:grpSpPr>
+        <a:xfrm>
+          <a:off x="0" y="0"/>
+          <a:ext cx="0" cy="0"/>
+          <a:chOff x="0" y="0"/>
+          <a:chExt cx="0" cy="0"/>
+        </a:xfrm>
+      </p:grpSpPr>
       <p:sp>
         <p:nvSpPr>
           <p:cNvPr id="4" name="Rectangle 3">
@@ -8736,8 +10944,8 @@
         </p:nvSpPr>
         <p:spPr>
           <a:xfrm>
-            <a:off x="4120268" y="2364002"/>
-            <a:ext cx="792517" cy="292388"/>
+            <a:off x="3939620" y="2364002"/>
+            <a:ext cx="1037830" cy="292388"/>
           </a:xfrm>
           <a:prstGeom prst="rect">
             <a:avLst/>

</xml_diff>

<commit_message>
Addressing a couple of comments
</commit_message>
<xml_diff>
--- a/alpolyner.pptx
+++ b/alpolyner.pptx
@@ -199,7 +199,7 @@
           <a:p>
             <a:fld id="{2F5CF1B8-E33B-2D4C-AE82-68295A1878F9}" type="datetimeFigureOut">
               <a:rPr lang="en-US" smtClean="0"/>
-              <a:t>4/5/19</a:t>
+              <a:t>4/20/19</a:t>
             </a:fld>
             <a:endParaRPr lang="en-US"/>
           </a:p>
@@ -613,7 +613,7 @@
           <a:p>
             <a:fld id="{368E5452-927C-804A-9893-4B0F8C82BC51}" type="datetimeFigureOut">
               <a:rPr lang="en-US" smtClean="0"/>
-              <a:t>4/5/19</a:t>
+              <a:t>4/20/19</a:t>
             </a:fld>
             <a:endParaRPr lang="en-US"/>
           </a:p>
@@ -811,7 +811,7 @@
           <a:p>
             <a:fld id="{368E5452-927C-804A-9893-4B0F8C82BC51}" type="datetimeFigureOut">
               <a:rPr lang="en-US" smtClean="0"/>
-              <a:t>4/5/19</a:t>
+              <a:t>4/20/19</a:t>
             </a:fld>
             <a:endParaRPr lang="en-US"/>
           </a:p>
@@ -1019,7 +1019,7 @@
           <a:p>
             <a:fld id="{368E5452-927C-804A-9893-4B0F8C82BC51}" type="datetimeFigureOut">
               <a:rPr lang="en-US" smtClean="0"/>
-              <a:t>4/5/19</a:t>
+              <a:t>4/20/19</a:t>
             </a:fld>
             <a:endParaRPr lang="en-US"/>
           </a:p>
@@ -1217,7 +1217,7 @@
           <a:p>
             <a:fld id="{368E5452-927C-804A-9893-4B0F8C82BC51}" type="datetimeFigureOut">
               <a:rPr lang="en-US" smtClean="0"/>
-              <a:t>4/5/19</a:t>
+              <a:t>4/20/19</a:t>
             </a:fld>
             <a:endParaRPr lang="en-US"/>
           </a:p>
@@ -1492,7 +1492,7 @@
           <a:p>
             <a:fld id="{368E5452-927C-804A-9893-4B0F8C82BC51}" type="datetimeFigureOut">
               <a:rPr lang="en-US" smtClean="0"/>
-              <a:t>4/5/19</a:t>
+              <a:t>4/20/19</a:t>
             </a:fld>
             <a:endParaRPr lang="en-US"/>
           </a:p>
@@ -1757,7 +1757,7 @@
           <a:p>
             <a:fld id="{368E5452-927C-804A-9893-4B0F8C82BC51}" type="datetimeFigureOut">
               <a:rPr lang="en-US" smtClean="0"/>
-              <a:t>4/5/19</a:t>
+              <a:t>4/20/19</a:t>
             </a:fld>
             <a:endParaRPr lang="en-US"/>
           </a:p>
@@ -2169,7 +2169,7 @@
           <a:p>
             <a:fld id="{368E5452-927C-804A-9893-4B0F8C82BC51}" type="datetimeFigureOut">
               <a:rPr lang="en-US" smtClean="0"/>
-              <a:t>4/5/19</a:t>
+              <a:t>4/20/19</a:t>
             </a:fld>
             <a:endParaRPr lang="en-US"/>
           </a:p>
@@ -2310,7 +2310,7 @@
           <a:p>
             <a:fld id="{368E5452-927C-804A-9893-4B0F8C82BC51}" type="datetimeFigureOut">
               <a:rPr lang="en-US" smtClean="0"/>
-              <a:t>4/5/19</a:t>
+              <a:t>4/20/19</a:t>
             </a:fld>
             <a:endParaRPr lang="en-US"/>
           </a:p>
@@ -2423,7 +2423,7 @@
           <a:p>
             <a:fld id="{368E5452-927C-804A-9893-4B0F8C82BC51}" type="datetimeFigureOut">
               <a:rPr lang="en-US" smtClean="0"/>
-              <a:t>4/5/19</a:t>
+              <a:t>4/20/19</a:t>
             </a:fld>
             <a:endParaRPr lang="en-US"/>
           </a:p>
@@ -2734,7 +2734,7 @@
           <a:p>
             <a:fld id="{368E5452-927C-804A-9893-4B0F8C82BC51}" type="datetimeFigureOut">
               <a:rPr lang="en-US" smtClean="0"/>
-              <a:t>4/5/19</a:t>
+              <a:t>4/20/19</a:t>
             </a:fld>
             <a:endParaRPr lang="en-US"/>
           </a:p>
@@ -3022,7 +3022,7 @@
           <a:p>
             <a:fld id="{368E5452-927C-804A-9893-4B0F8C82BC51}" type="datetimeFigureOut">
               <a:rPr lang="en-US" smtClean="0"/>
-              <a:t>4/5/19</a:t>
+              <a:t>4/20/19</a:t>
             </a:fld>
             <a:endParaRPr lang="en-US"/>
           </a:p>
@@ -3263,7 +3263,7 @@
           <a:p>
             <a:fld id="{368E5452-927C-804A-9893-4B0F8C82BC51}" type="datetimeFigureOut">
               <a:rPr lang="en-US" smtClean="0"/>
-              <a:t>4/5/19</a:t>
+              <a:t>4/20/19</a:t>
             </a:fld>
             <a:endParaRPr lang="en-US"/>
           </a:p>
@@ -10166,8 +10166,8 @@
         </p:nvSpPr>
         <p:spPr>
           <a:xfrm>
-            <a:off x="2201717" y="2613151"/>
-            <a:ext cx="1352659" cy="830997"/>
+            <a:off x="2201717" y="2686303"/>
+            <a:ext cx="1352659" cy="646331"/>
           </a:xfrm>
           <a:prstGeom prst="rect">
             <a:avLst/>
@@ -10181,15 +10181,25 @@
           <a:lstStyle/>
           <a:p>
             <a:r>
-              <a:rPr lang="en-US" sz="1600" dirty="0">
+              <a:rPr lang="en-US" sz="1200" b="1" dirty="0">
                 <a:solidFill>
                   <a:schemeClr val="bg1"/>
                 </a:solidFill>
               </a:rPr>
-              <a:t>Cut numbers, vocab words,  </a:t>
-            </a:r>
-            <a:r>
-              <a:rPr lang="mr-IN" sz="1600" dirty="0">
+              <a:t>Cut numbers, </a:t>
+            </a:r>
+          </a:p>
+          <a:p>
+            <a:r>
+              <a:rPr lang="en-US" sz="1200" b="1" dirty="0">
+                <a:solidFill>
+                  <a:schemeClr val="bg1"/>
+                </a:solidFill>
+              </a:rPr>
+              <a:t>cut adjectives,  trim </a:t>
+            </a:r>
+            <a:r>
+              <a:rPr lang="mr-IN" sz="1200" b="1" dirty="0">
                 <a:solidFill>
                   <a:schemeClr val="bg1"/>
                 </a:solidFill>
@@ -10197,14 +10207,14 @@
               <a:t>:.,:-</a:t>
             </a:r>
             <a:r>
-              <a:rPr lang="en-US" sz="1600" dirty="0">
+              <a:rPr lang="en-US" sz="1200" b="1" dirty="0">
                 <a:solidFill>
                   <a:schemeClr val="bg1"/>
                 </a:solidFill>
               </a:rPr>
               <a:t> etc.</a:t>
             </a:r>
-            <a:endParaRPr lang="mr-IN" sz="1600" dirty="0">
+            <a:endParaRPr lang="mr-IN" sz="1200" b="1" dirty="0">
               <a:solidFill>
                 <a:schemeClr val="bg1"/>
               </a:solidFill>
@@ -10227,9 +10237,9 @@
         <p:grpSpPr>
           <a:xfrm>
             <a:off x="5176624" y="2528933"/>
-            <a:ext cx="1272014" cy="1295426"/>
+            <a:ext cx="1272014" cy="1143000"/>
             <a:chOff x="7862996" y="1894949"/>
-            <a:chExt cx="1272014" cy="1295426"/>
+            <a:chExt cx="1272014" cy="1143000"/>
           </a:xfrm>
         </p:grpSpPr>
         <p:sp>
@@ -10305,8 +10315,8 @@
           </p:nvSpPr>
           <p:spPr>
             <a:xfrm>
-              <a:off x="7935613" y="2082379"/>
-              <a:ext cx="1108188" cy="1107996"/>
+              <a:off x="8020988" y="2155531"/>
+              <a:ext cx="937436" cy="738664"/>
             </a:xfrm>
             <a:prstGeom prst="rect">
               <a:avLst/>
@@ -10320,7 +10330,7 @@
             <a:p>
               <a:pPr algn="ctr"/>
               <a:r>
-                <a:rPr lang="en-US" sz="1600" b="1" dirty="0">
+                <a:rPr lang="en-US" sz="1400" b="1" dirty="0">
                   <a:solidFill>
                     <a:schemeClr val="accent2">
                       <a:lumMod val="50000"/>
@@ -10333,7 +10343,7 @@
             <a:p>
               <a:pPr algn="ctr"/>
               <a:r>
-                <a:rPr lang="en-US" sz="1600" b="1" dirty="0">
+                <a:rPr lang="en-US" sz="1400" b="1" dirty="0">
                   <a:solidFill>
                     <a:schemeClr val="accent2">
                       <a:lumMod val="50000"/>
@@ -10343,7 +10353,7 @@
                 <a:t>entity</a:t>
               </a:r>
               <a:br>
-                <a:rPr lang="en-US" sz="1600" b="1" dirty="0">
+                <a:rPr lang="en-US" sz="1400" b="1" dirty="0">
                   <a:solidFill>
                     <a:schemeClr val="accent2">
                       <a:lumMod val="50000"/>
@@ -10352,7 +10362,7 @@
                 </a:rPr>
               </a:br>
               <a:r>
-                <a:rPr lang="en-US" sz="1600" b="1" dirty="0">
+                <a:rPr lang="en-US" sz="1400" b="1" dirty="0">
                   <a:solidFill>
                     <a:schemeClr val="accent2">
                       <a:lumMod val="50000"/>
@@ -10361,15 +10371,6 @@
                 </a:rPr>
                 <a:t>referents</a:t>
               </a:r>
-            </a:p>
-            <a:p>
-              <a:endParaRPr lang="mr-IN" sz="1600" b="1" dirty="0">
-                <a:solidFill>
-                  <a:schemeClr val="accent2">
-                    <a:lumMod val="50000"/>
-                  </a:schemeClr>
-                </a:solidFill>
-              </a:endParaRPr>
             </a:p>
           </p:txBody>
         </p:sp>
@@ -10689,9 +10690,9 @@
         <p:grpSpPr>
           <a:xfrm>
             <a:off x="7591586" y="2575530"/>
-            <a:ext cx="1175136" cy="1169077"/>
+            <a:ext cx="1175136" cy="908656"/>
             <a:chOff x="7862995" y="1964856"/>
-            <a:chExt cx="1175136" cy="1169077"/>
+            <a:chExt cx="1175136" cy="908656"/>
           </a:xfrm>
         </p:grpSpPr>
         <p:sp>
@@ -10767,8 +10768,8 @@
           </p:nvSpPr>
           <p:spPr>
             <a:xfrm>
-              <a:off x="7956036" y="2056715"/>
-              <a:ext cx="989502" cy="1077218"/>
+              <a:off x="8021278" y="2129867"/>
+              <a:ext cx="859018" cy="738664"/>
             </a:xfrm>
             <a:prstGeom prst="rect">
               <a:avLst/>
@@ -10782,7 +10783,7 @@
             <a:p>
               <a:pPr algn="ctr"/>
               <a:r>
-                <a:rPr lang="en-US" sz="1600" b="1" dirty="0">
+                <a:rPr lang="en-US" sz="1400" b="1" dirty="0">
                   <a:solidFill>
                     <a:schemeClr val="accent2">
                       <a:lumMod val="50000"/>
@@ -10795,7 +10796,7 @@
             <a:p>
               <a:pPr algn="ctr"/>
               <a:r>
-                <a:rPr lang="en-US" sz="1600" b="1" dirty="0">
+                <a:rPr lang="en-US" sz="1400" b="1" dirty="0">
                   <a:solidFill>
                     <a:schemeClr val="accent2">
                       <a:lumMod val="50000"/>
@@ -10805,7 +10806,7 @@
                 <a:t>entity</a:t>
               </a:r>
               <a:br>
-                <a:rPr lang="en-US" sz="1600" b="1" dirty="0">
+                <a:rPr lang="en-US" sz="1400" b="1" dirty="0">
                   <a:solidFill>
                     <a:schemeClr val="accent2">
                       <a:lumMod val="50000"/>
@@ -10814,7 +10815,7 @@
                 </a:rPr>
               </a:br>
               <a:r>
-                <a:rPr lang="en-US" sz="1600" b="1" dirty="0">
+                <a:rPr lang="en-US" sz="1400" b="1" dirty="0">
                   <a:solidFill>
                     <a:schemeClr val="accent2">
                       <a:lumMod val="50000"/>
@@ -10823,15 +10824,6 @@
                 </a:rPr>
                 <a:t>referents</a:t>
               </a:r>
-            </a:p>
-            <a:p>
-              <a:endParaRPr lang="mr-IN" sz="1600" b="1" dirty="0">
-                <a:solidFill>
-                  <a:schemeClr val="accent2">
-                    <a:lumMod val="50000"/>
-                  </a:schemeClr>
-                </a:solidFill>
-              </a:endParaRPr>
             </a:p>
           </p:txBody>
         </p:sp>
@@ -11079,8 +11071,8 @@
         </p:nvSpPr>
         <p:spPr>
           <a:xfrm>
-            <a:off x="7307727" y="925813"/>
-            <a:ext cx="1652505" cy="369332"/>
+            <a:off x="7307727" y="974581"/>
+            <a:ext cx="1652504" cy="646331"/>
           </a:xfrm>
           <a:prstGeom prst="rect">
             <a:avLst/>
@@ -11097,6 +11089,13 @@
             <a:r>
               <a:rPr lang="en-US" b="1" dirty="0"/>
               <a:t>Active Learning</a:t>
+            </a:r>
+          </a:p>
+          <a:p>
+            <a:pPr algn="ctr"/>
+            <a:r>
+              <a:rPr lang="en-US" b="1" dirty="0"/>
+              <a:t>Strategies</a:t>
             </a:r>
           </a:p>
         </p:txBody>

</xml_diff>

<commit_message>
Addressing some comments after meeting with Kyle
</commit_message>
<xml_diff>
--- a/alpolyner.pptx
+++ b/alpolyner.pptx
@@ -199,7 +199,7 @@
           <a:p>
             <a:fld id="{2F5CF1B8-E33B-2D4C-AE82-68295A1878F9}" type="datetimeFigureOut">
               <a:rPr lang="en-US" smtClean="0"/>
-              <a:t>4/20/19</a:t>
+              <a:t>4/25/19</a:t>
             </a:fld>
             <a:endParaRPr lang="en-US"/>
           </a:p>
@@ -613,7 +613,7 @@
           <a:p>
             <a:fld id="{368E5452-927C-804A-9893-4B0F8C82BC51}" type="datetimeFigureOut">
               <a:rPr lang="en-US" smtClean="0"/>
-              <a:t>4/20/19</a:t>
+              <a:t>4/25/19</a:t>
             </a:fld>
             <a:endParaRPr lang="en-US"/>
           </a:p>
@@ -811,7 +811,7 @@
           <a:p>
             <a:fld id="{368E5452-927C-804A-9893-4B0F8C82BC51}" type="datetimeFigureOut">
               <a:rPr lang="en-US" smtClean="0"/>
-              <a:t>4/20/19</a:t>
+              <a:t>4/25/19</a:t>
             </a:fld>
             <a:endParaRPr lang="en-US"/>
           </a:p>
@@ -1019,7 +1019,7 @@
           <a:p>
             <a:fld id="{368E5452-927C-804A-9893-4B0F8C82BC51}" type="datetimeFigureOut">
               <a:rPr lang="en-US" smtClean="0"/>
-              <a:t>4/20/19</a:t>
+              <a:t>4/25/19</a:t>
             </a:fld>
             <a:endParaRPr lang="en-US"/>
           </a:p>
@@ -1217,7 +1217,7 @@
           <a:p>
             <a:fld id="{368E5452-927C-804A-9893-4B0F8C82BC51}" type="datetimeFigureOut">
               <a:rPr lang="en-US" smtClean="0"/>
-              <a:t>4/20/19</a:t>
+              <a:t>4/25/19</a:t>
             </a:fld>
             <a:endParaRPr lang="en-US"/>
           </a:p>
@@ -1492,7 +1492,7 @@
           <a:p>
             <a:fld id="{368E5452-927C-804A-9893-4B0F8C82BC51}" type="datetimeFigureOut">
               <a:rPr lang="en-US" smtClean="0"/>
-              <a:t>4/20/19</a:t>
+              <a:t>4/25/19</a:t>
             </a:fld>
             <a:endParaRPr lang="en-US"/>
           </a:p>
@@ -1757,7 +1757,7 @@
           <a:p>
             <a:fld id="{368E5452-927C-804A-9893-4B0F8C82BC51}" type="datetimeFigureOut">
               <a:rPr lang="en-US" smtClean="0"/>
-              <a:t>4/20/19</a:t>
+              <a:t>4/25/19</a:t>
             </a:fld>
             <a:endParaRPr lang="en-US"/>
           </a:p>
@@ -2169,7 +2169,7 @@
           <a:p>
             <a:fld id="{368E5452-927C-804A-9893-4B0F8C82BC51}" type="datetimeFigureOut">
               <a:rPr lang="en-US" smtClean="0"/>
-              <a:t>4/20/19</a:t>
+              <a:t>4/25/19</a:t>
             </a:fld>
             <a:endParaRPr lang="en-US"/>
           </a:p>
@@ -2310,7 +2310,7 @@
           <a:p>
             <a:fld id="{368E5452-927C-804A-9893-4B0F8C82BC51}" type="datetimeFigureOut">
               <a:rPr lang="en-US" smtClean="0"/>
-              <a:t>4/20/19</a:t>
+              <a:t>4/25/19</a:t>
             </a:fld>
             <a:endParaRPr lang="en-US"/>
           </a:p>
@@ -2423,7 +2423,7 @@
           <a:p>
             <a:fld id="{368E5452-927C-804A-9893-4B0F8C82BC51}" type="datetimeFigureOut">
               <a:rPr lang="en-US" smtClean="0"/>
-              <a:t>4/20/19</a:t>
+              <a:t>4/25/19</a:t>
             </a:fld>
             <a:endParaRPr lang="en-US"/>
           </a:p>
@@ -2734,7 +2734,7 @@
           <a:p>
             <a:fld id="{368E5452-927C-804A-9893-4B0F8C82BC51}" type="datetimeFigureOut">
               <a:rPr lang="en-US" smtClean="0"/>
-              <a:t>4/20/19</a:t>
+              <a:t>4/25/19</a:t>
             </a:fld>
             <a:endParaRPr lang="en-US"/>
           </a:p>
@@ -3022,7 +3022,7 @@
           <a:p>
             <a:fld id="{368E5452-927C-804A-9893-4B0F8C82BC51}" type="datetimeFigureOut">
               <a:rPr lang="en-US" smtClean="0"/>
-              <a:t>4/20/19</a:t>
+              <a:t>4/25/19</a:t>
             </a:fld>
             <a:endParaRPr lang="en-US"/>
           </a:p>
@@ -3263,7 +3263,7 @@
           <a:p>
             <a:fld id="{368E5452-927C-804A-9893-4B0F8C82BC51}" type="datetimeFigureOut">
               <a:rPr lang="en-US" smtClean="0"/>
-              <a:t>4/20/19</a:t>
+              <a:t>4/25/19</a:t>
             </a:fld>
             <a:endParaRPr lang="en-US"/>
           </a:p>
@@ -9787,8 +9787,8 @@
             </p:nvCxnSpPr>
             <p:spPr>
               <a:xfrm flipV="1">
-                <a:off x="8145346" y="4886325"/>
-                <a:ext cx="325162" cy="285750"/>
+                <a:off x="8145346" y="5187241"/>
+                <a:ext cx="146917" cy="123377"/>
               </a:xfrm>
               <a:prstGeom prst="straightConnector1">
                 <a:avLst/>
@@ -9861,7 +9861,7 @@
             </p:nvCxnSpPr>
             <p:spPr>
               <a:xfrm flipV="1">
-                <a:off x="8201214" y="5186363"/>
+                <a:off x="8201214" y="5282280"/>
                 <a:ext cx="301872" cy="138112"/>
               </a:xfrm>
               <a:prstGeom prst="straightConnector1">
@@ -9943,7 +9943,7 @@
             </p:nvCxnSpPr>
             <p:spPr>
               <a:xfrm flipV="1">
-                <a:off x="8320825" y="5006580"/>
+                <a:off x="8320825" y="5145124"/>
                 <a:ext cx="364123" cy="84236"/>
               </a:xfrm>
               <a:prstGeom prst="straightConnector1">
@@ -9984,8 +9984,8 @@
         </p:nvSpPr>
         <p:spPr>
           <a:xfrm>
-            <a:off x="4147217" y="2729904"/>
-            <a:ext cx="738619" cy="292388"/>
+            <a:off x="3760533" y="2742019"/>
+            <a:ext cx="1113203" cy="461665"/>
           </a:xfrm>
           <a:prstGeom prst="rect">
             <a:avLst/>
@@ -10000,8 +10000,8 @@
           <a:p>
             <a:pPr algn="ctr"/>
             <a:r>
-              <a:rPr lang="en-US" sz="1300" b="1" dirty="0"/>
-              <a:t>AL1</a:t>
+              <a:rPr lang="en-US" sz="1200" b="1" dirty="0"/>
+              <a:t>Distance Sampling </a:t>
             </a:r>
           </a:p>
         </p:txBody>
@@ -10020,8 +10020,8 @@
         </p:nvSpPr>
         <p:spPr>
           <a:xfrm>
-            <a:off x="4120268" y="2536456"/>
-            <a:ext cx="792517" cy="292388"/>
+            <a:off x="3571169" y="2547057"/>
+            <a:ext cx="1712550" cy="276999"/>
           </a:xfrm>
           <a:prstGeom prst="rect">
             <a:avLst/>
@@ -10036,8 +10036,8 @@
           <a:p>
             <a:pPr algn="ctr"/>
             <a:r>
-              <a:rPr lang="en-US" sz="1300" b="1" dirty="0"/>
-              <a:t>AL2</a:t>
+              <a:rPr lang="en-US" sz="1200" b="1" dirty="0"/>
+              <a:t>Basic Sampling</a:t>
             </a:r>
           </a:p>
         </p:txBody>
@@ -10937,7 +10937,7 @@
         <p:spPr>
           <a:xfrm>
             <a:off x="3939620" y="2364002"/>
-            <a:ext cx="1037830" cy="292388"/>
+            <a:ext cx="1037830" cy="276999"/>
           </a:xfrm>
           <a:prstGeom prst="rect">
             <a:avLst/>
@@ -10952,7 +10952,7 @@
           <a:p>
             <a:pPr algn="ctr"/>
             <a:r>
-              <a:rPr lang="en-US" sz="1300" b="1" dirty="0"/>
+              <a:rPr lang="en-US" sz="1200" b="1" dirty="0"/>
               <a:t>Random</a:t>
             </a:r>
           </a:p>
@@ -10960,73 +10960,24 @@
       </p:sp>
       <p:cxnSp>
         <p:nvCxnSpPr>
-          <p:cNvPr id="55" name="Elbow Connector 54">
-            <a:extLst>
-              <a:ext uri="{FF2B5EF4-FFF2-40B4-BE49-F238E27FC236}">
-                <a16:creationId xmlns:a16="http://schemas.microsoft.com/office/drawing/2014/main" id="{0885EDE8-5287-AF49-B1F7-199395140165}"/>
+          <p:cNvPr id="56" name="Elbow Connector 55">
+            <a:extLst>
+              <a:ext uri="{FF2B5EF4-FFF2-40B4-BE49-F238E27FC236}">
+                <a16:creationId xmlns:a16="http://schemas.microsoft.com/office/drawing/2014/main" id="{F521E214-A51D-3F4B-89FD-8B377FF32B66}"/>
               </a:ext>
             </a:extLst>
           </p:cNvPr>
           <p:cNvCxnSpPr>
             <a:cxnSpLocks/>
-            <a:stCxn id="45" idx="2"/>
-            <a:endCxn id="14" idx="2"/>
-          </p:cNvCxnSpPr>
-          <p:nvPr/>
-        </p:nvCxnSpPr>
-        <p:spPr>
-          <a:xfrm rot="5400000" flipH="1" flipV="1">
-            <a:off x="8072321" y="2236387"/>
-            <a:ext cx="223269" cy="2647823"/>
-          </a:xfrm>
-          <a:prstGeom prst="bentConnector3">
-            <a:avLst>
-              <a:gd name="adj1" fmla="val -102388"/>
-            </a:avLst>
-          </a:prstGeom>
-          <a:ln w="38100">
-            <a:solidFill>
-              <a:schemeClr val="bg1">
-                <a:lumMod val="50000"/>
-              </a:schemeClr>
-            </a:solidFill>
-            <a:tailEnd type="triangle"/>
-          </a:ln>
-        </p:spPr>
-        <p:style>
-          <a:lnRef idx="1">
-            <a:schemeClr val="accent1"/>
-          </a:lnRef>
-          <a:fillRef idx="0">
-            <a:schemeClr val="accent1"/>
-          </a:fillRef>
-          <a:effectRef idx="0">
-            <a:schemeClr val="accent1"/>
-          </a:effectRef>
-          <a:fontRef idx="minor">
-            <a:schemeClr val="tx1"/>
-          </a:fontRef>
-        </p:style>
-      </p:cxnSp>
-      <p:cxnSp>
-        <p:nvCxnSpPr>
-          <p:cNvPr id="56" name="Elbow Connector 55">
-            <a:extLst>
-              <a:ext uri="{FF2B5EF4-FFF2-40B4-BE49-F238E27FC236}">
-                <a16:creationId xmlns:a16="http://schemas.microsoft.com/office/drawing/2014/main" id="{F521E214-A51D-3F4B-89FD-8B377FF32B66}"/>
-              </a:ext>
-            </a:extLst>
-          </p:cNvPr>
-          <p:cNvCxnSpPr>
             <a:stCxn id="13" idx="0"/>
-            <a:endCxn id="48" idx="0"/>
+            <a:endCxn id="23" idx="0"/>
           </p:cNvCxnSpPr>
           <p:nvPr/>
         </p:nvCxnSpPr>
         <p:spPr>
           <a:xfrm rot="16200000" flipV="1">
-            <a:off x="8185721" y="233137"/>
-            <a:ext cx="12700" cy="2572393"/>
+            <a:off x="6984383" y="-968200"/>
+            <a:ext cx="12700" cy="4975068"/>
           </a:xfrm>
           <a:prstGeom prst="bentConnector3">
             <a:avLst>
@@ -11071,8 +11022,8 @@
         </p:nvSpPr>
         <p:spPr>
           <a:xfrm>
-            <a:off x="7307727" y="974581"/>
-            <a:ext cx="1652504" cy="646331"/>
+            <a:off x="6205391" y="974177"/>
+            <a:ext cx="1652504" cy="369332"/>
           </a:xfrm>
           <a:prstGeom prst="rect">
             <a:avLst/>
@@ -11089,13 +11040,6 @@
             <a:r>
               <a:rPr lang="en-US" b="1" dirty="0"/>
               <a:t>Active Learning</a:t>
-            </a:r>
-          </a:p>
-          <a:p>
-            <a:pPr algn="ctr"/>
-            <a:r>
-              <a:rPr lang="en-US" b="1" dirty="0"/>
-              <a:t>Strategies</a:t>
             </a:r>
           </a:p>
         </p:txBody>

</xml_diff>

<commit_message>
Addressing more comments in architecture
</commit_message>
<xml_diff>
--- a/alpolyner.pptx
+++ b/alpolyner.pptx
@@ -199,7 +199,7 @@
           <a:p>
             <a:fld id="{2F5CF1B8-E33B-2D4C-AE82-68295A1878F9}" type="datetimeFigureOut">
               <a:rPr lang="en-US" smtClean="0"/>
-              <a:t>4/25/19</a:t>
+              <a:t>4/27/19</a:t>
             </a:fld>
             <a:endParaRPr lang="en-US"/>
           </a:p>
@@ -613,7 +613,7 @@
           <a:p>
             <a:fld id="{368E5452-927C-804A-9893-4B0F8C82BC51}" type="datetimeFigureOut">
               <a:rPr lang="en-US" smtClean="0"/>
-              <a:t>4/25/19</a:t>
+              <a:t>4/27/19</a:t>
             </a:fld>
             <a:endParaRPr lang="en-US"/>
           </a:p>
@@ -811,7 +811,7 @@
           <a:p>
             <a:fld id="{368E5452-927C-804A-9893-4B0F8C82BC51}" type="datetimeFigureOut">
               <a:rPr lang="en-US" smtClean="0"/>
-              <a:t>4/25/19</a:t>
+              <a:t>4/27/19</a:t>
             </a:fld>
             <a:endParaRPr lang="en-US"/>
           </a:p>
@@ -1019,7 +1019,7 @@
           <a:p>
             <a:fld id="{368E5452-927C-804A-9893-4B0F8C82BC51}" type="datetimeFigureOut">
               <a:rPr lang="en-US" smtClean="0"/>
-              <a:t>4/25/19</a:t>
+              <a:t>4/27/19</a:t>
             </a:fld>
             <a:endParaRPr lang="en-US"/>
           </a:p>
@@ -1217,7 +1217,7 @@
           <a:p>
             <a:fld id="{368E5452-927C-804A-9893-4B0F8C82BC51}" type="datetimeFigureOut">
               <a:rPr lang="en-US" smtClean="0"/>
-              <a:t>4/25/19</a:t>
+              <a:t>4/27/19</a:t>
             </a:fld>
             <a:endParaRPr lang="en-US"/>
           </a:p>
@@ -1492,7 +1492,7 @@
           <a:p>
             <a:fld id="{368E5452-927C-804A-9893-4B0F8C82BC51}" type="datetimeFigureOut">
               <a:rPr lang="en-US" smtClean="0"/>
-              <a:t>4/25/19</a:t>
+              <a:t>4/27/19</a:t>
             </a:fld>
             <a:endParaRPr lang="en-US"/>
           </a:p>
@@ -1757,7 +1757,7 @@
           <a:p>
             <a:fld id="{368E5452-927C-804A-9893-4B0F8C82BC51}" type="datetimeFigureOut">
               <a:rPr lang="en-US" smtClean="0"/>
-              <a:t>4/25/19</a:t>
+              <a:t>4/27/19</a:t>
             </a:fld>
             <a:endParaRPr lang="en-US"/>
           </a:p>
@@ -2169,7 +2169,7 @@
           <a:p>
             <a:fld id="{368E5452-927C-804A-9893-4B0F8C82BC51}" type="datetimeFigureOut">
               <a:rPr lang="en-US" smtClean="0"/>
-              <a:t>4/25/19</a:t>
+              <a:t>4/27/19</a:t>
             </a:fld>
             <a:endParaRPr lang="en-US"/>
           </a:p>
@@ -2310,7 +2310,7 @@
           <a:p>
             <a:fld id="{368E5452-927C-804A-9893-4B0F8C82BC51}" type="datetimeFigureOut">
               <a:rPr lang="en-US" smtClean="0"/>
-              <a:t>4/25/19</a:t>
+              <a:t>4/27/19</a:t>
             </a:fld>
             <a:endParaRPr lang="en-US"/>
           </a:p>
@@ -2423,7 +2423,7 @@
           <a:p>
             <a:fld id="{368E5452-927C-804A-9893-4B0F8C82BC51}" type="datetimeFigureOut">
               <a:rPr lang="en-US" smtClean="0"/>
-              <a:t>4/25/19</a:t>
+              <a:t>4/27/19</a:t>
             </a:fld>
             <a:endParaRPr lang="en-US"/>
           </a:p>
@@ -2734,7 +2734,7 @@
           <a:p>
             <a:fld id="{368E5452-927C-804A-9893-4B0F8C82BC51}" type="datetimeFigureOut">
               <a:rPr lang="en-US" smtClean="0"/>
-              <a:t>4/25/19</a:t>
+              <a:t>4/27/19</a:t>
             </a:fld>
             <a:endParaRPr lang="en-US"/>
           </a:p>
@@ -3022,7 +3022,7 @@
           <a:p>
             <a:fld id="{368E5452-927C-804A-9893-4B0F8C82BC51}" type="datetimeFigureOut">
               <a:rPr lang="en-US" smtClean="0"/>
-              <a:t>4/25/19</a:t>
+              <a:t>4/27/19</a:t>
             </a:fld>
             <a:endParaRPr lang="en-US"/>
           </a:p>
@@ -3263,7 +3263,7 @@
           <a:p>
             <a:fld id="{368E5452-927C-804A-9893-4B0F8C82BC51}" type="datetimeFigureOut">
               <a:rPr lang="en-US" smtClean="0"/>
-              <a:t>4/25/19</a:t>
+              <a:t>4/27/19</a:t>
             </a:fld>
             <a:endParaRPr lang="en-US"/>
           </a:p>
@@ -8726,6 +8726,49 @@
           </a:p>
         </p:txBody>
       </p:sp>
+      <p:sp>
+        <p:nvSpPr>
+          <p:cNvPr id="44" name="TextBox 43">
+            <a:extLst>
+              <a:ext uri="{FF2B5EF4-FFF2-40B4-BE49-F238E27FC236}">
+                <a16:creationId xmlns:a16="http://schemas.microsoft.com/office/drawing/2014/main" id="{848A19FE-48F8-144A-8103-51A3A577DEA9}"/>
+              </a:ext>
+            </a:extLst>
+          </p:cNvPr>
+          <p:cNvSpPr txBox="1"/>
+          <p:nvPr/>
+        </p:nvSpPr>
+        <p:spPr>
+          <a:xfrm>
+            <a:off x="2826358" y="792063"/>
+            <a:ext cx="1030988" cy="523220"/>
+          </a:xfrm>
+          <a:prstGeom prst="rect">
+            <a:avLst/>
+          </a:prstGeom>
+          <a:noFill/>
+        </p:spPr>
+        <p:txBody>
+          <a:bodyPr wrap="none" rtlCol="0">
+            <a:spAutoFit/>
+          </a:bodyPr>
+          <a:lstStyle/>
+          <a:p>
+            <a:pPr algn="ctr"/>
+            <a:r>
+              <a:rPr lang="en-US" sz="1400" b="1" dirty="0"/>
+              <a:t>Other </a:t>
+            </a:r>
+          </a:p>
+          <a:p>
+            <a:pPr algn="ctr"/>
+            <a:r>
+              <a:rPr lang="en-US" sz="1400" b="1" dirty="0"/>
+              <a:t>Documents</a:t>
+            </a:r>
+          </a:p>
+        </p:txBody>
+      </p:sp>
     </p:spTree>
     <p:extLst>
       <p:ext uri="{BB962C8B-B14F-4D97-AF65-F5344CB8AC3E}">
@@ -8770,7 +8813,7 @@
         </p:nvSpPr>
         <p:spPr>
           <a:xfrm>
-            <a:off x="4052459" y="2417274"/>
+            <a:off x="5576459" y="2417274"/>
             <a:ext cx="988101" cy="865550"/>
           </a:xfrm>
           <a:prstGeom prst="rect">
@@ -8824,7 +8867,7 @@
         </p:nvGrpSpPr>
         <p:grpSpPr>
           <a:xfrm>
-            <a:off x="10370017" y="2268866"/>
+            <a:off x="10028641" y="2549282"/>
             <a:ext cx="1381293" cy="1174346"/>
             <a:chOff x="10751600" y="1889032"/>
             <a:chExt cx="1381293" cy="1174346"/>
@@ -8933,8 +8976,8 @@
         </p:nvGrpSpPr>
         <p:grpSpPr>
           <a:xfrm>
-            <a:off x="111661" y="1829349"/>
-            <a:ext cx="1648379" cy="1599222"/>
+            <a:off x="111662" y="2268261"/>
+            <a:ext cx="1209176" cy="1402233"/>
             <a:chOff x="1294558" y="1891050"/>
             <a:chExt cx="3944792" cy="4825026"/>
           </a:xfrm>
@@ -9098,7 +9141,7 @@
         </p:nvSpPr>
         <p:spPr>
           <a:xfrm>
-            <a:off x="338042" y="3445503"/>
+            <a:off x="46475" y="1781987"/>
             <a:ext cx="1348190" cy="369332"/>
           </a:xfrm>
           <a:prstGeom prst="rect">
@@ -9133,7 +9176,7 @@
         </p:nvSpPr>
         <p:spPr>
           <a:xfrm>
-            <a:off x="8696159" y="1519334"/>
+            <a:off x="8610815" y="1504988"/>
             <a:ext cx="1551515" cy="923330"/>
           </a:xfrm>
           <a:prstGeom prst="rect">
@@ -9150,7 +9193,7 @@
             <a:pPr algn="ctr"/>
             <a:r>
               <a:rPr lang="en-US" b="1" dirty="0"/>
-              <a:t>(4) </a:t>
+              <a:t>(5) </a:t>
             </a:r>
             <a:br>
               <a:rPr lang="en-US" b="1" dirty="0"/>
@@ -9196,7 +9239,7 @@
         </p:blipFill>
         <p:spPr bwMode="auto">
           <a:xfrm>
-            <a:off x="9067622" y="2616072"/>
+            <a:off x="8982278" y="2616072"/>
             <a:ext cx="880491" cy="832592"/>
           </a:xfrm>
           <a:prstGeom prst="rect">
@@ -9227,7 +9270,7 @@
         </p:nvCxnSpPr>
         <p:spPr>
           <a:xfrm>
-            <a:off x="1765453" y="2982601"/>
+            <a:off x="1338733" y="2982601"/>
             <a:ext cx="377510" cy="0"/>
           </a:xfrm>
           <a:prstGeom prst="straightConnector1">
@@ -9272,7 +9315,7 @@
         </p:nvGrpSpPr>
         <p:grpSpPr>
           <a:xfrm>
-            <a:off x="3776599" y="2673999"/>
+            <a:off x="5300599" y="2673999"/>
             <a:ext cx="1003532" cy="772973"/>
             <a:chOff x="8068850" y="4791016"/>
             <a:chExt cx="616098" cy="675668"/>
@@ -9493,7 +9536,7 @@
         </p:nvSpPr>
         <p:spPr>
           <a:xfrm>
-            <a:off x="3901554" y="2600182"/>
+            <a:off x="5425554" y="2600182"/>
             <a:ext cx="1041235" cy="939367"/>
           </a:xfrm>
           <a:prstGeom prst="rect">
@@ -9547,7 +9590,7 @@
         </p:nvSpPr>
         <p:spPr>
           <a:xfrm>
-            <a:off x="3933425" y="1519334"/>
+            <a:off x="5457425" y="1504988"/>
             <a:ext cx="1126847" cy="923330"/>
           </a:xfrm>
           <a:prstGeom prst="rect">
@@ -9564,7 +9607,7 @@
             <a:pPr algn="ctr"/>
             <a:r>
               <a:rPr lang="en-US" b="1" dirty="0"/>
-              <a:t>(2)</a:t>
+              <a:t>(3)</a:t>
             </a:r>
           </a:p>
           <a:p>
@@ -9599,7 +9642,7 @@
         </p:nvCxnSpPr>
         <p:spPr>
           <a:xfrm>
-            <a:off x="3443759" y="2982601"/>
+            <a:off x="4967759" y="2982601"/>
             <a:ext cx="377510" cy="0"/>
           </a:xfrm>
           <a:prstGeom prst="straightConnector1">
@@ -9646,7 +9689,7 @@
         </p:nvCxnSpPr>
         <p:spPr>
           <a:xfrm>
-            <a:off x="4911642" y="2982601"/>
+            <a:off x="6435642" y="2982601"/>
             <a:ext cx="377510" cy="0"/>
           </a:xfrm>
           <a:prstGeom prst="straightConnector1">
@@ -9691,7 +9734,7 @@
         </p:nvGrpSpPr>
         <p:grpSpPr>
           <a:xfrm>
-            <a:off x="3716418" y="2778295"/>
+            <a:off x="5240418" y="2778295"/>
             <a:ext cx="1075466" cy="865550"/>
             <a:chOff x="5827342" y="1982364"/>
             <a:chExt cx="1075466" cy="976232"/>
@@ -9984,8 +10027,8 @@
         </p:nvSpPr>
         <p:spPr>
           <a:xfrm>
-            <a:off x="3760533" y="2742019"/>
-            <a:ext cx="1113203" cy="461665"/>
+            <a:off x="5284533" y="2742019"/>
+            <a:ext cx="1113203" cy="276999"/>
           </a:xfrm>
           <a:prstGeom prst="rect">
             <a:avLst/>
@@ -10001,7 +10044,7 @@
             <a:pPr algn="ctr"/>
             <a:r>
               <a:rPr lang="en-US" sz="1200" b="1" dirty="0"/>
-              <a:t>Distance Sampling </a:t>
+              <a:t>Distance UBS </a:t>
             </a:r>
           </a:p>
         </p:txBody>
@@ -10020,7 +10063,7 @@
         </p:nvSpPr>
         <p:spPr>
           <a:xfrm>
-            <a:off x="3571169" y="2547057"/>
+            <a:off x="5095169" y="2547057"/>
             <a:ext cx="1712550" cy="276999"/>
           </a:xfrm>
           <a:prstGeom prst="rect">
@@ -10037,7 +10080,7 @@
             <a:pPr algn="ctr"/>
             <a:r>
               <a:rPr lang="en-US" sz="1200" b="1" dirty="0"/>
-              <a:t>Basic Sampling</a:t>
+              <a:t>UBS</a:t>
             </a:r>
           </a:p>
         </p:txBody>
@@ -10056,8 +10099,8 @@
         </p:nvSpPr>
         <p:spPr>
           <a:xfrm>
-            <a:off x="2149678" y="2659916"/>
-            <a:ext cx="1357238" cy="685800"/>
+            <a:off x="1722958" y="2659916"/>
+            <a:ext cx="1169854" cy="685800"/>
           </a:xfrm>
           <a:prstGeom prst="roundRect">
             <a:avLst/>
@@ -10116,7 +10159,7 @@
         </p:nvSpPr>
         <p:spPr>
           <a:xfrm>
-            <a:off x="2130373" y="1519334"/>
+            <a:off x="1703653" y="1504988"/>
             <a:ext cx="1395849" cy="923330"/>
           </a:xfrm>
           <a:prstGeom prst="rect">
@@ -10166,8 +10209,8 @@
         </p:nvSpPr>
         <p:spPr>
           <a:xfrm>
-            <a:off x="2201717" y="2686303"/>
-            <a:ext cx="1352659" cy="646331"/>
+            <a:off x="1774998" y="2686303"/>
+            <a:ext cx="1144110" cy="646331"/>
           </a:xfrm>
           <a:prstGeom prst="rect">
             <a:avLst/>
@@ -10224,10 +10267,10 @@
       </p:sp>
       <p:grpSp>
         <p:nvGrpSpPr>
-          <p:cNvPr id="39" name="Group 38">
-            <a:extLst>
-              <a:ext uri="{FF2B5EF4-FFF2-40B4-BE49-F238E27FC236}">
-                <a16:creationId xmlns:a16="http://schemas.microsoft.com/office/drawing/2014/main" id="{A82D8008-C41D-8447-B539-F310EC1A7772}"/>
+          <p:cNvPr id="42" name="Group 41">
+            <a:extLst>
+              <a:ext uri="{FF2B5EF4-FFF2-40B4-BE49-F238E27FC236}">
+                <a16:creationId xmlns:a16="http://schemas.microsoft.com/office/drawing/2014/main" id="{E3E19413-C160-3A46-90CD-3846B198EBF3}"/>
               </a:ext>
             </a:extLst>
           </p:cNvPr>
@@ -10236,161 +10279,8 @@
         </p:nvGrpSpPr>
         <p:grpSpPr>
           <a:xfrm>
-            <a:off x="5176624" y="2528933"/>
-            <a:ext cx="1272014" cy="1143000"/>
-            <a:chOff x="7862996" y="1894949"/>
-            <a:chExt cx="1272014" cy="1143000"/>
-          </a:xfrm>
-        </p:grpSpPr>
-        <p:sp>
-          <p:nvSpPr>
-            <p:cNvPr id="40" name="Vertical Scroll 39">
-              <a:extLst>
-                <a:ext uri="{FF2B5EF4-FFF2-40B4-BE49-F238E27FC236}">
-                  <a16:creationId xmlns:a16="http://schemas.microsoft.com/office/drawing/2014/main" id="{4881A45C-BF2B-4443-AB75-16786886D999}"/>
-                </a:ext>
-              </a:extLst>
-            </p:cNvPr>
-            <p:cNvSpPr/>
-            <p:nvPr/>
-          </p:nvSpPr>
-          <p:spPr>
-            <a:xfrm>
-              <a:off x="7862996" y="1894949"/>
-              <a:ext cx="1272014" cy="1143000"/>
-            </a:xfrm>
-            <a:prstGeom prst="verticalScroll">
-              <a:avLst/>
-            </a:prstGeom>
-            <a:solidFill>
-              <a:schemeClr val="accent2">
-                <a:lumMod val="60000"/>
-                <a:lumOff val="40000"/>
-              </a:schemeClr>
-            </a:solidFill>
-            <a:ln w="19050">
-              <a:solidFill>
-                <a:schemeClr val="accent2">
-                  <a:lumMod val="50000"/>
-                </a:schemeClr>
-              </a:solidFill>
-            </a:ln>
-          </p:spPr>
-          <p:style>
-            <a:lnRef idx="2">
-              <a:schemeClr val="accent1">
-                <a:shade val="50000"/>
-              </a:schemeClr>
-            </a:lnRef>
-            <a:fillRef idx="1">
-              <a:schemeClr val="accent1"/>
-            </a:fillRef>
-            <a:effectRef idx="0">
-              <a:schemeClr val="accent1"/>
-            </a:effectRef>
-            <a:fontRef idx="minor">
-              <a:schemeClr val="lt1"/>
-            </a:fontRef>
-          </p:style>
-          <p:txBody>
-            <a:bodyPr rtlCol="0" anchor="ctr"/>
-            <a:lstStyle/>
-            <a:p>
-              <a:pPr algn="ctr"/>
-              <a:endParaRPr lang="en-US"/>
-            </a:p>
-          </p:txBody>
-        </p:sp>
-        <p:sp>
-          <p:nvSpPr>
-            <p:cNvPr id="41" name="Rectangle 40">
-              <a:extLst>
-                <a:ext uri="{FF2B5EF4-FFF2-40B4-BE49-F238E27FC236}">
-                  <a16:creationId xmlns:a16="http://schemas.microsoft.com/office/drawing/2014/main" id="{936148FE-F67A-4B4F-986A-B885C83B2CE4}"/>
-                </a:ext>
-              </a:extLst>
-            </p:cNvPr>
-            <p:cNvSpPr/>
-            <p:nvPr/>
-          </p:nvSpPr>
-          <p:spPr>
-            <a:xfrm>
-              <a:off x="8020988" y="2155531"/>
-              <a:ext cx="937436" cy="738664"/>
-            </a:xfrm>
-            <a:prstGeom prst="rect">
-              <a:avLst/>
-            </a:prstGeom>
-          </p:spPr>
-          <p:txBody>
-            <a:bodyPr wrap="none">
-              <a:spAutoFit/>
-            </a:bodyPr>
-            <a:lstStyle/>
-            <a:p>
-              <a:pPr algn="ctr"/>
-              <a:r>
-                <a:rPr lang="en-US" sz="1400" b="1" dirty="0">
-                  <a:solidFill>
-                    <a:schemeClr val="accent2">
-                      <a:lumMod val="50000"/>
-                    </a:schemeClr>
-                  </a:solidFill>
-                </a:rPr>
-                <a:t>Candidate</a:t>
-              </a:r>
-            </a:p>
-            <a:p>
-              <a:pPr algn="ctr"/>
-              <a:r>
-                <a:rPr lang="en-US" sz="1400" b="1" dirty="0">
-                  <a:solidFill>
-                    <a:schemeClr val="accent2">
-                      <a:lumMod val="50000"/>
-                    </a:schemeClr>
-                  </a:solidFill>
-                </a:rPr>
-                <a:t>entity</a:t>
-              </a:r>
-              <a:br>
-                <a:rPr lang="en-US" sz="1400" b="1" dirty="0">
-                  <a:solidFill>
-                    <a:schemeClr val="accent2">
-                      <a:lumMod val="50000"/>
-                    </a:schemeClr>
-                  </a:solidFill>
-                </a:rPr>
-              </a:br>
-              <a:r>
-                <a:rPr lang="en-US" sz="1400" b="1" dirty="0">
-                  <a:solidFill>
-                    <a:schemeClr val="accent2">
-                      <a:lumMod val="50000"/>
-                    </a:schemeClr>
-                  </a:solidFill>
-                </a:rPr>
-                <a:t>referents</a:t>
-              </a:r>
-            </a:p>
-          </p:txBody>
-        </p:sp>
-      </p:grpSp>
-      <p:grpSp>
-        <p:nvGrpSpPr>
-          <p:cNvPr id="42" name="Group 41">
-            <a:extLst>
-              <a:ext uri="{FF2B5EF4-FFF2-40B4-BE49-F238E27FC236}">
-                <a16:creationId xmlns:a16="http://schemas.microsoft.com/office/drawing/2014/main" id="{E3E19413-C160-3A46-90CD-3846B198EBF3}"/>
-              </a:ext>
-            </a:extLst>
-          </p:cNvPr>
-          <p:cNvGrpSpPr/>
-          <p:nvPr/>
-        </p:nvGrpSpPr>
-        <p:grpSpPr>
-          <a:xfrm>
-            <a:off x="6495161" y="2540465"/>
-            <a:ext cx="973789" cy="1131468"/>
+            <a:off x="6812996" y="2569414"/>
+            <a:ext cx="842593" cy="751326"/>
             <a:chOff x="6153873" y="4315382"/>
             <a:chExt cx="1314913" cy="1510006"/>
           </a:xfrm>
@@ -10533,10 +10423,10 @@
       </p:grpSp>
       <p:cxnSp>
         <p:nvCxnSpPr>
-          <p:cNvPr id="46" name="Straight Arrow Connector 45">
-            <a:extLst>
-              <a:ext uri="{FF2B5EF4-FFF2-40B4-BE49-F238E27FC236}">
-                <a16:creationId xmlns:a16="http://schemas.microsoft.com/office/drawing/2014/main" id="{E24672BF-A053-0743-B3CF-DCF8F21E5156}"/>
+          <p:cNvPr id="47" name="Straight Arrow Connector 46">
+            <a:extLst>
+              <a:ext uri="{FF2B5EF4-FFF2-40B4-BE49-F238E27FC236}">
+                <a16:creationId xmlns:a16="http://schemas.microsoft.com/office/drawing/2014/main" id="{10D1515E-CA7A-5C40-A297-308950772326}"/>
               </a:ext>
             </a:extLst>
           </p:cNvPr>
@@ -10547,8 +10437,8 @@
         </p:nvCxnSpPr>
         <p:spPr>
           <a:xfrm>
-            <a:off x="6324960" y="2982601"/>
-            <a:ext cx="377510" cy="0"/>
+            <a:off x="7478415" y="2982601"/>
+            <a:ext cx="365760" cy="0"/>
           </a:xfrm>
           <a:prstGeom prst="straightConnector1">
             <a:avLst/>
@@ -10578,53 +10468,6 @@
           </a:fontRef>
         </p:style>
       </p:cxnSp>
-      <p:cxnSp>
-        <p:nvCxnSpPr>
-          <p:cNvPr id="47" name="Straight Arrow Connector 46">
-            <a:extLst>
-              <a:ext uri="{FF2B5EF4-FFF2-40B4-BE49-F238E27FC236}">
-                <a16:creationId xmlns:a16="http://schemas.microsoft.com/office/drawing/2014/main" id="{10D1515E-CA7A-5C40-A297-308950772326}"/>
-              </a:ext>
-            </a:extLst>
-          </p:cNvPr>
-          <p:cNvCxnSpPr>
-            <a:cxnSpLocks/>
-          </p:cNvCxnSpPr>
-          <p:nvPr/>
-        </p:nvCxnSpPr>
-        <p:spPr>
-          <a:xfrm>
-            <a:off x="7307727" y="2982601"/>
-            <a:ext cx="365760" cy="0"/>
-          </a:xfrm>
-          <a:prstGeom prst="straightConnector1">
-            <a:avLst/>
-          </a:prstGeom>
-          <a:ln w="38100">
-            <a:solidFill>
-              <a:schemeClr val="tx1">
-                <a:lumMod val="65000"/>
-                <a:lumOff val="35000"/>
-              </a:schemeClr>
-            </a:solidFill>
-            <a:tailEnd type="triangle"/>
-          </a:ln>
-        </p:spPr>
-        <p:style>
-          <a:lnRef idx="1">
-            <a:schemeClr val="accent1"/>
-          </a:lnRef>
-          <a:fillRef idx="0">
-            <a:schemeClr val="accent1"/>
-          </a:fillRef>
-          <a:effectRef idx="0">
-            <a:schemeClr val="accent1"/>
-          </a:effectRef>
-          <a:fontRef idx="minor">
-            <a:schemeClr val="tx1"/>
-          </a:fontRef>
-        </p:style>
-      </p:cxnSp>
       <p:sp>
         <p:nvSpPr>
           <p:cNvPr id="48" name="TextBox 47">
@@ -10639,7 +10482,7 @@
         </p:nvSpPr>
         <p:spPr>
           <a:xfrm>
-            <a:off x="5941152" y="1519334"/>
+            <a:off x="6867744" y="1504988"/>
             <a:ext cx="1916743" cy="923330"/>
           </a:xfrm>
           <a:prstGeom prst="rect">
@@ -10656,7 +10499,7 @@
             <a:pPr algn="ctr"/>
             <a:r>
               <a:rPr lang="en-US" b="1" dirty="0"/>
-              <a:t>(3) </a:t>
+              <a:t>(4) </a:t>
             </a:r>
             <a:br>
               <a:rPr lang="en-US" b="1" dirty="0"/>
@@ -10689,10 +10532,10 @@
         </p:nvGrpSpPr>
         <p:grpSpPr>
           <a:xfrm>
-            <a:off x="7591586" y="2575530"/>
-            <a:ext cx="1175136" cy="908656"/>
-            <a:chOff x="7862995" y="1964856"/>
-            <a:chExt cx="1175136" cy="908656"/>
+            <a:off x="7759928" y="2575530"/>
+            <a:ext cx="999014" cy="908656"/>
+            <a:chOff x="7978524" y="1964856"/>
+            <a:chExt cx="965214" cy="908656"/>
           </a:xfrm>
         </p:grpSpPr>
         <p:sp>
@@ -10709,8 +10552,8 @@
           </p:nvSpPr>
           <p:spPr>
             <a:xfrm>
-              <a:off x="7862995" y="1964856"/>
-              <a:ext cx="1175136" cy="908656"/>
+              <a:off x="7978524" y="1964856"/>
+              <a:ext cx="965214" cy="908656"/>
             </a:xfrm>
             <a:prstGeom prst="verticalScroll">
               <a:avLst/>
@@ -10844,7 +10687,7 @@
         </p:nvCxnSpPr>
         <p:spPr>
           <a:xfrm>
-            <a:off x="8682198" y="2982601"/>
+            <a:off x="8633430" y="2982601"/>
             <a:ext cx="365760" cy="0"/>
           </a:xfrm>
           <a:prstGeom prst="straightConnector1">
@@ -10891,7 +10734,7 @@
         </p:nvCxnSpPr>
         <p:spPr>
           <a:xfrm>
-            <a:off x="9986428" y="2982601"/>
+            <a:off x="9901084" y="2982601"/>
             <a:ext cx="365760" cy="0"/>
           </a:xfrm>
           <a:prstGeom prst="straightConnector1">
@@ -10936,7 +10779,7 @@
         </p:nvSpPr>
         <p:spPr>
           <a:xfrm>
-            <a:off x="3939620" y="2364002"/>
+            <a:off x="5463620" y="2364002"/>
             <a:ext cx="1037830" cy="276999"/>
           </a:xfrm>
           <a:prstGeom prst="rect">
@@ -10976,8 +10819,8 @@
         </p:nvCxnSpPr>
         <p:spPr>
           <a:xfrm rot="16200000" flipV="1">
-            <a:off x="6984383" y="-968200"/>
-            <a:ext cx="12700" cy="4975068"/>
+            <a:off x="7703711" y="-177874"/>
+            <a:ext cx="12700" cy="3365724"/>
           </a:xfrm>
           <a:prstGeom prst="bentConnector3">
             <a:avLst>
@@ -11022,7 +10865,7 @@
         </p:nvSpPr>
         <p:spPr>
           <a:xfrm>
-            <a:off x="6205391" y="974177"/>
+            <a:off x="6814991" y="974177"/>
             <a:ext cx="1652504" cy="369332"/>
           </a:xfrm>
           <a:prstGeom prst="rect">
@@ -11041,6 +10884,752 @@
               <a:rPr lang="en-US" b="1" dirty="0"/>
               <a:t>Active Learning</a:t>
             </a:r>
+          </a:p>
+        </p:txBody>
+      </p:sp>
+      <p:grpSp>
+        <p:nvGrpSpPr>
+          <p:cNvPr id="2" name="Group 1">
+            <a:extLst>
+              <a:ext uri="{FF2B5EF4-FFF2-40B4-BE49-F238E27FC236}">
+                <a16:creationId xmlns:a16="http://schemas.microsoft.com/office/drawing/2014/main" id="{DD8BE1AD-D386-ED44-AE67-C7C78C2DC16C}"/>
+              </a:ext>
+            </a:extLst>
+          </p:cNvPr>
+          <p:cNvGrpSpPr/>
+          <p:nvPr/>
+        </p:nvGrpSpPr>
+        <p:grpSpPr>
+          <a:xfrm>
+            <a:off x="3327757" y="2586200"/>
+            <a:ext cx="959237" cy="818570"/>
+            <a:chOff x="3109173" y="4308691"/>
+            <a:chExt cx="1130911" cy="901826"/>
+          </a:xfrm>
+        </p:grpSpPr>
+        <p:grpSp>
+          <p:nvGrpSpPr>
+            <p:cNvPr id="55" name="Group 54">
+              <a:extLst>
+                <a:ext uri="{FF2B5EF4-FFF2-40B4-BE49-F238E27FC236}">
+                  <a16:creationId xmlns:a16="http://schemas.microsoft.com/office/drawing/2014/main" id="{FE5BA03C-81DA-4A45-B482-BBE7D966D42D}"/>
+                </a:ext>
+              </a:extLst>
+            </p:cNvPr>
+            <p:cNvGrpSpPr/>
+            <p:nvPr/>
+          </p:nvGrpSpPr>
+          <p:grpSpPr>
+            <a:xfrm>
+              <a:off x="3109173" y="4344967"/>
+              <a:ext cx="1075466" cy="865550"/>
+              <a:chOff x="5827342" y="1982364"/>
+              <a:chExt cx="1075466" cy="976232"/>
+            </a:xfrm>
+          </p:grpSpPr>
+          <p:sp>
+            <p:nvSpPr>
+              <p:cNvPr id="58" name="Rectangle 57">
+                <a:extLst>
+                  <a:ext uri="{FF2B5EF4-FFF2-40B4-BE49-F238E27FC236}">
+                    <a16:creationId xmlns:a16="http://schemas.microsoft.com/office/drawing/2014/main" id="{DA5CFE49-6EAC-364C-ACC0-765774FA7EED}"/>
+                  </a:ext>
+                </a:extLst>
+              </p:cNvPr>
+              <p:cNvSpPr/>
+              <p:nvPr/>
+            </p:nvSpPr>
+            <p:spPr>
+              <a:xfrm>
+                <a:off x="5914707" y="1982364"/>
+                <a:ext cx="988101" cy="976232"/>
+              </a:xfrm>
+              <a:prstGeom prst="rect">
+                <a:avLst/>
+              </a:prstGeom>
+              <a:solidFill>
+                <a:schemeClr val="bg1"/>
+              </a:solidFill>
+              <a:ln w="38100">
+                <a:solidFill>
+                  <a:srgbClr val="C00000"/>
+                </a:solidFill>
+              </a:ln>
+            </p:spPr>
+            <p:style>
+              <a:lnRef idx="2">
+                <a:schemeClr val="accent1">
+                  <a:shade val="50000"/>
+                </a:schemeClr>
+              </a:lnRef>
+              <a:fillRef idx="1">
+                <a:schemeClr val="accent1"/>
+              </a:fillRef>
+              <a:effectRef idx="0">
+                <a:schemeClr val="accent1"/>
+              </a:effectRef>
+              <a:fontRef idx="minor">
+                <a:schemeClr val="lt1"/>
+              </a:fontRef>
+            </p:style>
+            <p:txBody>
+              <a:bodyPr rtlCol="0" anchor="ctr"/>
+              <a:lstStyle/>
+              <a:p>
+                <a:pPr algn="ctr"/>
+                <a:endParaRPr lang="en-US" dirty="0"/>
+              </a:p>
+            </p:txBody>
+          </p:sp>
+          <p:grpSp>
+            <p:nvGrpSpPr>
+              <p:cNvPr id="59" name="Group 58">
+                <a:extLst>
+                  <a:ext uri="{FF2B5EF4-FFF2-40B4-BE49-F238E27FC236}">
+                    <a16:creationId xmlns:a16="http://schemas.microsoft.com/office/drawing/2014/main" id="{0CE377BD-A620-A249-86C0-1B23F99BC4FC}"/>
+                  </a:ext>
+                </a:extLst>
+              </p:cNvPr>
+              <p:cNvGrpSpPr/>
+              <p:nvPr/>
+            </p:nvGrpSpPr>
+            <p:grpSpPr>
+              <a:xfrm>
+                <a:off x="5827342" y="1982364"/>
+                <a:ext cx="1003532" cy="871817"/>
+                <a:chOff x="8068850" y="4791016"/>
+                <a:chExt cx="616098" cy="675668"/>
+              </a:xfrm>
+            </p:grpSpPr>
+            <p:cxnSp>
+              <p:nvCxnSpPr>
+                <p:cNvPr id="60" name="Straight Arrow Connector 59">
+                  <a:extLst>
+                    <a:ext uri="{FF2B5EF4-FFF2-40B4-BE49-F238E27FC236}">
+                      <a16:creationId xmlns:a16="http://schemas.microsoft.com/office/drawing/2014/main" id="{C8F11EBE-2817-484E-B2F7-52118F221AB2}"/>
+                    </a:ext>
+                  </a:extLst>
+                </p:cNvPr>
+                <p:cNvCxnSpPr>
+                  <a:cxnSpLocks/>
+                </p:cNvCxnSpPr>
+                <p:nvPr/>
+              </p:nvCxnSpPr>
+              <p:spPr>
+                <a:xfrm flipV="1">
+                  <a:off x="8145346" y="5187241"/>
+                  <a:ext cx="146917" cy="123377"/>
+                </a:xfrm>
+                <a:prstGeom prst="straightConnector1">
+                  <a:avLst/>
+                </a:prstGeom>
+                <a:ln w="28575">
+                  <a:tailEnd type="triangle"/>
+                </a:ln>
+              </p:spPr>
+              <p:style>
+                <a:lnRef idx="1">
+                  <a:schemeClr val="accent1"/>
+                </a:lnRef>
+                <a:fillRef idx="0">
+                  <a:schemeClr val="accent1"/>
+                </a:fillRef>
+                <a:effectRef idx="0">
+                  <a:schemeClr val="accent1"/>
+                </a:effectRef>
+                <a:fontRef idx="minor">
+                  <a:schemeClr val="tx1"/>
+                </a:fontRef>
+              </p:style>
+            </p:cxnSp>
+            <p:sp>
+              <p:nvSpPr>
+                <p:cNvPr id="61" name="TextBox 60">
+                  <a:extLst>
+                    <a:ext uri="{FF2B5EF4-FFF2-40B4-BE49-F238E27FC236}">
+                      <a16:creationId xmlns:a16="http://schemas.microsoft.com/office/drawing/2014/main" id="{4DFDFA74-08B2-D64B-BFE6-8F72375CAD86}"/>
+                    </a:ext>
+                  </a:extLst>
+                </p:cNvPr>
+                <p:cNvSpPr txBox="1"/>
+                <p:nvPr/>
+              </p:nvSpPr>
+              <p:spPr>
+                <a:xfrm>
+                  <a:off x="8068850" y="4791016"/>
+                  <a:ext cx="401099" cy="269033"/>
+                </a:xfrm>
+                <a:prstGeom prst="rect">
+                  <a:avLst/>
+                </a:prstGeom>
+                <a:noFill/>
+              </p:spPr>
+              <p:txBody>
+                <a:bodyPr wrap="square" rtlCol="0">
+                  <a:spAutoFit/>
+                </a:bodyPr>
+                <a:lstStyle/>
+                <a:p>
+                  <a:pPr algn="ctr"/>
+                  <a:endParaRPr lang="en-US" sz="1400" b="1" dirty="0"/>
+                </a:p>
+              </p:txBody>
+            </p:sp>
+            <p:cxnSp>
+              <p:nvCxnSpPr>
+                <p:cNvPr id="62" name="Straight Arrow Connector 61">
+                  <a:extLst>
+                    <a:ext uri="{FF2B5EF4-FFF2-40B4-BE49-F238E27FC236}">
+                      <a16:creationId xmlns:a16="http://schemas.microsoft.com/office/drawing/2014/main" id="{2FAE098B-7D0F-6145-8F52-20761AE156C3}"/>
+                    </a:ext>
+                  </a:extLst>
+                </p:cNvPr>
+                <p:cNvCxnSpPr>
+                  <a:cxnSpLocks/>
+                </p:cNvCxnSpPr>
+                <p:nvPr/>
+              </p:nvCxnSpPr>
+              <p:spPr>
+                <a:xfrm flipV="1">
+                  <a:off x="8201214" y="5282280"/>
+                  <a:ext cx="301872" cy="138112"/>
+                </a:xfrm>
+                <a:prstGeom prst="straightConnector1">
+                  <a:avLst/>
+                </a:prstGeom>
+                <a:ln w="28575">
+                  <a:tailEnd type="triangle"/>
+                </a:ln>
+              </p:spPr>
+              <p:style>
+                <a:lnRef idx="1">
+                  <a:schemeClr val="accent1"/>
+                </a:lnRef>
+                <a:fillRef idx="0">
+                  <a:schemeClr val="accent1"/>
+                </a:fillRef>
+                <a:effectRef idx="0">
+                  <a:schemeClr val="accent1"/>
+                </a:effectRef>
+                <a:fontRef idx="minor">
+                  <a:schemeClr val="tx1"/>
+                </a:fontRef>
+              </p:style>
+            </p:cxnSp>
+            <p:cxnSp>
+              <p:nvCxnSpPr>
+                <p:cNvPr id="63" name="Straight Arrow Connector 62">
+                  <a:extLst>
+                    <a:ext uri="{FF2B5EF4-FFF2-40B4-BE49-F238E27FC236}">
+                      <a16:creationId xmlns:a16="http://schemas.microsoft.com/office/drawing/2014/main" id="{3AE8C34C-518E-B640-8C95-7F541EF1B6E2}"/>
+                    </a:ext>
+                  </a:extLst>
+                </p:cNvPr>
+                <p:cNvCxnSpPr>
+                  <a:cxnSpLocks/>
+                </p:cNvCxnSpPr>
+                <p:nvPr/>
+              </p:nvCxnSpPr>
+              <p:spPr>
+                <a:xfrm flipV="1">
+                  <a:off x="8401325" y="5219034"/>
+                  <a:ext cx="261259" cy="247650"/>
+                </a:xfrm>
+                <a:prstGeom prst="straightConnector1">
+                  <a:avLst/>
+                </a:prstGeom>
+                <a:ln w="28575">
+                  <a:tailEnd type="triangle"/>
+                </a:ln>
+              </p:spPr>
+              <p:style>
+                <a:lnRef idx="1">
+                  <a:schemeClr val="accent1"/>
+                </a:lnRef>
+                <a:fillRef idx="0">
+                  <a:schemeClr val="accent1"/>
+                </a:fillRef>
+                <a:effectRef idx="0">
+                  <a:schemeClr val="accent1"/>
+                </a:effectRef>
+                <a:fontRef idx="minor">
+                  <a:schemeClr val="tx1"/>
+                </a:fontRef>
+              </p:style>
+            </p:cxnSp>
+            <p:cxnSp>
+              <p:nvCxnSpPr>
+                <p:cNvPr id="64" name="Straight Arrow Connector 63">
+                  <a:extLst>
+                    <a:ext uri="{FF2B5EF4-FFF2-40B4-BE49-F238E27FC236}">
+                      <a16:creationId xmlns:a16="http://schemas.microsoft.com/office/drawing/2014/main" id="{5A127BBD-7515-364E-8279-9056759A5E28}"/>
+                    </a:ext>
+                  </a:extLst>
+                </p:cNvPr>
+                <p:cNvCxnSpPr>
+                  <a:cxnSpLocks/>
+                </p:cNvCxnSpPr>
+                <p:nvPr/>
+              </p:nvCxnSpPr>
+              <p:spPr>
+                <a:xfrm flipV="1">
+                  <a:off x="8320825" y="5145124"/>
+                  <a:ext cx="364123" cy="84236"/>
+                </a:xfrm>
+                <a:prstGeom prst="straightConnector1">
+                  <a:avLst/>
+                </a:prstGeom>
+                <a:ln w="28575">
+                  <a:tailEnd type="triangle"/>
+                </a:ln>
+              </p:spPr>
+              <p:style>
+                <a:lnRef idx="1">
+                  <a:schemeClr val="accent1"/>
+                </a:lnRef>
+                <a:fillRef idx="0">
+                  <a:schemeClr val="accent1"/>
+                </a:fillRef>
+                <a:effectRef idx="0">
+                  <a:schemeClr val="accent1"/>
+                </a:effectRef>
+                <a:fontRef idx="minor">
+                  <a:schemeClr val="tx1"/>
+                </a:fontRef>
+              </p:style>
+            </p:cxnSp>
+          </p:grpSp>
+        </p:grpSp>
+        <p:sp>
+          <p:nvSpPr>
+            <p:cNvPr id="65" name="TextBox 64">
+              <a:extLst>
+                <a:ext uri="{FF2B5EF4-FFF2-40B4-BE49-F238E27FC236}">
+                  <a16:creationId xmlns:a16="http://schemas.microsoft.com/office/drawing/2014/main" id="{C0114A90-EE87-4E44-A18B-46D694255C15}"/>
+                </a:ext>
+              </a:extLst>
+            </p:cNvPr>
+            <p:cNvSpPr txBox="1"/>
+            <p:nvPr/>
+          </p:nvSpPr>
+          <p:spPr>
+            <a:xfrm>
+              <a:off x="3126881" y="4308691"/>
+              <a:ext cx="1113203" cy="276999"/>
+            </a:xfrm>
+            <a:prstGeom prst="rect">
+              <a:avLst/>
+            </a:prstGeom>
+            <a:noFill/>
+          </p:spPr>
+          <p:txBody>
+            <a:bodyPr wrap="square" rtlCol="0">
+              <a:spAutoFit/>
+            </a:bodyPr>
+            <a:lstStyle/>
+            <a:p>
+              <a:pPr algn="ctr"/>
+              <a:r>
+                <a:rPr lang="en-US" sz="1200" b="1" dirty="0"/>
+                <a:t>Distance UBS </a:t>
+              </a:r>
+            </a:p>
+          </p:txBody>
+        </p:sp>
+      </p:grpSp>
+      <p:grpSp>
+        <p:nvGrpSpPr>
+          <p:cNvPr id="66" name="Group 65">
+            <a:extLst>
+              <a:ext uri="{FF2B5EF4-FFF2-40B4-BE49-F238E27FC236}">
+                <a16:creationId xmlns:a16="http://schemas.microsoft.com/office/drawing/2014/main" id="{F110E462-D5F2-9A4A-AA5C-5C98721B751D}"/>
+              </a:ext>
+            </a:extLst>
+          </p:cNvPr>
+          <p:cNvGrpSpPr/>
+          <p:nvPr/>
+        </p:nvGrpSpPr>
+        <p:grpSpPr>
+          <a:xfrm>
+            <a:off x="4257498" y="2642645"/>
+            <a:ext cx="809742" cy="738605"/>
+            <a:chOff x="6153873" y="4315382"/>
+            <a:chExt cx="1314913" cy="1510006"/>
+          </a:xfrm>
+        </p:grpSpPr>
+        <p:pic>
+          <p:nvPicPr>
+            <p:cNvPr id="67" name="Picture 66">
+              <a:extLst>
+                <a:ext uri="{FF2B5EF4-FFF2-40B4-BE49-F238E27FC236}">
+                  <a16:creationId xmlns:a16="http://schemas.microsoft.com/office/drawing/2014/main" id="{425DB721-CA74-F042-8F31-0C6159287FED}"/>
+                </a:ext>
+              </a:extLst>
+            </p:cNvPr>
+            <p:cNvPicPr>
+              <a:picLocks noChangeAspect="1"/>
+            </p:cNvPicPr>
+            <p:nvPr/>
+          </p:nvPicPr>
+          <p:blipFill rotWithShape="1">
+            <a:blip r:embed="rId7">
+              <a:clrChange>
+                <a:clrFrom>
+                  <a:srgbClr val="FFFFFF"/>
+                </a:clrFrom>
+                <a:clrTo>
+                  <a:srgbClr val="FFFFFF">
+                    <a:alpha val="0"/>
+                  </a:srgbClr>
+                </a:clrTo>
+              </a:clrChange>
+              <a:extLst>
+                <a:ext uri="{28A0092B-C50C-407E-A947-70E740481C1C}">
+                  <a14:useLocalDpi xmlns:a14="http://schemas.microsoft.com/office/drawing/2010/main" val="0"/>
+                </a:ext>
+              </a:extLst>
+            </a:blip>
+            <a:srcRect t="39053" r="71840"/>
+            <a:stretch/>
+          </p:blipFill>
+          <p:spPr>
+            <a:xfrm>
+              <a:off x="6483377" y="4315382"/>
+              <a:ext cx="985409" cy="1501385"/>
+            </a:xfrm>
+            <a:prstGeom prst="rect">
+              <a:avLst/>
+            </a:prstGeom>
+          </p:spPr>
+        </p:pic>
+        <p:pic>
+          <p:nvPicPr>
+            <p:cNvPr id="68" name="Picture 67">
+              <a:extLst>
+                <a:ext uri="{FF2B5EF4-FFF2-40B4-BE49-F238E27FC236}">
+                  <a16:creationId xmlns:a16="http://schemas.microsoft.com/office/drawing/2014/main" id="{B248C432-3D34-C543-AA49-23E72A3D2A21}"/>
+                </a:ext>
+              </a:extLst>
+            </p:cNvPr>
+            <p:cNvPicPr>
+              <a:picLocks noChangeAspect="1"/>
+            </p:cNvPicPr>
+            <p:nvPr/>
+          </p:nvPicPr>
+          <p:blipFill rotWithShape="1">
+            <a:blip r:embed="rId7">
+              <a:clrChange>
+                <a:clrFrom>
+                  <a:srgbClr val="FFFFFF"/>
+                </a:clrFrom>
+                <a:clrTo>
+                  <a:srgbClr val="FFFFFF">
+                    <a:alpha val="0"/>
+                  </a:srgbClr>
+                </a:clrTo>
+              </a:clrChange>
+              <a:extLst>
+                <a:ext uri="{28A0092B-C50C-407E-A947-70E740481C1C}">
+                  <a14:useLocalDpi xmlns:a14="http://schemas.microsoft.com/office/drawing/2010/main" val="0"/>
+                </a:ext>
+              </a:extLst>
+            </a:blip>
+            <a:srcRect t="39053" r="71840"/>
+            <a:stretch/>
+          </p:blipFill>
+          <p:spPr>
+            <a:xfrm>
+              <a:off x="6330910" y="4324003"/>
+              <a:ext cx="985410" cy="1501385"/>
+            </a:xfrm>
+            <a:prstGeom prst="rect">
+              <a:avLst/>
+            </a:prstGeom>
+          </p:spPr>
+        </p:pic>
+        <p:pic>
+          <p:nvPicPr>
+            <p:cNvPr id="69" name="Picture 68">
+              <a:extLst>
+                <a:ext uri="{FF2B5EF4-FFF2-40B4-BE49-F238E27FC236}">
+                  <a16:creationId xmlns:a16="http://schemas.microsoft.com/office/drawing/2014/main" id="{17AC8F0D-3A1E-AF46-83EC-0982A817ECA9}"/>
+                </a:ext>
+              </a:extLst>
+            </p:cNvPr>
+            <p:cNvPicPr>
+              <a:picLocks noChangeAspect="1"/>
+            </p:cNvPicPr>
+            <p:nvPr/>
+          </p:nvPicPr>
+          <p:blipFill rotWithShape="1">
+            <a:blip r:embed="rId7">
+              <a:clrChange>
+                <a:clrFrom>
+                  <a:srgbClr val="FFFFFF"/>
+                </a:clrFrom>
+                <a:clrTo>
+                  <a:srgbClr val="FFFFFF">
+                    <a:alpha val="0"/>
+                  </a:srgbClr>
+                </a:clrTo>
+              </a:clrChange>
+              <a:extLst>
+                <a:ext uri="{28A0092B-C50C-407E-A947-70E740481C1C}">
+                  <a14:useLocalDpi xmlns:a14="http://schemas.microsoft.com/office/drawing/2010/main" val="0"/>
+                </a:ext>
+              </a:extLst>
+            </a:blip>
+            <a:srcRect t="39053" r="71840"/>
+            <a:stretch/>
+          </p:blipFill>
+          <p:spPr>
+            <a:xfrm>
+              <a:off x="6153873" y="4324003"/>
+              <a:ext cx="985409" cy="1501385"/>
+            </a:xfrm>
+            <a:prstGeom prst="rect">
+              <a:avLst/>
+            </a:prstGeom>
+          </p:spPr>
+        </p:pic>
+      </p:grpSp>
+      <p:cxnSp>
+        <p:nvCxnSpPr>
+          <p:cNvPr id="70" name="Straight Arrow Connector 69">
+            <a:extLst>
+              <a:ext uri="{FF2B5EF4-FFF2-40B4-BE49-F238E27FC236}">
+                <a16:creationId xmlns:a16="http://schemas.microsoft.com/office/drawing/2014/main" id="{986B0C97-4B66-3548-9E2A-FE38982875B4}"/>
+              </a:ext>
+            </a:extLst>
+          </p:cNvPr>
+          <p:cNvCxnSpPr>
+            <a:cxnSpLocks/>
+          </p:cNvCxnSpPr>
+          <p:nvPr/>
+        </p:nvCxnSpPr>
+        <p:spPr>
+          <a:xfrm>
+            <a:off x="2910747" y="2977233"/>
+            <a:ext cx="377510" cy="0"/>
+          </a:xfrm>
+          <a:prstGeom prst="straightConnector1">
+            <a:avLst/>
+          </a:prstGeom>
+          <a:ln w="38100">
+            <a:solidFill>
+              <a:schemeClr val="tx1">
+                <a:lumMod val="65000"/>
+                <a:lumOff val="35000"/>
+              </a:schemeClr>
+            </a:solidFill>
+            <a:tailEnd type="triangle"/>
+          </a:ln>
+        </p:spPr>
+        <p:style>
+          <a:lnRef idx="1">
+            <a:schemeClr val="accent1"/>
+          </a:lnRef>
+          <a:fillRef idx="0">
+            <a:schemeClr val="accent1"/>
+          </a:fillRef>
+          <a:effectRef idx="0">
+            <a:schemeClr val="accent1"/>
+          </a:effectRef>
+          <a:fontRef idx="minor">
+            <a:schemeClr val="tx1"/>
+          </a:fontRef>
+        </p:style>
+      </p:cxnSp>
+      <p:sp>
+        <p:nvSpPr>
+          <p:cNvPr id="71" name="TextBox 70">
+            <a:extLst>
+              <a:ext uri="{FF2B5EF4-FFF2-40B4-BE49-F238E27FC236}">
+                <a16:creationId xmlns:a16="http://schemas.microsoft.com/office/drawing/2014/main" id="{BECF459C-7013-FB47-8CA1-C426808B4379}"/>
+              </a:ext>
+            </a:extLst>
+          </p:cNvPr>
+          <p:cNvSpPr txBox="1"/>
+          <p:nvPr/>
+        </p:nvSpPr>
+        <p:spPr>
+          <a:xfrm>
+            <a:off x="3254577" y="1504988"/>
+            <a:ext cx="1751185" cy="923330"/>
+          </a:xfrm>
+          <a:prstGeom prst="rect">
+            <a:avLst/>
+          </a:prstGeom>
+          <a:noFill/>
+        </p:spPr>
+        <p:txBody>
+          <a:bodyPr wrap="none" rtlCol="0">
+            <a:spAutoFit/>
+          </a:bodyPr>
+          <a:lstStyle/>
+          <a:p>
+            <a:pPr algn="ctr"/>
+            <a:r>
+              <a:rPr lang="en-US" b="1" dirty="0"/>
+              <a:t>(2)</a:t>
+            </a:r>
+          </a:p>
+          <a:p>
+            <a:pPr algn="ctr"/>
+            <a:r>
+              <a:rPr lang="en-US" b="1" dirty="0"/>
+              <a:t>Bootstrapping &amp;</a:t>
+            </a:r>
+          </a:p>
+          <a:p>
+            <a:pPr algn="ctr"/>
+            <a:r>
+              <a:rPr lang="en-US" b="1" dirty="0"/>
+              <a:t>Initial Labeling</a:t>
+            </a:r>
+          </a:p>
+        </p:txBody>
+      </p:sp>
+      <p:sp>
+        <p:nvSpPr>
+          <p:cNvPr id="72" name="Right Brace 71">
+            <a:extLst>
+              <a:ext uri="{FF2B5EF4-FFF2-40B4-BE49-F238E27FC236}">
+                <a16:creationId xmlns:a16="http://schemas.microsoft.com/office/drawing/2014/main" id="{EF798FE8-0DEE-9E44-83DA-E5B70E65454E}"/>
+              </a:ext>
+            </a:extLst>
+          </p:cNvPr>
+          <p:cNvSpPr/>
+          <p:nvPr/>
+        </p:nvSpPr>
+        <p:spPr>
+          <a:xfrm rot="16200000">
+            <a:off x="4065741" y="1635444"/>
+            <a:ext cx="180234" cy="1577887"/>
+          </a:xfrm>
+          <a:prstGeom prst="rightBrace">
+            <a:avLst/>
+          </a:prstGeom>
+          <a:ln w="38100">
+            <a:solidFill>
+              <a:schemeClr val="bg1">
+                <a:lumMod val="50000"/>
+              </a:schemeClr>
+            </a:solidFill>
+          </a:ln>
+        </p:spPr>
+        <p:style>
+          <a:lnRef idx="1">
+            <a:schemeClr val="accent1"/>
+          </a:lnRef>
+          <a:fillRef idx="0">
+            <a:schemeClr val="accent1"/>
+          </a:fillRef>
+          <a:effectRef idx="0">
+            <a:schemeClr val="accent1"/>
+          </a:effectRef>
+          <a:fontRef idx="minor">
+            <a:schemeClr val="tx1"/>
+          </a:fontRef>
+        </p:style>
+        <p:txBody>
+          <a:bodyPr rtlCol="0" anchor="ctr"/>
+          <a:lstStyle/>
+          <a:p>
+            <a:pPr algn="ctr"/>
+            <a:endParaRPr lang="en-US"/>
+          </a:p>
+        </p:txBody>
+      </p:sp>
+      <p:sp>
+        <p:nvSpPr>
+          <p:cNvPr id="73" name="TextBox 72">
+            <a:extLst>
+              <a:ext uri="{FF2B5EF4-FFF2-40B4-BE49-F238E27FC236}">
+                <a16:creationId xmlns:a16="http://schemas.microsoft.com/office/drawing/2014/main" id="{A26B761F-45B7-4342-B9E9-86F3C70F27AE}"/>
+              </a:ext>
+            </a:extLst>
+          </p:cNvPr>
+          <p:cNvSpPr txBox="1"/>
+          <p:nvPr/>
+        </p:nvSpPr>
+        <p:spPr>
+          <a:xfrm>
+            <a:off x="10281793" y="1643488"/>
+            <a:ext cx="1171539" cy="646331"/>
+          </a:xfrm>
+          <a:prstGeom prst="rect">
+            <a:avLst/>
+          </a:prstGeom>
+          <a:noFill/>
+        </p:spPr>
+        <p:txBody>
+          <a:bodyPr wrap="none" rtlCol="0">
+            <a:spAutoFit/>
+          </a:bodyPr>
+          <a:lstStyle/>
+          <a:p>
+            <a:r>
+              <a:rPr lang="en-US" b="1" dirty="0"/>
+              <a:t>Digital </a:t>
+            </a:r>
+          </a:p>
+          <a:p>
+            <a:r>
+              <a:rPr lang="en-US" b="1" dirty="0"/>
+              <a:t>Dictionary</a:t>
+            </a:r>
+          </a:p>
+        </p:txBody>
+      </p:sp>
+      <p:sp>
+        <p:nvSpPr>
+          <p:cNvPr id="74" name="Right Brace 73">
+            <a:extLst>
+              <a:ext uri="{FF2B5EF4-FFF2-40B4-BE49-F238E27FC236}">
+                <a16:creationId xmlns:a16="http://schemas.microsoft.com/office/drawing/2014/main" id="{E2AF4DC0-26D3-4847-97B8-7A0899E604C4}"/>
+              </a:ext>
+            </a:extLst>
+          </p:cNvPr>
+          <p:cNvSpPr/>
+          <p:nvPr/>
+        </p:nvSpPr>
+        <p:spPr>
+          <a:xfrm rot="16200000">
+            <a:off x="7743039" y="1530776"/>
+            <a:ext cx="139257" cy="1761224"/>
+          </a:xfrm>
+          <a:prstGeom prst="rightBrace">
+            <a:avLst/>
+          </a:prstGeom>
+          <a:ln w="38100">
+            <a:solidFill>
+              <a:schemeClr val="bg1">
+                <a:lumMod val="50000"/>
+              </a:schemeClr>
+            </a:solidFill>
+          </a:ln>
+        </p:spPr>
+        <p:style>
+          <a:lnRef idx="1">
+            <a:schemeClr val="accent1"/>
+          </a:lnRef>
+          <a:fillRef idx="0">
+            <a:schemeClr val="accent1"/>
+          </a:fillRef>
+          <a:effectRef idx="0">
+            <a:schemeClr val="accent1"/>
+          </a:effectRef>
+          <a:fontRef idx="minor">
+            <a:schemeClr val="tx1"/>
+          </a:fontRef>
+        </p:style>
+        <p:txBody>
+          <a:bodyPr rtlCol="0" anchor="ctr"/>
+          <a:lstStyle/>
+          <a:p>
+            <a:pPr algn="ctr"/>
+            <a:endParaRPr lang="en-US"/>
           </a:p>
         </p:txBody>
       </p:sp>

</xml_diff>

<commit_message>
Need to address my new comment and Ian's comments later this evening
</commit_message>
<xml_diff>
--- a/alpolyner.pptx
+++ b/alpolyner.pptx
@@ -10727,7 +10727,7 @@
         </p:nvSpPr>
         <p:spPr>
           <a:xfrm>
-            <a:off x="7749083" y="2626320"/>
+            <a:off x="7603466" y="2566904"/>
             <a:ext cx="457200" cy="457200"/>
           </a:xfrm>
           <a:prstGeom prst="ellipse">
@@ -11062,7 +11062,7 @@
         </p:nvSpPr>
         <p:spPr>
           <a:xfrm>
-            <a:off x="6487783" y="1579972"/>
+            <a:off x="6292711" y="1555588"/>
             <a:ext cx="1900141" cy="830997"/>
           </a:xfrm>
           <a:prstGeom prst="rect">
@@ -11112,8 +11112,8 @@
         </p:nvSpPr>
         <p:spPr>
           <a:xfrm>
-            <a:off x="5053327" y="2350741"/>
-            <a:ext cx="2435766" cy="347472"/>
+            <a:off x="5053328" y="2350741"/>
+            <a:ext cx="960401" cy="347472"/>
           </a:xfrm>
           <a:prstGeom prst="roundRect">
             <a:avLst/>
@@ -11254,6 +11254,55 @@
           </a:p>
         </p:txBody>
       </p:sp>
+      <p:cxnSp>
+        <p:nvCxnSpPr>
+          <p:cNvPr id="51" name="Straight Arrow Connector 50">
+            <a:extLst>
+              <a:ext uri="{FF2B5EF4-FFF2-40B4-BE49-F238E27FC236}">
+                <a16:creationId xmlns:a16="http://schemas.microsoft.com/office/drawing/2014/main" id="{8E51780E-48C9-3B4F-AA21-5188C70EB5FF}"/>
+              </a:ext>
+            </a:extLst>
+          </p:cNvPr>
+          <p:cNvCxnSpPr>
+            <a:cxnSpLocks/>
+            <a:stCxn id="63" idx="3"/>
+            <a:endCxn id="50" idx="0"/>
+          </p:cNvCxnSpPr>
+          <p:nvPr/>
+        </p:nvCxnSpPr>
+        <p:spPr>
+          <a:xfrm>
+            <a:off x="6013729" y="2524477"/>
+            <a:ext cx="970280" cy="496318"/>
+          </a:xfrm>
+          <a:prstGeom prst="straightConnector1">
+            <a:avLst/>
+          </a:prstGeom>
+          <a:ln w="38100">
+            <a:solidFill>
+              <a:schemeClr val="tx1">
+                <a:lumMod val="95000"/>
+                <a:lumOff val="5000"/>
+              </a:schemeClr>
+            </a:solidFill>
+            <a:tailEnd type="triangle"/>
+          </a:ln>
+        </p:spPr>
+        <p:style>
+          <a:lnRef idx="1">
+            <a:schemeClr val="accent1"/>
+          </a:lnRef>
+          <a:fillRef idx="0">
+            <a:schemeClr val="accent1"/>
+          </a:fillRef>
+          <a:effectRef idx="0">
+            <a:schemeClr val="accent1"/>
+          </a:effectRef>
+          <a:fontRef idx="minor">
+            <a:schemeClr val="tx1"/>
+          </a:fontRef>
+        </p:style>
+      </p:cxnSp>
     </p:spTree>
     <p:extLst>
       <p:ext uri="{BB962C8B-B14F-4D97-AF65-F5344CB8AC3E}">

</xml_diff>

<commit_message>
Removing discrimination and candidate generation phases from intro
</commit_message>
<xml_diff>
--- a/alpolyner.pptx
+++ b/alpolyner.pptx
@@ -11722,8 +11722,8 @@
         </p:nvSpPr>
         <p:spPr>
           <a:xfrm>
-            <a:off x="8684457" y="1504988"/>
-            <a:ext cx="1404231" cy="830997"/>
+            <a:off x="8748384" y="1504988"/>
+            <a:ext cx="1276376" cy="830997"/>
           </a:xfrm>
           <a:prstGeom prst="rect">
             <a:avLst/>
@@ -11753,7 +11753,7 @@
             <a:pPr algn="ctr"/>
             <a:r>
               <a:rPr lang="en-US" sz="1600" b="1" dirty="0"/>
-              <a:t>discrimination</a:t>
+              <a:t>classification</a:t>
             </a:r>
           </a:p>
         </p:txBody>
@@ -13365,8 +13365,8 @@
         </p:nvCxnSpPr>
         <p:spPr>
           <a:xfrm rot="16200000" flipV="1">
-            <a:off x="7703711" y="-177875"/>
-            <a:ext cx="12700" cy="3365725"/>
+            <a:off x="7703710" y="-177874"/>
+            <a:ext cx="12700" cy="3365724"/>
           </a:xfrm>
           <a:prstGeom prst="bentConnector3">
             <a:avLst>

</xml_diff>

<commit_message>
Integrating comments from annotated PDF from Debbie
</commit_message>
<xml_diff>
--- a/alpolyner.pptx
+++ b/alpolyner.pptx
@@ -200,7 +200,7 @@
           <a:p>
             <a:fld id="{2F5CF1B8-E33B-2D4C-AE82-68295A1878F9}" type="datetimeFigureOut">
               <a:rPr lang="en-US" smtClean="0"/>
-              <a:t>5/1/19</a:t>
+              <a:t>5/14/19</a:t>
             </a:fld>
             <a:endParaRPr lang="en-US"/>
           </a:p>
@@ -614,7 +614,7 @@
           <a:p>
             <a:fld id="{368E5452-927C-804A-9893-4B0F8C82BC51}" type="datetimeFigureOut">
               <a:rPr lang="en-US" smtClean="0"/>
-              <a:t>5/1/19</a:t>
+              <a:t>5/14/19</a:t>
             </a:fld>
             <a:endParaRPr lang="en-US"/>
           </a:p>
@@ -812,7 +812,7 @@
           <a:p>
             <a:fld id="{368E5452-927C-804A-9893-4B0F8C82BC51}" type="datetimeFigureOut">
               <a:rPr lang="en-US" smtClean="0"/>
-              <a:t>5/1/19</a:t>
+              <a:t>5/14/19</a:t>
             </a:fld>
             <a:endParaRPr lang="en-US"/>
           </a:p>
@@ -1020,7 +1020,7 @@
           <a:p>
             <a:fld id="{368E5452-927C-804A-9893-4B0F8C82BC51}" type="datetimeFigureOut">
               <a:rPr lang="en-US" smtClean="0"/>
-              <a:t>5/1/19</a:t>
+              <a:t>5/14/19</a:t>
             </a:fld>
             <a:endParaRPr lang="en-US"/>
           </a:p>
@@ -1218,7 +1218,7 @@
           <a:p>
             <a:fld id="{368E5452-927C-804A-9893-4B0F8C82BC51}" type="datetimeFigureOut">
               <a:rPr lang="en-US" smtClean="0"/>
-              <a:t>5/1/19</a:t>
+              <a:t>5/14/19</a:t>
             </a:fld>
             <a:endParaRPr lang="en-US"/>
           </a:p>
@@ -1493,7 +1493,7 @@
           <a:p>
             <a:fld id="{368E5452-927C-804A-9893-4B0F8C82BC51}" type="datetimeFigureOut">
               <a:rPr lang="en-US" smtClean="0"/>
-              <a:t>5/1/19</a:t>
+              <a:t>5/14/19</a:t>
             </a:fld>
             <a:endParaRPr lang="en-US"/>
           </a:p>
@@ -1758,7 +1758,7 @@
           <a:p>
             <a:fld id="{368E5452-927C-804A-9893-4B0F8C82BC51}" type="datetimeFigureOut">
               <a:rPr lang="en-US" smtClean="0"/>
-              <a:t>5/1/19</a:t>
+              <a:t>5/14/19</a:t>
             </a:fld>
             <a:endParaRPr lang="en-US"/>
           </a:p>
@@ -2170,7 +2170,7 @@
           <a:p>
             <a:fld id="{368E5452-927C-804A-9893-4B0F8C82BC51}" type="datetimeFigureOut">
               <a:rPr lang="en-US" smtClean="0"/>
-              <a:t>5/1/19</a:t>
+              <a:t>5/14/19</a:t>
             </a:fld>
             <a:endParaRPr lang="en-US"/>
           </a:p>
@@ -2311,7 +2311,7 @@
           <a:p>
             <a:fld id="{368E5452-927C-804A-9893-4B0F8C82BC51}" type="datetimeFigureOut">
               <a:rPr lang="en-US" smtClean="0"/>
-              <a:t>5/1/19</a:t>
+              <a:t>5/14/19</a:t>
             </a:fld>
             <a:endParaRPr lang="en-US"/>
           </a:p>
@@ -2424,7 +2424,7 @@
           <a:p>
             <a:fld id="{368E5452-927C-804A-9893-4B0F8C82BC51}" type="datetimeFigureOut">
               <a:rPr lang="en-US" smtClean="0"/>
-              <a:t>5/1/19</a:t>
+              <a:t>5/14/19</a:t>
             </a:fld>
             <a:endParaRPr lang="en-US"/>
           </a:p>
@@ -2735,7 +2735,7 @@
           <a:p>
             <a:fld id="{368E5452-927C-804A-9893-4B0F8C82BC51}" type="datetimeFigureOut">
               <a:rPr lang="en-US" smtClean="0"/>
-              <a:t>5/1/19</a:t>
+              <a:t>5/14/19</a:t>
             </a:fld>
             <a:endParaRPr lang="en-US"/>
           </a:p>
@@ -3023,7 +3023,7 @@
           <a:p>
             <a:fld id="{368E5452-927C-804A-9893-4B0F8C82BC51}" type="datetimeFigureOut">
               <a:rPr lang="en-US" smtClean="0"/>
-              <a:t>5/1/19</a:t>
+              <a:t>5/14/19</a:t>
             </a:fld>
             <a:endParaRPr lang="en-US"/>
           </a:p>
@@ -3264,7 +3264,7 @@
           <a:p>
             <a:fld id="{368E5452-927C-804A-9893-4B0F8C82BC51}" type="datetimeFigureOut">
               <a:rPr lang="en-US" smtClean="0"/>
-              <a:t>5/1/19</a:t>
+              <a:t>5/14/19</a:t>
             </a:fld>
             <a:endParaRPr lang="en-US"/>
           </a:p>
@@ -13993,8 +13993,8 @@
         </p:nvSpPr>
         <p:spPr>
           <a:xfrm>
-            <a:off x="6912679" y="974177"/>
-            <a:ext cx="1457129" cy="338554"/>
+            <a:off x="6486635" y="974177"/>
+            <a:ext cx="2309223" cy="338554"/>
           </a:xfrm>
           <a:prstGeom prst="rect">
             <a:avLst/>
@@ -14010,7 +14010,7 @@
             <a:pPr algn="ctr"/>
             <a:r>
               <a:rPr lang="en-US" sz="1600" b="1" dirty="0"/>
-              <a:t>Active learning</a:t>
+              <a:t>Active learning (Figure 2)</a:t>
             </a:r>
           </a:p>
         </p:txBody>

</xml_diff>